<commit_message>
fixing typos and images
</commit_message>
<xml_diff>
--- a/Advanced Es6 & TypeScript.pptx
+++ b/Advanced Es6 & TypeScript.pptx
@@ -165,7 +165,7 @@
   </p:defaultTextStyle>
   <p:extLst>
     <p:ext uri="{EFAFB233-063F-42B5-8137-9DF3F51BA10A}">
-      <p15:sldGuideLst xmlns:p15="http://schemas.microsoft.com/office/powerpoint/2012/main">
+      <p15:sldGuideLst xmlns:p15="http://schemas.microsoft.com/office/powerpoint/2012/main" xmlns="">
         <p15:guide id="1" orient="horz" pos="2160">
           <p15:clr>
             <a:srgbClr val="A4A3A4"/>
@@ -447,7 +447,7 @@
             <a:fld id="{1D8BD707-D9CF-40AE-B4C6-C98DA3205C09}" type="datetimeFigureOut">
               <a:rPr lang="en-US" smtClean="0"/>
               <a:pPr/>
-              <a:t>8/21/2019</a:t>
+              <a:t>9/21/2019</a:t>
             </a:fld>
             <a:endParaRPr lang="en-US"/>
           </a:p>
@@ -641,7 +641,7 @@
             <a:fld id="{1D8BD707-D9CF-40AE-B4C6-C98DA3205C09}" type="datetimeFigureOut">
               <a:rPr lang="en-US" smtClean="0"/>
               <a:pPr/>
-              <a:t>8/21/2019</a:t>
+              <a:t>9/21/2019</a:t>
             </a:fld>
             <a:endParaRPr lang="en-US"/>
           </a:p>
@@ -822,7 +822,7 @@
             <a:fld id="{1D8BD707-D9CF-40AE-B4C6-C98DA3205C09}" type="datetimeFigureOut">
               <a:rPr lang="en-US" smtClean="0"/>
               <a:pPr/>
-              <a:t>8/21/2019</a:t>
+              <a:t>9/21/2019</a:t>
             </a:fld>
             <a:endParaRPr lang="en-US"/>
           </a:p>
@@ -1007,7 +1007,7 @@
             <a:fld id="{1D8BD707-D9CF-40AE-B4C6-C98DA3205C09}" type="datetimeFigureOut">
               <a:rPr lang="en-US" smtClean="0"/>
               <a:pPr/>
-              <a:t>8/21/2019</a:t>
+              <a:t>9/21/2019</a:t>
             </a:fld>
             <a:endParaRPr lang="en-US"/>
           </a:p>
@@ -1230,7 +1230,7 @@
             <a:fld id="{1D8BD707-D9CF-40AE-B4C6-C98DA3205C09}" type="datetimeFigureOut">
               <a:rPr lang="en-US" smtClean="0"/>
               <a:pPr/>
-              <a:t>8/21/2019</a:t>
+              <a:t>9/21/2019</a:t>
             </a:fld>
             <a:endParaRPr lang="en-US"/>
           </a:p>
@@ -1516,7 +1516,7 @@
             <a:fld id="{1D8BD707-D9CF-40AE-B4C6-C98DA3205C09}" type="datetimeFigureOut">
               <a:rPr lang="en-US" smtClean="0"/>
               <a:pPr/>
-              <a:t>8/21/2019</a:t>
+              <a:t>9/21/2019</a:t>
             </a:fld>
             <a:endParaRPr lang="en-US"/>
           </a:p>
@@ -1942,7 +1942,7 @@
             <a:fld id="{1D8BD707-D9CF-40AE-B4C6-C98DA3205C09}" type="datetimeFigureOut">
               <a:rPr lang="en-US" smtClean="0"/>
               <a:pPr/>
-              <a:t>8/21/2019</a:t>
+              <a:t>9/21/2019</a:t>
             </a:fld>
             <a:endParaRPr lang="en-US"/>
           </a:p>
@@ -2061,7 +2061,7 @@
             <a:fld id="{1D8BD707-D9CF-40AE-B4C6-C98DA3205C09}" type="datetimeFigureOut">
               <a:rPr lang="en-US" smtClean="0"/>
               <a:pPr/>
-              <a:t>8/21/2019</a:t>
+              <a:t>9/21/2019</a:t>
             </a:fld>
             <a:endParaRPr lang="en-US"/>
           </a:p>
@@ -2162,7 +2162,7 @@
             <a:fld id="{1D8BD707-D9CF-40AE-B4C6-C98DA3205C09}" type="datetimeFigureOut">
               <a:rPr lang="en-US" smtClean="0"/>
               <a:pPr/>
-              <a:t>8/21/2019</a:t>
+              <a:t>9/21/2019</a:t>
             </a:fld>
             <a:endParaRPr lang="en-US"/>
           </a:p>
@@ -2428,7 +2428,7 @@
             <a:fld id="{1D8BD707-D9CF-40AE-B4C6-C98DA3205C09}" type="datetimeFigureOut">
               <a:rPr lang="en-US" smtClean="0"/>
               <a:pPr/>
-              <a:t>8/21/2019</a:t>
+              <a:t>9/21/2019</a:t>
             </a:fld>
             <a:endParaRPr lang="en-US"/>
           </a:p>
@@ -2784,7 +2784,7 @@
             <a:fld id="{1D8BD707-D9CF-40AE-B4C6-C98DA3205C09}" type="datetimeFigureOut">
               <a:rPr lang="en-US" smtClean="0"/>
               <a:pPr/>
-              <a:t>8/21/2019</a:t>
+              <a:t>9/21/2019</a:t>
             </a:fld>
             <a:endParaRPr lang="en-US"/>
           </a:p>
@@ -3129,7 +3129,7 @@
             <a:fld id="{1D8BD707-D9CF-40AE-B4C6-C98DA3205C09}" type="datetimeFigureOut">
               <a:rPr lang="en-US" smtClean="0"/>
               <a:pPr/>
-              <a:t>8/21/2019</a:t>
+              <a:t>9/21/2019</a:t>
             </a:fld>
             <a:endParaRPr lang="en-US"/>
           </a:p>
@@ -4908,15 +4908,17 @@
           <a:p>
             <a:pPr algn="l" rtl="0"/>
             <a:r>
-              <a:rPr lang="en-US" dirty="0"/>
-              <a:t>If in strict mode, this will be undefined.</a:t>
-            </a:r>
-          </a:p>
-          <a:p>
-            <a:pPr algn="l" rtl="0"/>
-            <a:r>
-              <a:rPr lang="en-US" dirty="0"/>
-              <a:t>Otherwise, this will be the global object (window in a browser).</a:t>
+              <a:rPr lang="en-US" dirty="0" smtClean="0"/>
+              <a:t>In a global context, If in strict mode, this will be undefined.</a:t>
+            </a:r>
+          </a:p>
+          <a:p>
+            <a:pPr algn="l" rtl="0">
+              <a:buNone/>
+            </a:pPr>
+            <a:r>
+              <a:rPr lang="en-US" dirty="0" smtClean="0"/>
+              <a:t>	Otherwise, this will be the global object (window in a browser).</a:t>
             </a:r>
           </a:p>
           <a:p>
@@ -5194,16 +5196,10 @@
           <a:p>
             <a:pPr algn="l" rtl="0"/>
             <a:r>
-              <a:rPr lang="en-US" sz="2800" dirty="0"/>
+              <a:rPr lang="en-US" sz="2800" dirty="0" smtClean="0"/>
               <a:t>Symbols</a:t>
             </a:r>
-          </a:p>
-          <a:p>
-            <a:pPr algn="l" rtl="0"/>
-            <a:r>
-              <a:rPr lang="en-US" sz="2800" dirty="0"/>
-              <a:t>‘promise’ and async await key words</a:t>
-            </a:r>
+            <a:endParaRPr lang="en-US" sz="2800" dirty="0"/>
           </a:p>
           <a:p>
             <a:pPr algn="l" rtl="0"/>
@@ -5211,6 +5207,15 @@
               <a:rPr lang="en-US" sz="2800" dirty="0"/>
               <a:t>Enums and union types </a:t>
             </a:r>
+            <a:endParaRPr lang="en-US" sz="2800" dirty="0" smtClean="0"/>
+          </a:p>
+          <a:p>
+            <a:pPr algn="l" rtl="0"/>
+            <a:r>
+              <a:rPr lang="en-US" sz="2800" dirty="0" smtClean="0"/>
+              <a:t>‘promise’ and async await key words</a:t>
+            </a:r>
+            <a:endParaRPr lang="en-US" sz="2800" dirty="0"/>
           </a:p>
           <a:p>
             <a:pPr algn="l" rtl="0"/>
@@ -6310,8 +6315,12 @@
           <a:p>
             <a:pPr algn="l" rtl="0"/>
             <a:r>
-              <a:rPr lang="en-US" dirty="0"/>
-              <a:t>{ does not create a new variable scope.</a:t>
+              <a:rPr lang="en-US" dirty="0" smtClean="0"/>
+              <a:t>‘{‘ does </a:t>
+            </a:r>
+            <a:r>
+              <a:rPr lang="en-US" dirty="0"/>
+              <a:t>not create a new variable scope.</a:t>
             </a:r>
           </a:p>
           <a:p>
@@ -7341,7 +7350,7 @@
           <p:cNvPr id="5" name="Picture 4" descr="A close up of a logo&#10;&#10;Description generated with very high confidence">
             <a:extLst>
               <a:ext uri="{FF2B5EF4-FFF2-40B4-BE49-F238E27FC236}">
-                <a16:creationId xmlns:a16="http://schemas.microsoft.com/office/drawing/2014/main" id="{DFA1FD41-22C6-4988-B10F-FC8A2E849276}"/>
+                <a16:creationId xmlns:a16="http://schemas.microsoft.com/office/drawing/2014/main" xmlns="" id="{DFA1FD41-22C6-4988-B10F-FC8A2E849276}"/>
               </a:ext>
             </a:extLst>
           </p:cNvPr>
@@ -7351,10 +7360,10 @@
           <p:nvPr/>
         </p:nvPicPr>
         <p:blipFill>
-          <a:blip r:embed="rId2">
+          <a:blip r:embed="rId2" cstate="print">
             <a:extLst>
               <a:ext uri="{28A0092B-C50C-407E-A947-70E740481C1C}">
-                <a14:useLocalDpi xmlns:a14="http://schemas.microsoft.com/office/drawing/2010/main" val="0"/>
+                <a14:useLocalDpi xmlns:a14="http://schemas.microsoft.com/office/drawing/2010/main" xmlns="" val="0"/>
               </a:ext>
             </a:extLst>
           </a:blip>
@@ -7377,7 +7386,7 @@
           <p:cNvPr id="7" name="Picture 6" descr="A close up of a sign&#10;&#10;Description generated with high confidence">
             <a:extLst>
               <a:ext uri="{FF2B5EF4-FFF2-40B4-BE49-F238E27FC236}">
-                <a16:creationId xmlns:a16="http://schemas.microsoft.com/office/drawing/2014/main" id="{FD8DFD43-961D-41D1-9771-88AE4D4E4FF2}"/>
+                <a16:creationId xmlns:a16="http://schemas.microsoft.com/office/drawing/2014/main" xmlns="" id="{FD8DFD43-961D-41D1-9771-88AE4D4E4FF2}"/>
               </a:ext>
             </a:extLst>
           </p:cNvPr>
@@ -7387,10 +7396,10 @@
           <p:nvPr/>
         </p:nvPicPr>
         <p:blipFill>
-          <a:blip r:embed="rId3">
+          <a:blip r:embed="rId3" cstate="print">
             <a:extLst>
               <a:ext uri="{28A0092B-C50C-407E-A947-70E740481C1C}">
-                <a14:useLocalDpi xmlns:a14="http://schemas.microsoft.com/office/drawing/2010/main" val="0"/>
+                <a14:useLocalDpi xmlns:a14="http://schemas.microsoft.com/office/drawing/2010/main" xmlns="" val="0"/>
               </a:ext>
             </a:extLst>
           </a:blip>
@@ -7411,7 +7420,7 @@
     </p:spTree>
     <p:extLst>
       <p:ext uri="{BB962C8B-B14F-4D97-AF65-F5344CB8AC3E}">
-        <p14:creationId xmlns:p14="http://schemas.microsoft.com/office/powerpoint/2010/main" val="3891654774"/>
+        <p14:creationId xmlns:p14="http://schemas.microsoft.com/office/powerpoint/2010/main" xmlns="" val="3891654774"/>
       </p:ext>
     </p:extLst>
   </p:cSld>
@@ -7501,7 +7510,7 @@
           <p:cNvPr id="6" name="Picture 5" descr="A screenshot of a cell phone&#10;&#10;Description generated with very high confidence">
             <a:extLst>
               <a:ext uri="{FF2B5EF4-FFF2-40B4-BE49-F238E27FC236}">
-                <a16:creationId xmlns:a16="http://schemas.microsoft.com/office/drawing/2014/main" id="{69FD4010-F423-4EEF-B82D-1AD7E695073F}"/>
+                <a16:creationId xmlns:a16="http://schemas.microsoft.com/office/drawing/2014/main" xmlns="" id="{69FD4010-F423-4EEF-B82D-1AD7E695073F}"/>
               </a:ext>
             </a:extLst>
           </p:cNvPr>
@@ -7511,10 +7520,10 @@
           <p:nvPr/>
         </p:nvPicPr>
         <p:blipFill>
-          <a:blip r:embed="rId2">
+          <a:blip r:embed="rId2" cstate="print">
             <a:extLst>
               <a:ext uri="{28A0092B-C50C-407E-A947-70E740481C1C}">
-                <a14:useLocalDpi xmlns:a14="http://schemas.microsoft.com/office/drawing/2010/main" val="0"/>
+                <a14:useLocalDpi xmlns:a14="http://schemas.microsoft.com/office/drawing/2010/main" xmlns="" val="0"/>
               </a:ext>
             </a:extLst>
           </a:blip>
@@ -7535,7 +7544,7 @@
     </p:spTree>
     <p:extLst>
       <p:ext uri="{BB962C8B-B14F-4D97-AF65-F5344CB8AC3E}">
-        <p14:creationId xmlns:p14="http://schemas.microsoft.com/office/powerpoint/2010/main" val="2535893048"/>
+        <p14:creationId xmlns:p14="http://schemas.microsoft.com/office/powerpoint/2010/main" xmlns="" val="2535893048"/>
       </p:ext>
     </p:extLst>
   </p:cSld>
@@ -7641,7 +7650,7 @@
           <p:cNvPr id="5" name="Picture 4" descr="A picture containing object, person&#10;&#10;Description generated with high confidence">
             <a:extLst>
               <a:ext uri="{FF2B5EF4-FFF2-40B4-BE49-F238E27FC236}">
-                <a16:creationId xmlns:a16="http://schemas.microsoft.com/office/drawing/2014/main" id="{B0080363-033F-49EB-A899-D496874D7373}"/>
+                <a16:creationId xmlns:a16="http://schemas.microsoft.com/office/drawing/2014/main" xmlns="" id="{B0080363-033F-49EB-A899-D496874D7373}"/>
               </a:ext>
             </a:extLst>
           </p:cNvPr>
@@ -7651,10 +7660,10 @@
           <p:nvPr/>
         </p:nvPicPr>
         <p:blipFill>
-          <a:blip r:embed="rId2">
+          <a:blip r:embed="rId2" cstate="print">
             <a:extLst>
               <a:ext uri="{28A0092B-C50C-407E-A947-70E740481C1C}">
-                <a14:useLocalDpi xmlns:a14="http://schemas.microsoft.com/office/drawing/2010/main" val="0"/>
+                <a14:useLocalDpi xmlns:a14="http://schemas.microsoft.com/office/drawing/2010/main" xmlns="" val="0"/>
               </a:ext>
             </a:extLst>
           </a:blip>
@@ -7675,7 +7684,7 @@
     </p:spTree>
     <p:extLst>
       <p:ext uri="{BB962C8B-B14F-4D97-AF65-F5344CB8AC3E}">
-        <p14:creationId xmlns:p14="http://schemas.microsoft.com/office/powerpoint/2010/main" val="3702792061"/>
+        <p14:creationId xmlns:p14="http://schemas.microsoft.com/office/powerpoint/2010/main" xmlns="" val="3702792061"/>
       </p:ext>
     </p:extLst>
   </p:cSld>
@@ -7760,45 +7769,49 @@
           <a:p>
             <a:pPr algn="l" rtl="0"/>
             <a:r>
-              <a:rPr lang="en-US" sz="2000" dirty="0" err="1"/>
-              <a:t>var</a:t>
+              <a:rPr lang="en-US" sz="2000" dirty="0" smtClean="0"/>
+              <a:t>arr1.push</a:t>
             </a:r>
             <a:r>
               <a:rPr lang="en-US" sz="2000" dirty="0"/>
-              <a:t> arr1.push(…arr2) // adds arr2 to the end of arr1</a:t>
-            </a:r>
-          </a:p>
-          <a:p>
-            <a:pPr algn="l" rtl="0"/>
-            <a:r>
-              <a:rPr lang="en-US" sz="2000" dirty="0" err="1"/>
-              <a:t>var</a:t>
+              <a:t>(…arr2) // adds arr2 to the end of arr1</a:t>
+            </a:r>
+          </a:p>
+          <a:p>
+            <a:pPr algn="l" rtl="0"/>
+            <a:r>
+              <a:rPr lang="en-US" sz="2000" dirty="0" smtClean="0"/>
+              <a:t>arr1.unshift</a:t>
             </a:r>
             <a:r>
               <a:rPr lang="en-US" sz="2000" dirty="0"/>
-              <a:t> arr1.unshift(…arr2) // adds arr2 to the start of arr1</a:t>
-            </a:r>
-          </a:p>
-          <a:p>
-            <a:pPr algn="l" rtl="0"/>
-            <a:r>
-              <a:rPr lang="en-US" sz="2000" dirty="0" err="1"/>
-              <a:t>var</a:t>
+              <a:t>(…arr2) // adds arr2 to the start of arr1</a:t>
+            </a:r>
+          </a:p>
+          <a:p>
+            <a:pPr algn="l" rtl="0"/>
+            <a:r>
+              <a:rPr lang="en-US" sz="2000" dirty="0" smtClean="0"/>
+              <a:t>v</a:t>
+            </a:r>
+            <a:r>
+              <a:rPr lang="en-US" sz="2000" dirty="0" smtClean="0"/>
+              <a:t>ar arr1 </a:t>
             </a:r>
             <a:r>
               <a:rPr lang="en-US" sz="2000" dirty="0"/>
-              <a:t> arr1 = […arr2] // copy elements of arr2 to arr1</a:t>
-            </a:r>
-          </a:p>
-          <a:p>
-            <a:pPr algn="l" rtl="0"/>
-            <a:r>
-              <a:rPr lang="en-US" sz="2000" dirty="0" err="1"/>
-              <a:t>var</a:t>
+              <a:t>= […arr2] // copy elements of arr2 to arr1</a:t>
+            </a:r>
+          </a:p>
+          <a:p>
+            <a:pPr algn="l" rtl="0"/>
+            <a:r>
+              <a:rPr lang="en-US" sz="2000" dirty="0" smtClean="0"/>
+              <a:t>var arr1 </a:t>
             </a:r>
             <a:r>
               <a:rPr lang="en-US" sz="2000" dirty="0"/>
-              <a:t> arr1 = […arr2, …arr3, …arr4] // combining multiple arrays</a:t>
+              <a:t>= […arr2, …arr3, …arr4] // combining multiple arrays</a:t>
             </a:r>
           </a:p>
           <a:p>
@@ -7869,7 +7882,7 @@
     </p:spTree>
     <p:extLst>
       <p:ext uri="{BB962C8B-B14F-4D97-AF65-F5344CB8AC3E}">
-        <p14:creationId xmlns:p14="http://schemas.microsoft.com/office/powerpoint/2010/main" val="2795344761"/>
+        <p14:creationId xmlns:p14="http://schemas.microsoft.com/office/powerpoint/2010/main" xmlns="" val="2795344761"/>
       </p:ext>
     </p:extLst>
   </p:cSld>
@@ -8004,7 +8017,7 @@
           <p:cNvPr id="5" name="Picture 4" descr="A screenshot of a cell phone&#10;&#10;Description generated with high confidence">
             <a:extLst>
               <a:ext uri="{FF2B5EF4-FFF2-40B4-BE49-F238E27FC236}">
-                <a16:creationId xmlns:a16="http://schemas.microsoft.com/office/drawing/2014/main" id="{3F9F6D90-DA31-4E83-8B4E-72C344CC249E}"/>
+                <a16:creationId xmlns:a16="http://schemas.microsoft.com/office/drawing/2014/main" xmlns="" id="{3F9F6D90-DA31-4E83-8B4E-72C344CC249E}"/>
               </a:ext>
             </a:extLst>
           </p:cNvPr>
@@ -8014,10 +8027,10 @@
           <p:nvPr/>
         </p:nvPicPr>
         <p:blipFill>
-          <a:blip r:embed="rId2">
+          <a:blip r:embed="rId2" cstate="print">
             <a:extLst>
               <a:ext uri="{28A0092B-C50C-407E-A947-70E740481C1C}">
-                <a14:useLocalDpi xmlns:a14="http://schemas.microsoft.com/office/drawing/2010/main" val="0"/>
+                <a14:useLocalDpi xmlns:a14="http://schemas.microsoft.com/office/drawing/2010/main" xmlns="" val="0"/>
               </a:ext>
             </a:extLst>
           </a:blip>
@@ -8040,7 +8053,7 @@
           <p:cNvPr id="11" name="Picture 10" descr="A picture containing object, antenna&#10;&#10;Description generated with very high confidence">
             <a:extLst>
               <a:ext uri="{FF2B5EF4-FFF2-40B4-BE49-F238E27FC236}">
-                <a16:creationId xmlns:a16="http://schemas.microsoft.com/office/drawing/2014/main" id="{FB7D2C99-FAA4-4A95-B934-3E9309520ABD}"/>
+                <a16:creationId xmlns:a16="http://schemas.microsoft.com/office/drawing/2014/main" xmlns="" id="{FB7D2C99-FAA4-4A95-B934-3E9309520ABD}"/>
               </a:ext>
             </a:extLst>
           </p:cNvPr>
@@ -8050,10 +8063,10 @@
           <p:nvPr/>
         </p:nvPicPr>
         <p:blipFill>
-          <a:blip r:embed="rId3">
+          <a:blip r:embed="rId3" cstate="print">
             <a:extLst>
               <a:ext uri="{28A0092B-C50C-407E-A947-70E740481C1C}">
-                <a14:useLocalDpi xmlns:a14="http://schemas.microsoft.com/office/drawing/2010/main" val="0"/>
+                <a14:useLocalDpi xmlns:a14="http://schemas.microsoft.com/office/drawing/2010/main" xmlns="" val="0"/>
               </a:ext>
             </a:extLst>
           </a:blip>
@@ -8074,7 +8087,7 @@
     </p:spTree>
     <p:extLst>
       <p:ext uri="{BB962C8B-B14F-4D97-AF65-F5344CB8AC3E}">
-        <p14:creationId xmlns:p14="http://schemas.microsoft.com/office/powerpoint/2010/main" val="4272138416"/>
+        <p14:creationId xmlns:p14="http://schemas.microsoft.com/office/powerpoint/2010/main" xmlns="" val="4272138416"/>
       </p:ext>
     </p:extLst>
   </p:cSld>
@@ -8196,7 +8209,7 @@
           <p:cNvPr id="6" name="Picture 5">
             <a:extLst>
               <a:ext uri="{FF2B5EF4-FFF2-40B4-BE49-F238E27FC236}">
-                <a16:creationId xmlns:a16="http://schemas.microsoft.com/office/drawing/2014/main" id="{F0A4DFB6-74AF-4FA9-A852-4EC36876B9C5}"/>
+                <a16:creationId xmlns:a16="http://schemas.microsoft.com/office/drawing/2014/main" xmlns="" id="{F0A4DFB6-74AF-4FA9-A852-4EC36876B9C5}"/>
               </a:ext>
             </a:extLst>
           </p:cNvPr>
@@ -8206,10 +8219,10 @@
           <p:nvPr/>
         </p:nvPicPr>
         <p:blipFill>
-          <a:blip r:embed="rId2">
+          <a:blip r:embed="rId2" cstate="print">
             <a:extLst>
               <a:ext uri="{28A0092B-C50C-407E-A947-70E740481C1C}">
-                <a14:useLocalDpi xmlns:a14="http://schemas.microsoft.com/office/drawing/2010/main" val="0"/>
+                <a14:useLocalDpi xmlns:a14="http://schemas.microsoft.com/office/drawing/2010/main" xmlns="" val="0"/>
               </a:ext>
             </a:extLst>
           </a:blip>
@@ -8232,7 +8245,7 @@
           <p:cNvPr id="8" name="Picture 7" descr="A picture containing object&#10;&#10;Description generated with high confidence">
             <a:extLst>
               <a:ext uri="{FF2B5EF4-FFF2-40B4-BE49-F238E27FC236}">
-                <a16:creationId xmlns:a16="http://schemas.microsoft.com/office/drawing/2014/main" id="{FBADC85D-C1DF-401F-94E3-D206392BE851}"/>
+                <a16:creationId xmlns:a16="http://schemas.microsoft.com/office/drawing/2014/main" xmlns="" id="{FBADC85D-C1DF-401F-94E3-D206392BE851}"/>
               </a:ext>
             </a:extLst>
           </p:cNvPr>
@@ -8242,10 +8255,10 @@
           <p:nvPr/>
         </p:nvPicPr>
         <p:blipFill>
-          <a:blip r:embed="rId3">
+          <a:blip r:embed="rId3" cstate="print">
             <a:extLst>
               <a:ext uri="{28A0092B-C50C-407E-A947-70E740481C1C}">
-                <a14:useLocalDpi xmlns:a14="http://schemas.microsoft.com/office/drawing/2010/main" val="0"/>
+                <a14:useLocalDpi xmlns:a14="http://schemas.microsoft.com/office/drawing/2010/main" xmlns="" val="0"/>
               </a:ext>
             </a:extLst>
           </a:blip>
@@ -8266,7 +8279,7 @@
     </p:spTree>
     <p:extLst>
       <p:ext uri="{BB962C8B-B14F-4D97-AF65-F5344CB8AC3E}">
-        <p14:creationId xmlns:p14="http://schemas.microsoft.com/office/powerpoint/2010/main" val="3070450978"/>
+        <p14:creationId xmlns:p14="http://schemas.microsoft.com/office/powerpoint/2010/main" xmlns="" val="3070450978"/>
       </p:ext>
     </p:extLst>
   </p:cSld>
@@ -8362,7 +8375,7 @@
           <p:cNvPr id="5" name="Picture 4" descr="A screenshot of a cell phone&#10;&#10;Description generated with high confidence">
             <a:extLst>
               <a:ext uri="{FF2B5EF4-FFF2-40B4-BE49-F238E27FC236}">
-                <a16:creationId xmlns:a16="http://schemas.microsoft.com/office/drawing/2014/main" id="{DA995F42-1F05-46CF-929D-5BD94CA8E447}"/>
+                <a16:creationId xmlns:a16="http://schemas.microsoft.com/office/drawing/2014/main" xmlns="" id="{DA995F42-1F05-46CF-929D-5BD94CA8E447}"/>
               </a:ext>
             </a:extLst>
           </p:cNvPr>
@@ -8372,10 +8385,10 @@
           <p:nvPr/>
         </p:nvPicPr>
         <p:blipFill>
-          <a:blip r:embed="rId2">
+          <a:blip r:embed="rId2" cstate="print">
             <a:extLst>
               <a:ext uri="{28A0092B-C50C-407E-A947-70E740481C1C}">
-                <a14:useLocalDpi xmlns:a14="http://schemas.microsoft.com/office/drawing/2010/main" val="0"/>
+                <a14:useLocalDpi xmlns:a14="http://schemas.microsoft.com/office/drawing/2010/main" xmlns="" val="0"/>
               </a:ext>
             </a:extLst>
           </a:blip>
@@ -8398,7 +8411,7 @@
           <p:cNvPr id="9" name="Picture 8" descr="A close up of a logo&#10;&#10;Description generated with very high confidence">
             <a:extLst>
               <a:ext uri="{FF2B5EF4-FFF2-40B4-BE49-F238E27FC236}">
-                <a16:creationId xmlns:a16="http://schemas.microsoft.com/office/drawing/2014/main" id="{91DCFCB0-EA05-458A-BF6B-57EA465C1896}"/>
+                <a16:creationId xmlns:a16="http://schemas.microsoft.com/office/drawing/2014/main" xmlns="" id="{91DCFCB0-EA05-458A-BF6B-57EA465C1896}"/>
               </a:ext>
             </a:extLst>
           </p:cNvPr>
@@ -8408,10 +8421,10 @@
           <p:nvPr/>
         </p:nvPicPr>
         <p:blipFill>
-          <a:blip r:embed="rId3">
+          <a:blip r:embed="rId3" cstate="print">
             <a:extLst>
               <a:ext uri="{28A0092B-C50C-407E-A947-70E740481C1C}">
-                <a14:useLocalDpi xmlns:a14="http://schemas.microsoft.com/office/drawing/2010/main" val="0"/>
+                <a14:useLocalDpi xmlns:a14="http://schemas.microsoft.com/office/drawing/2010/main" xmlns="" val="0"/>
               </a:ext>
             </a:extLst>
           </a:blip>
@@ -8432,7 +8445,7 @@
     </p:spTree>
     <p:extLst>
       <p:ext uri="{BB962C8B-B14F-4D97-AF65-F5344CB8AC3E}">
-        <p14:creationId xmlns:p14="http://schemas.microsoft.com/office/powerpoint/2010/main" val="673806096"/>
+        <p14:creationId xmlns:p14="http://schemas.microsoft.com/office/powerpoint/2010/main" xmlns="" val="673806096"/>
       </p:ext>
     </p:extLst>
   </p:cSld>
@@ -8566,7 +8579,7 @@
           <p:cNvPr id="6" name="Picture 5">
             <a:extLst>
               <a:ext uri="{FF2B5EF4-FFF2-40B4-BE49-F238E27FC236}">
-                <a16:creationId xmlns:a16="http://schemas.microsoft.com/office/drawing/2014/main" id="{CA7007E2-F4BB-4A93-9306-E1814CD7740D}"/>
+                <a16:creationId xmlns:a16="http://schemas.microsoft.com/office/drawing/2014/main" xmlns="" id="{CA7007E2-F4BB-4A93-9306-E1814CD7740D}"/>
               </a:ext>
             </a:extLst>
           </p:cNvPr>
@@ -8576,10 +8589,10 @@
           <p:nvPr/>
         </p:nvPicPr>
         <p:blipFill>
-          <a:blip r:embed="rId2">
+          <a:blip r:embed="rId2" cstate="print">
             <a:extLst>
               <a:ext uri="{28A0092B-C50C-407E-A947-70E740481C1C}">
-                <a14:useLocalDpi xmlns:a14="http://schemas.microsoft.com/office/drawing/2010/main" val="0"/>
+                <a14:useLocalDpi xmlns:a14="http://schemas.microsoft.com/office/drawing/2010/main" xmlns="" val="0"/>
               </a:ext>
             </a:extLst>
           </a:blip>
@@ -8602,7 +8615,7 @@
           <p:cNvPr id="11" name="Picture 10" descr="A screenshot of a cell phone&#10;&#10;Description generated with high confidence">
             <a:extLst>
               <a:ext uri="{FF2B5EF4-FFF2-40B4-BE49-F238E27FC236}">
-                <a16:creationId xmlns:a16="http://schemas.microsoft.com/office/drawing/2014/main" id="{AD5AD4C7-C2AB-40F5-96CF-88B3788A5F14}"/>
+                <a16:creationId xmlns:a16="http://schemas.microsoft.com/office/drawing/2014/main" xmlns="" id="{AD5AD4C7-C2AB-40F5-96CF-88B3788A5F14}"/>
               </a:ext>
             </a:extLst>
           </p:cNvPr>
@@ -8612,10 +8625,10 @@
           <p:nvPr/>
         </p:nvPicPr>
         <p:blipFill>
-          <a:blip r:embed="rId3">
+          <a:blip r:embed="rId3" cstate="print">
             <a:extLst>
               <a:ext uri="{28A0092B-C50C-407E-A947-70E740481C1C}">
-                <a14:useLocalDpi xmlns:a14="http://schemas.microsoft.com/office/drawing/2010/main" val="0"/>
+                <a14:useLocalDpi xmlns:a14="http://schemas.microsoft.com/office/drawing/2010/main" xmlns="" val="0"/>
               </a:ext>
             </a:extLst>
           </a:blip>
@@ -8636,7 +8649,7 @@
     </p:spTree>
     <p:extLst>
       <p:ext uri="{BB962C8B-B14F-4D97-AF65-F5344CB8AC3E}">
-        <p14:creationId xmlns:p14="http://schemas.microsoft.com/office/powerpoint/2010/main" val="550696119"/>
+        <p14:creationId xmlns:p14="http://schemas.microsoft.com/office/powerpoint/2010/main" xmlns="" val="550696119"/>
       </p:ext>
     </p:extLst>
   </p:cSld>
@@ -8801,7 +8814,7 @@
           <p:cNvPr id="15" name="Content Placeholder 14" descr="A screenshot of a computer&#10;&#10;Description generated with high confidence">
             <a:extLst>
               <a:ext uri="{FF2B5EF4-FFF2-40B4-BE49-F238E27FC236}">
-                <a16:creationId xmlns:a16="http://schemas.microsoft.com/office/drawing/2014/main" id="{59F37A54-6A50-4C4E-BD79-BA2E6BEDF1CB}"/>
+                <a16:creationId xmlns:a16="http://schemas.microsoft.com/office/drawing/2014/main" xmlns="" id="{59F37A54-6A50-4C4E-BD79-BA2E6BEDF1CB}"/>
               </a:ext>
             </a:extLst>
           </p:cNvPr>
@@ -8813,10 +8826,10 @@
           </p:nvPr>
         </p:nvPicPr>
         <p:blipFill>
-          <a:blip r:embed="rId2">
+          <a:blip r:embed="rId2" cstate="print">
             <a:extLst>
               <a:ext uri="{28A0092B-C50C-407E-A947-70E740481C1C}">
-                <a14:useLocalDpi xmlns:a14="http://schemas.microsoft.com/office/drawing/2010/main" val="0"/>
+                <a14:useLocalDpi xmlns:a14="http://schemas.microsoft.com/office/drawing/2010/main" xmlns="" val="0"/>
               </a:ext>
             </a:extLst>
           </a:blip>
@@ -8834,7 +8847,7 @@
     </p:spTree>
     <p:extLst>
       <p:ext uri="{BB962C8B-B14F-4D97-AF65-F5344CB8AC3E}">
-        <p14:creationId xmlns:p14="http://schemas.microsoft.com/office/powerpoint/2010/main" val="2548415198"/>
+        <p14:creationId xmlns:p14="http://schemas.microsoft.com/office/powerpoint/2010/main" xmlns="" val="2548415198"/>
       </p:ext>
     </p:extLst>
   </p:cSld>
@@ -8891,7 +8904,7 @@
           <p:cNvPr id="4" name="Content Placeholder 3">
             <a:extLst>
               <a:ext uri="{FF2B5EF4-FFF2-40B4-BE49-F238E27FC236}">
-                <a16:creationId xmlns:a16="http://schemas.microsoft.com/office/drawing/2014/main" id="{D10F532C-291C-4424-AD42-7F2EA72E576C}"/>
+                <a16:creationId xmlns:a16="http://schemas.microsoft.com/office/drawing/2014/main" xmlns="" id="{D10F532C-291C-4424-AD42-7F2EA72E576C}"/>
               </a:ext>
             </a:extLst>
           </p:cNvPr>
@@ -8962,7 +8975,7 @@
     </p:spTree>
     <p:extLst>
       <p:ext uri="{BB962C8B-B14F-4D97-AF65-F5344CB8AC3E}">
-        <p14:creationId xmlns:p14="http://schemas.microsoft.com/office/powerpoint/2010/main" val="2420491585"/>
+        <p14:creationId xmlns:p14="http://schemas.microsoft.com/office/powerpoint/2010/main" xmlns="" val="2420491585"/>
       </p:ext>
     </p:extLst>
   </p:cSld>
@@ -9019,7 +9032,7 @@
           <p:cNvPr id="4" name="Content Placeholder 3">
             <a:extLst>
               <a:ext uri="{FF2B5EF4-FFF2-40B4-BE49-F238E27FC236}">
-                <a16:creationId xmlns:a16="http://schemas.microsoft.com/office/drawing/2014/main" id="{D10F532C-291C-4424-AD42-7F2EA72E576C}"/>
+                <a16:creationId xmlns:a16="http://schemas.microsoft.com/office/drawing/2014/main" xmlns="" id="{D10F532C-291C-4424-AD42-7F2EA72E576C}"/>
               </a:ext>
             </a:extLst>
           </p:cNvPr>
@@ -9065,7 +9078,7 @@
           <p:cNvPr id="5" name="Picture 4">
             <a:extLst>
               <a:ext uri="{FF2B5EF4-FFF2-40B4-BE49-F238E27FC236}">
-                <a16:creationId xmlns:a16="http://schemas.microsoft.com/office/drawing/2014/main" id="{7E9EAE57-CB78-4FEB-8EAB-0D33CA8EBD80}"/>
+                <a16:creationId xmlns:a16="http://schemas.microsoft.com/office/drawing/2014/main" xmlns="" id="{7E9EAE57-CB78-4FEB-8EAB-0D33CA8EBD80}"/>
               </a:ext>
             </a:extLst>
           </p:cNvPr>
@@ -9075,10 +9088,10 @@
           <p:nvPr/>
         </p:nvPicPr>
         <p:blipFill>
-          <a:blip r:embed="rId2">
+          <a:blip r:embed="rId2" cstate="print">
             <a:extLst>
               <a:ext uri="{28A0092B-C50C-407E-A947-70E740481C1C}">
-                <a14:useLocalDpi xmlns:a14="http://schemas.microsoft.com/office/drawing/2010/main" val="0"/>
+                <a14:useLocalDpi xmlns:a14="http://schemas.microsoft.com/office/drawing/2010/main" xmlns="" val="0"/>
               </a:ext>
             </a:extLst>
           </a:blip>
@@ -9101,7 +9114,7 @@
           <p:cNvPr id="7" name="Picture 6" descr="A screenshot of a cell phone&#10;&#10;Description generated with very high confidence">
             <a:extLst>
               <a:ext uri="{FF2B5EF4-FFF2-40B4-BE49-F238E27FC236}">
-                <a16:creationId xmlns:a16="http://schemas.microsoft.com/office/drawing/2014/main" id="{A22E32BE-F5A8-4A12-8723-2B50D48F9462}"/>
+                <a16:creationId xmlns:a16="http://schemas.microsoft.com/office/drawing/2014/main" xmlns="" id="{A22E32BE-F5A8-4A12-8723-2B50D48F9462}"/>
               </a:ext>
             </a:extLst>
           </p:cNvPr>
@@ -9111,10 +9124,10 @@
           <p:nvPr/>
         </p:nvPicPr>
         <p:blipFill>
-          <a:blip r:embed="rId3">
+          <a:blip r:embed="rId3" cstate="print">
             <a:extLst>
               <a:ext uri="{28A0092B-C50C-407E-A947-70E740481C1C}">
-                <a14:useLocalDpi xmlns:a14="http://schemas.microsoft.com/office/drawing/2010/main" val="0"/>
+                <a14:useLocalDpi xmlns:a14="http://schemas.microsoft.com/office/drawing/2010/main" xmlns="" val="0"/>
               </a:ext>
             </a:extLst>
           </a:blip>
@@ -9135,7 +9148,7 @@
     </p:spTree>
     <p:extLst>
       <p:ext uri="{BB962C8B-B14F-4D97-AF65-F5344CB8AC3E}">
-        <p14:creationId xmlns:p14="http://schemas.microsoft.com/office/powerpoint/2010/main" val="3296673921"/>
+        <p14:creationId xmlns:p14="http://schemas.microsoft.com/office/powerpoint/2010/main" xmlns="" val="3296673921"/>
       </p:ext>
     </p:extLst>
   </p:cSld>
@@ -9167,7 +9180,7 @@
           <p:cNvPr id="2" name="Title 1">
             <a:extLst>
               <a:ext uri="{FF2B5EF4-FFF2-40B4-BE49-F238E27FC236}">
-                <a16:creationId xmlns:a16="http://schemas.microsoft.com/office/drawing/2014/main" id="{562C69D3-72AE-4D1A-903B-15355CAC6E81}"/>
+                <a16:creationId xmlns:a16="http://schemas.microsoft.com/office/drawing/2014/main" xmlns="" id="{562C69D3-72AE-4D1A-903B-15355CAC6E81}"/>
               </a:ext>
             </a:extLst>
           </p:cNvPr>
@@ -9198,7 +9211,7 @@
           <p:cNvPr id="3" name="Content Placeholder 2">
             <a:extLst>
               <a:ext uri="{FF2B5EF4-FFF2-40B4-BE49-F238E27FC236}">
-                <a16:creationId xmlns:a16="http://schemas.microsoft.com/office/drawing/2014/main" id="{3AB0ED87-3538-4957-875E-DEA297FEE413}"/>
+                <a16:creationId xmlns:a16="http://schemas.microsoft.com/office/drawing/2014/main" xmlns="" id="{3AB0ED87-3538-4957-875E-DEA297FEE413}"/>
               </a:ext>
             </a:extLst>
           </p:cNvPr>
@@ -9321,7 +9334,7 @@
           <p:cNvPr id="5" name="Picture 4" descr="A black sign with white text&#10;&#10;Description generated with high confidence">
             <a:extLst>
               <a:ext uri="{FF2B5EF4-FFF2-40B4-BE49-F238E27FC236}">
-                <a16:creationId xmlns:a16="http://schemas.microsoft.com/office/drawing/2014/main" id="{845D07C1-A75C-49C0-818F-A8BAFED796DF}"/>
+                <a16:creationId xmlns:a16="http://schemas.microsoft.com/office/drawing/2014/main" xmlns="" id="{845D07C1-A75C-49C0-818F-A8BAFED796DF}"/>
               </a:ext>
             </a:extLst>
           </p:cNvPr>
@@ -9331,10 +9344,10 @@
           <p:nvPr/>
         </p:nvPicPr>
         <p:blipFill>
-          <a:blip r:embed="rId2">
+          <a:blip r:embed="rId2" cstate="print">
             <a:extLst>
               <a:ext uri="{28A0092B-C50C-407E-A947-70E740481C1C}">
-                <a14:useLocalDpi xmlns:a14="http://schemas.microsoft.com/office/drawing/2010/main" val="0"/>
+                <a14:useLocalDpi xmlns:a14="http://schemas.microsoft.com/office/drawing/2010/main" xmlns="" val="0"/>
               </a:ext>
             </a:extLst>
           </a:blip>
@@ -9357,7 +9370,7 @@
           <p:cNvPr id="7" name="Picture 6" descr="A black sign with white text&#10;&#10;Description generated with high confidence">
             <a:extLst>
               <a:ext uri="{FF2B5EF4-FFF2-40B4-BE49-F238E27FC236}">
-                <a16:creationId xmlns:a16="http://schemas.microsoft.com/office/drawing/2014/main" id="{E7261C2E-A31C-42E1-B111-1C671C85BD72}"/>
+                <a16:creationId xmlns:a16="http://schemas.microsoft.com/office/drawing/2014/main" xmlns="" id="{E7261C2E-A31C-42E1-B111-1C671C85BD72}"/>
               </a:ext>
             </a:extLst>
           </p:cNvPr>
@@ -9367,10 +9380,10 @@
           <p:nvPr/>
         </p:nvPicPr>
         <p:blipFill>
-          <a:blip r:embed="rId3">
+          <a:blip r:embed="rId3" cstate="print">
             <a:extLst>
               <a:ext uri="{28A0092B-C50C-407E-A947-70E740481C1C}">
-                <a14:useLocalDpi xmlns:a14="http://schemas.microsoft.com/office/drawing/2010/main" val="0"/>
+                <a14:useLocalDpi xmlns:a14="http://schemas.microsoft.com/office/drawing/2010/main" xmlns="" val="0"/>
               </a:ext>
             </a:extLst>
           </a:blip>
@@ -9391,7 +9404,7 @@
     </p:spTree>
     <p:extLst>
       <p:ext uri="{BB962C8B-B14F-4D97-AF65-F5344CB8AC3E}">
-        <p14:creationId xmlns:p14="http://schemas.microsoft.com/office/powerpoint/2010/main" val="3254600149"/>
+        <p14:creationId xmlns:p14="http://schemas.microsoft.com/office/powerpoint/2010/main" xmlns="" val="3254600149"/>
       </p:ext>
     </p:extLst>
   </p:cSld>
@@ -9423,7 +9436,7 @@
           <p:cNvPr id="2" name="Title 1">
             <a:extLst>
               <a:ext uri="{FF2B5EF4-FFF2-40B4-BE49-F238E27FC236}">
-                <a16:creationId xmlns:a16="http://schemas.microsoft.com/office/drawing/2014/main" id="{562C69D3-72AE-4D1A-903B-15355CAC6E81}"/>
+                <a16:creationId xmlns:a16="http://schemas.microsoft.com/office/drawing/2014/main" xmlns="" id="{562C69D3-72AE-4D1A-903B-15355CAC6E81}"/>
               </a:ext>
             </a:extLst>
           </p:cNvPr>
@@ -9454,7 +9467,7 @@
           <p:cNvPr id="3" name="Content Placeholder 2">
             <a:extLst>
               <a:ext uri="{FF2B5EF4-FFF2-40B4-BE49-F238E27FC236}">
-                <a16:creationId xmlns:a16="http://schemas.microsoft.com/office/drawing/2014/main" id="{3AB0ED87-3538-4957-875E-DEA297FEE413}"/>
+                <a16:creationId xmlns:a16="http://schemas.microsoft.com/office/drawing/2014/main" xmlns="" id="{3AB0ED87-3538-4957-875E-DEA297FEE413}"/>
               </a:ext>
             </a:extLst>
           </p:cNvPr>
@@ -9529,7 +9542,7 @@
           <p:cNvPr id="5" name="Picture 4">
             <a:extLst>
               <a:ext uri="{FF2B5EF4-FFF2-40B4-BE49-F238E27FC236}">
-                <a16:creationId xmlns:a16="http://schemas.microsoft.com/office/drawing/2014/main" id="{1F80BDA8-C689-4AB0-A635-3592F969E174}"/>
+                <a16:creationId xmlns:a16="http://schemas.microsoft.com/office/drawing/2014/main" xmlns="" id="{1F80BDA8-C689-4AB0-A635-3592F969E174}"/>
               </a:ext>
             </a:extLst>
           </p:cNvPr>
@@ -9539,10 +9552,10 @@
           <p:nvPr/>
         </p:nvPicPr>
         <p:blipFill>
-          <a:blip r:embed="rId2">
+          <a:blip r:embed="rId2" cstate="print">
             <a:extLst>
               <a:ext uri="{28A0092B-C50C-407E-A947-70E740481C1C}">
-                <a14:useLocalDpi xmlns:a14="http://schemas.microsoft.com/office/drawing/2010/main" val="0"/>
+                <a14:useLocalDpi xmlns:a14="http://schemas.microsoft.com/office/drawing/2010/main" xmlns="" val="0"/>
               </a:ext>
             </a:extLst>
           </a:blip>
@@ -9565,7 +9578,7 @@
           <p:cNvPr id="6" name="Picture 5" descr="A picture containing indoor&#10;&#10;Description generated with high confidence">
             <a:extLst>
               <a:ext uri="{FF2B5EF4-FFF2-40B4-BE49-F238E27FC236}">
-                <a16:creationId xmlns:a16="http://schemas.microsoft.com/office/drawing/2014/main" id="{D495E4D6-0A74-4E10-A892-B0415078A6AA}"/>
+                <a16:creationId xmlns:a16="http://schemas.microsoft.com/office/drawing/2014/main" xmlns="" id="{D495E4D6-0A74-4E10-A892-B0415078A6AA}"/>
               </a:ext>
             </a:extLst>
           </p:cNvPr>
@@ -9575,10 +9588,10 @@
           <p:nvPr/>
         </p:nvPicPr>
         <p:blipFill>
-          <a:blip r:embed="rId3">
+          <a:blip r:embed="rId3" cstate="print">
             <a:extLst>
               <a:ext uri="{28A0092B-C50C-407E-A947-70E740481C1C}">
-                <a14:useLocalDpi xmlns:a14="http://schemas.microsoft.com/office/drawing/2010/main" val="0"/>
+                <a14:useLocalDpi xmlns:a14="http://schemas.microsoft.com/office/drawing/2010/main" xmlns="" val="0"/>
               </a:ext>
             </a:extLst>
           </a:blip>
@@ -9599,7 +9612,7 @@
     </p:spTree>
     <p:extLst>
       <p:ext uri="{BB962C8B-B14F-4D97-AF65-F5344CB8AC3E}">
-        <p14:creationId xmlns:p14="http://schemas.microsoft.com/office/powerpoint/2010/main" val="4150304393"/>
+        <p14:creationId xmlns:p14="http://schemas.microsoft.com/office/powerpoint/2010/main" xmlns="" val="4150304393"/>
       </p:ext>
     </p:extLst>
   </p:cSld>
@@ -9631,7 +9644,7 @@
           <p:cNvPr id="2" name="Title 1">
             <a:extLst>
               <a:ext uri="{FF2B5EF4-FFF2-40B4-BE49-F238E27FC236}">
-                <a16:creationId xmlns:a16="http://schemas.microsoft.com/office/drawing/2014/main" id="{562C69D3-72AE-4D1A-903B-15355CAC6E81}"/>
+                <a16:creationId xmlns:a16="http://schemas.microsoft.com/office/drawing/2014/main" xmlns="" id="{562C69D3-72AE-4D1A-903B-15355CAC6E81}"/>
               </a:ext>
             </a:extLst>
           </p:cNvPr>
@@ -9662,7 +9675,7 @@
           <p:cNvPr id="3" name="Content Placeholder 2">
             <a:extLst>
               <a:ext uri="{FF2B5EF4-FFF2-40B4-BE49-F238E27FC236}">
-                <a16:creationId xmlns:a16="http://schemas.microsoft.com/office/drawing/2014/main" id="{3AB0ED87-3538-4957-875E-DEA297FEE413}"/>
+                <a16:creationId xmlns:a16="http://schemas.microsoft.com/office/drawing/2014/main" xmlns="" id="{3AB0ED87-3538-4957-875E-DEA297FEE413}"/>
               </a:ext>
             </a:extLst>
           </p:cNvPr>
@@ -9749,7 +9762,7 @@
     </p:spTree>
     <p:extLst>
       <p:ext uri="{BB962C8B-B14F-4D97-AF65-F5344CB8AC3E}">
-        <p14:creationId xmlns:p14="http://schemas.microsoft.com/office/powerpoint/2010/main" val="4015262510"/>
+        <p14:creationId xmlns:p14="http://schemas.microsoft.com/office/powerpoint/2010/main" xmlns="" val="4015262510"/>
       </p:ext>
     </p:extLst>
   </p:cSld>
@@ -9781,7 +9794,7 @@
           <p:cNvPr id="2" name="Title 1">
             <a:extLst>
               <a:ext uri="{FF2B5EF4-FFF2-40B4-BE49-F238E27FC236}">
-                <a16:creationId xmlns:a16="http://schemas.microsoft.com/office/drawing/2014/main" id="{562C69D3-72AE-4D1A-903B-15355CAC6E81}"/>
+                <a16:creationId xmlns:a16="http://schemas.microsoft.com/office/drawing/2014/main" xmlns="" id="{562C69D3-72AE-4D1A-903B-15355CAC6E81}"/>
               </a:ext>
             </a:extLst>
           </p:cNvPr>
@@ -9812,7 +9825,7 @@
           <p:cNvPr id="5" name="Content Placeholder 4" descr="A screenshot of a cell phone&#10;&#10;Description generated with very high confidence">
             <a:extLst>
               <a:ext uri="{FF2B5EF4-FFF2-40B4-BE49-F238E27FC236}">
-                <a16:creationId xmlns:a16="http://schemas.microsoft.com/office/drawing/2014/main" id="{8ABC9A22-ABCC-4FBF-85A0-6908BC461883}"/>
+                <a16:creationId xmlns:a16="http://schemas.microsoft.com/office/drawing/2014/main" xmlns="" id="{8ABC9A22-ABCC-4FBF-85A0-6908BC461883}"/>
               </a:ext>
             </a:extLst>
           </p:cNvPr>
@@ -9824,10 +9837,10 @@
           </p:nvPr>
         </p:nvPicPr>
         <p:blipFill>
-          <a:blip r:embed="rId2">
+          <a:blip r:embed="rId2" cstate="print">
             <a:extLst>
               <a:ext uri="{28A0092B-C50C-407E-A947-70E740481C1C}">
-                <a14:useLocalDpi xmlns:a14="http://schemas.microsoft.com/office/drawing/2010/main" val="0"/>
+                <a14:useLocalDpi xmlns:a14="http://schemas.microsoft.com/office/drawing/2010/main" xmlns="" val="0"/>
               </a:ext>
             </a:extLst>
           </a:blip>
@@ -9847,7 +9860,7 @@
           <p:cNvPr id="6" name="Rectangle 5">
             <a:extLst>
               <a:ext uri="{FF2B5EF4-FFF2-40B4-BE49-F238E27FC236}">
-                <a16:creationId xmlns:a16="http://schemas.microsoft.com/office/drawing/2014/main" id="{A282A978-4FEE-4CB8-B9D7-06D85291FFAA}"/>
+                <a16:creationId xmlns:a16="http://schemas.microsoft.com/office/drawing/2014/main" xmlns="" id="{A282A978-4FEE-4CB8-B9D7-06D85291FFAA}"/>
               </a:ext>
             </a:extLst>
           </p:cNvPr>
@@ -9886,7 +9899,7 @@
     </p:spTree>
     <p:extLst>
       <p:ext uri="{BB962C8B-B14F-4D97-AF65-F5344CB8AC3E}">
-        <p14:creationId xmlns:p14="http://schemas.microsoft.com/office/powerpoint/2010/main" val="615500950"/>
+        <p14:creationId xmlns:p14="http://schemas.microsoft.com/office/powerpoint/2010/main" xmlns="" val="615500950"/>
       </p:ext>
     </p:extLst>
   </p:cSld>
@@ -9918,7 +9931,7 @@
           <p:cNvPr id="2" name="Title 1">
             <a:extLst>
               <a:ext uri="{FF2B5EF4-FFF2-40B4-BE49-F238E27FC236}">
-                <a16:creationId xmlns:a16="http://schemas.microsoft.com/office/drawing/2014/main" id="{562C69D3-72AE-4D1A-903B-15355CAC6E81}"/>
+                <a16:creationId xmlns:a16="http://schemas.microsoft.com/office/drawing/2014/main" xmlns="" id="{562C69D3-72AE-4D1A-903B-15355CAC6E81}"/>
               </a:ext>
             </a:extLst>
           </p:cNvPr>
@@ -9949,7 +9962,7 @@
           <p:cNvPr id="4" name="Content Placeholder 3">
             <a:extLst>
               <a:ext uri="{FF2B5EF4-FFF2-40B4-BE49-F238E27FC236}">
-                <a16:creationId xmlns:a16="http://schemas.microsoft.com/office/drawing/2014/main" id="{4E16AD08-9757-44E6-9F27-5C22032A8853}"/>
+                <a16:creationId xmlns:a16="http://schemas.microsoft.com/office/drawing/2014/main" xmlns="" id="{4E16AD08-9757-44E6-9F27-5C22032A8853}"/>
               </a:ext>
             </a:extLst>
           </p:cNvPr>
@@ -10001,7 +10014,7 @@
           <p:cNvPr id="6" name="Picture 5">
             <a:extLst>
               <a:ext uri="{FF2B5EF4-FFF2-40B4-BE49-F238E27FC236}">
-                <a16:creationId xmlns:a16="http://schemas.microsoft.com/office/drawing/2014/main" id="{930ECF1B-E407-4B59-A85F-F0BD84E06C14}"/>
+                <a16:creationId xmlns:a16="http://schemas.microsoft.com/office/drawing/2014/main" xmlns="" id="{930ECF1B-E407-4B59-A85F-F0BD84E06C14}"/>
               </a:ext>
             </a:extLst>
           </p:cNvPr>
@@ -10011,7 +10024,7 @@
           <p:nvPr/>
         </p:nvPicPr>
         <p:blipFill>
-          <a:blip r:embed="rId2"/>
+          <a:blip r:embed="rId2" cstate="print"/>
           <a:stretch>
             <a:fillRect/>
           </a:stretch>
@@ -10029,7 +10042,7 @@
     </p:spTree>
     <p:extLst>
       <p:ext uri="{BB962C8B-B14F-4D97-AF65-F5344CB8AC3E}">
-        <p14:creationId xmlns:p14="http://schemas.microsoft.com/office/powerpoint/2010/main" val="2554437475"/>
+        <p14:creationId xmlns:p14="http://schemas.microsoft.com/office/powerpoint/2010/main" xmlns="" val="2554437475"/>
       </p:ext>
     </p:extLst>
   </p:cSld>
@@ -10061,7 +10074,7 @@
           <p:cNvPr id="2" name="Title 1">
             <a:extLst>
               <a:ext uri="{FF2B5EF4-FFF2-40B4-BE49-F238E27FC236}">
-                <a16:creationId xmlns:a16="http://schemas.microsoft.com/office/drawing/2014/main" id="{562C69D3-72AE-4D1A-903B-15355CAC6E81}"/>
+                <a16:creationId xmlns:a16="http://schemas.microsoft.com/office/drawing/2014/main" xmlns="" id="{562C69D3-72AE-4D1A-903B-15355CAC6E81}"/>
               </a:ext>
             </a:extLst>
           </p:cNvPr>
@@ -10092,7 +10105,7 @@
           <p:cNvPr id="4" name="Content Placeholder 3">
             <a:extLst>
               <a:ext uri="{FF2B5EF4-FFF2-40B4-BE49-F238E27FC236}">
-                <a16:creationId xmlns:a16="http://schemas.microsoft.com/office/drawing/2014/main" id="{4E16AD08-9757-44E6-9F27-5C22032A8853}"/>
+                <a16:creationId xmlns:a16="http://schemas.microsoft.com/office/drawing/2014/main" xmlns="" id="{4E16AD08-9757-44E6-9F27-5C22032A8853}"/>
               </a:ext>
             </a:extLst>
           </p:cNvPr>
@@ -10123,7 +10136,7 @@
           <p:cNvPr id="5" name="Picture 4" descr="A screenshot of a social media post&#10;&#10;Description generated with very high confidence">
             <a:extLst>
               <a:ext uri="{FF2B5EF4-FFF2-40B4-BE49-F238E27FC236}">
-                <a16:creationId xmlns:a16="http://schemas.microsoft.com/office/drawing/2014/main" id="{9DE2B86F-A686-436F-98D4-D1BE241AFC73}"/>
+                <a16:creationId xmlns:a16="http://schemas.microsoft.com/office/drawing/2014/main" xmlns="" id="{9DE2B86F-A686-436F-98D4-D1BE241AFC73}"/>
               </a:ext>
             </a:extLst>
           </p:cNvPr>
@@ -10133,10 +10146,10 @@
           <p:nvPr/>
         </p:nvPicPr>
         <p:blipFill>
-          <a:blip r:embed="rId2">
+          <a:blip r:embed="rId2" cstate="print">
             <a:extLst>
               <a:ext uri="{28A0092B-C50C-407E-A947-70E740481C1C}">
-                <a14:useLocalDpi xmlns:a14="http://schemas.microsoft.com/office/drawing/2010/main" val="0"/>
+                <a14:useLocalDpi xmlns:a14="http://schemas.microsoft.com/office/drawing/2010/main" xmlns="" val="0"/>
               </a:ext>
             </a:extLst>
           </a:blip>
@@ -10157,7 +10170,7 @@
     </p:spTree>
     <p:extLst>
       <p:ext uri="{BB962C8B-B14F-4D97-AF65-F5344CB8AC3E}">
-        <p14:creationId xmlns:p14="http://schemas.microsoft.com/office/powerpoint/2010/main" val="2358108310"/>
+        <p14:creationId xmlns:p14="http://schemas.microsoft.com/office/powerpoint/2010/main" xmlns="" val="2358108310"/>
       </p:ext>
     </p:extLst>
   </p:cSld>
@@ -10189,7 +10202,7 @@
           <p:cNvPr id="2" name="Title 1">
             <a:extLst>
               <a:ext uri="{FF2B5EF4-FFF2-40B4-BE49-F238E27FC236}">
-                <a16:creationId xmlns:a16="http://schemas.microsoft.com/office/drawing/2014/main" id="{562C69D3-72AE-4D1A-903B-15355CAC6E81}"/>
+                <a16:creationId xmlns:a16="http://schemas.microsoft.com/office/drawing/2014/main" xmlns="" id="{562C69D3-72AE-4D1A-903B-15355CAC6E81}"/>
               </a:ext>
             </a:extLst>
           </p:cNvPr>
@@ -10220,7 +10233,7 @@
           <p:cNvPr id="4" name="Content Placeholder 3">
             <a:extLst>
               <a:ext uri="{FF2B5EF4-FFF2-40B4-BE49-F238E27FC236}">
-                <a16:creationId xmlns:a16="http://schemas.microsoft.com/office/drawing/2014/main" id="{4E16AD08-9757-44E6-9F27-5C22032A8853}"/>
+                <a16:creationId xmlns:a16="http://schemas.microsoft.com/office/drawing/2014/main" xmlns="" id="{4E16AD08-9757-44E6-9F27-5C22032A8853}"/>
               </a:ext>
             </a:extLst>
           </p:cNvPr>
@@ -10332,7 +10345,7 @@
     </p:spTree>
     <p:extLst>
       <p:ext uri="{BB962C8B-B14F-4D97-AF65-F5344CB8AC3E}">
-        <p14:creationId xmlns:p14="http://schemas.microsoft.com/office/powerpoint/2010/main" val="3206544684"/>
+        <p14:creationId xmlns:p14="http://schemas.microsoft.com/office/powerpoint/2010/main" xmlns="" val="3206544684"/>
       </p:ext>
     </p:extLst>
   </p:cSld>
@@ -10527,7 +10540,7 @@
           <p:cNvPr id="2" name="Title 1">
             <a:extLst>
               <a:ext uri="{FF2B5EF4-FFF2-40B4-BE49-F238E27FC236}">
-                <a16:creationId xmlns:a16="http://schemas.microsoft.com/office/drawing/2014/main" id="{562C69D3-72AE-4D1A-903B-15355CAC6E81}"/>
+                <a16:creationId xmlns:a16="http://schemas.microsoft.com/office/drawing/2014/main" xmlns="" id="{562C69D3-72AE-4D1A-903B-15355CAC6E81}"/>
               </a:ext>
             </a:extLst>
           </p:cNvPr>
@@ -10558,7 +10571,7 @@
           <p:cNvPr id="4" name="Content Placeholder 3">
             <a:extLst>
               <a:ext uri="{FF2B5EF4-FFF2-40B4-BE49-F238E27FC236}">
-                <a16:creationId xmlns:a16="http://schemas.microsoft.com/office/drawing/2014/main" id="{4E16AD08-9757-44E6-9F27-5C22032A8853}"/>
+                <a16:creationId xmlns:a16="http://schemas.microsoft.com/office/drawing/2014/main" xmlns="" id="{4E16AD08-9757-44E6-9F27-5C22032A8853}"/>
               </a:ext>
             </a:extLst>
           </p:cNvPr>
@@ -10651,44 +10664,40 @@
       </p:sp>
       <p:pic>
         <p:nvPicPr>
-          <p:cNvPr id="6" name="Picture 5" descr="A picture containing screenshot&#10;&#10;Description generated with high confidence">
-            <a:extLst>
-              <a:ext uri="{FF2B5EF4-FFF2-40B4-BE49-F238E27FC236}">
-                <a16:creationId xmlns:a16="http://schemas.microsoft.com/office/drawing/2014/main" id="{07DF4370-E3A3-4182-B6C6-3E7C5504D8E4}"/>
-              </a:ext>
-            </a:extLst>
-          </p:cNvPr>
+          <p:cNvPr id="1026" name="Picture 2"/>
           <p:cNvPicPr>
-            <a:picLocks noChangeAspect="1"/>
+            <a:picLocks noChangeAspect="1" noChangeArrowheads="1"/>
           </p:cNvPicPr>
           <p:nvPr/>
         </p:nvPicPr>
         <p:blipFill>
-          <a:blip r:embed="rId2">
-            <a:extLst>
-              <a:ext uri="{28A0092B-C50C-407E-A947-70E740481C1C}">
-                <a14:useLocalDpi xmlns:a14="http://schemas.microsoft.com/office/drawing/2010/main" val="0"/>
-              </a:ext>
-            </a:extLst>
-          </a:blip>
+          <a:blip r:embed="rId2" cstate="print"/>
+          <a:srcRect/>
           <a:stretch>
             <a:fillRect/>
           </a:stretch>
         </p:blipFill>
-        <p:spPr>
+        <p:spPr bwMode="auto">
           <a:xfrm>
-            <a:off x="762000" y="3200400"/>
-            <a:ext cx="4389500" cy="3002540"/>
+            <a:off x="838200" y="3048000"/>
+            <a:ext cx="4162425" cy="2857500"/>
           </a:xfrm>
           <a:prstGeom prst="rect">
             <a:avLst/>
           </a:prstGeom>
+          <a:noFill/>
+          <a:ln w="9525">
+            <a:noFill/>
+            <a:miter lim="800000"/>
+            <a:headEnd/>
+            <a:tailEnd/>
+          </a:ln>
         </p:spPr>
       </p:pic>
     </p:spTree>
     <p:extLst>
       <p:ext uri="{BB962C8B-B14F-4D97-AF65-F5344CB8AC3E}">
-        <p14:creationId xmlns:p14="http://schemas.microsoft.com/office/powerpoint/2010/main" val="998836353"/>
+        <p14:creationId xmlns:p14="http://schemas.microsoft.com/office/powerpoint/2010/main" xmlns="" val="998836353"/>
       </p:ext>
     </p:extLst>
   </p:cSld>
@@ -10720,7 +10729,7 @@
           <p:cNvPr id="2" name="Title 1">
             <a:extLst>
               <a:ext uri="{FF2B5EF4-FFF2-40B4-BE49-F238E27FC236}">
-                <a16:creationId xmlns:a16="http://schemas.microsoft.com/office/drawing/2014/main" id="{562C69D3-72AE-4D1A-903B-15355CAC6E81}"/>
+                <a16:creationId xmlns:a16="http://schemas.microsoft.com/office/drawing/2014/main" xmlns="" id="{562C69D3-72AE-4D1A-903B-15355CAC6E81}"/>
               </a:ext>
             </a:extLst>
           </p:cNvPr>
@@ -10751,7 +10760,7 @@
           <p:cNvPr id="4" name="Content Placeholder 3">
             <a:extLst>
               <a:ext uri="{FF2B5EF4-FFF2-40B4-BE49-F238E27FC236}">
-                <a16:creationId xmlns:a16="http://schemas.microsoft.com/office/drawing/2014/main" id="{4E16AD08-9757-44E6-9F27-5C22032A8853}"/>
+                <a16:creationId xmlns:a16="http://schemas.microsoft.com/office/drawing/2014/main" xmlns="" id="{4E16AD08-9757-44E6-9F27-5C22032A8853}"/>
               </a:ext>
             </a:extLst>
           </p:cNvPr>
@@ -10860,7 +10869,7 @@
     </p:spTree>
     <p:extLst>
       <p:ext uri="{BB962C8B-B14F-4D97-AF65-F5344CB8AC3E}">
-        <p14:creationId xmlns:p14="http://schemas.microsoft.com/office/powerpoint/2010/main" val="879855724"/>
+        <p14:creationId xmlns:p14="http://schemas.microsoft.com/office/powerpoint/2010/main" xmlns="" val="879855724"/>
       </p:ext>
     </p:extLst>
   </p:cSld>
@@ -10892,7 +10901,7 @@
           <p:cNvPr id="2" name="Title 1">
             <a:extLst>
               <a:ext uri="{FF2B5EF4-FFF2-40B4-BE49-F238E27FC236}">
-                <a16:creationId xmlns:a16="http://schemas.microsoft.com/office/drawing/2014/main" id="{562C69D3-72AE-4D1A-903B-15355CAC6E81}"/>
+                <a16:creationId xmlns:a16="http://schemas.microsoft.com/office/drawing/2014/main" xmlns="" id="{562C69D3-72AE-4D1A-903B-15355CAC6E81}"/>
               </a:ext>
             </a:extLst>
           </p:cNvPr>
@@ -10923,7 +10932,7 @@
           <p:cNvPr id="7" name="Content Placeholder 6">
             <a:extLst>
               <a:ext uri="{FF2B5EF4-FFF2-40B4-BE49-F238E27FC236}">
-                <a16:creationId xmlns:a16="http://schemas.microsoft.com/office/drawing/2014/main" id="{68D05B38-F585-4758-B4C1-0D42E95590A5}"/>
+                <a16:creationId xmlns:a16="http://schemas.microsoft.com/office/drawing/2014/main" xmlns="" id="{68D05B38-F585-4758-B4C1-0D42E95590A5}"/>
               </a:ext>
             </a:extLst>
           </p:cNvPr>
@@ -10952,7 +10961,7 @@
           <p:cNvPr id="9" name="Picture 8" descr="A screenshot of a cell phone&#10;&#10;Description generated with very high confidence">
             <a:extLst>
               <a:ext uri="{FF2B5EF4-FFF2-40B4-BE49-F238E27FC236}">
-                <a16:creationId xmlns:a16="http://schemas.microsoft.com/office/drawing/2014/main" id="{30268BBF-0484-4C2A-807B-B93D738694F1}"/>
+                <a16:creationId xmlns:a16="http://schemas.microsoft.com/office/drawing/2014/main" xmlns="" id="{30268BBF-0484-4C2A-807B-B93D738694F1}"/>
               </a:ext>
             </a:extLst>
           </p:cNvPr>
@@ -10962,10 +10971,10 @@
           <p:nvPr/>
         </p:nvPicPr>
         <p:blipFill>
-          <a:blip r:embed="rId2">
+          <a:blip r:embed="rId2" cstate="print">
             <a:extLst>
               <a:ext uri="{28A0092B-C50C-407E-A947-70E740481C1C}">
-                <a14:useLocalDpi xmlns:a14="http://schemas.microsoft.com/office/drawing/2010/main" val="0"/>
+                <a14:useLocalDpi xmlns:a14="http://schemas.microsoft.com/office/drawing/2010/main" xmlns="" val="0"/>
               </a:ext>
             </a:extLst>
           </a:blip>
@@ -10986,7 +10995,7 @@
     </p:spTree>
     <p:extLst>
       <p:ext uri="{BB962C8B-B14F-4D97-AF65-F5344CB8AC3E}">
-        <p14:creationId xmlns:p14="http://schemas.microsoft.com/office/powerpoint/2010/main" val="760806596"/>
+        <p14:creationId xmlns:p14="http://schemas.microsoft.com/office/powerpoint/2010/main" xmlns="" val="760806596"/>
       </p:ext>
     </p:extLst>
   </p:cSld>
@@ -11018,7 +11027,7 @@
           <p:cNvPr id="2" name="Title 1">
             <a:extLst>
               <a:ext uri="{FF2B5EF4-FFF2-40B4-BE49-F238E27FC236}">
-                <a16:creationId xmlns:a16="http://schemas.microsoft.com/office/drawing/2014/main" id="{562C69D3-72AE-4D1A-903B-15355CAC6E81}"/>
+                <a16:creationId xmlns:a16="http://schemas.microsoft.com/office/drawing/2014/main" xmlns="" id="{562C69D3-72AE-4D1A-903B-15355CAC6E81}"/>
               </a:ext>
             </a:extLst>
           </p:cNvPr>
@@ -11049,7 +11058,7 @@
           <p:cNvPr id="7" name="Content Placeholder 6">
             <a:extLst>
               <a:ext uri="{FF2B5EF4-FFF2-40B4-BE49-F238E27FC236}">
-                <a16:creationId xmlns:a16="http://schemas.microsoft.com/office/drawing/2014/main" id="{68D05B38-F585-4758-B4C1-0D42E95590A5}"/>
+                <a16:creationId xmlns:a16="http://schemas.microsoft.com/office/drawing/2014/main" xmlns="" id="{68D05B38-F585-4758-B4C1-0D42E95590A5}"/>
               </a:ext>
             </a:extLst>
           </p:cNvPr>
@@ -11148,7 +11157,7 @@
     </p:spTree>
     <p:extLst>
       <p:ext uri="{BB962C8B-B14F-4D97-AF65-F5344CB8AC3E}">
-        <p14:creationId xmlns:p14="http://schemas.microsoft.com/office/powerpoint/2010/main" val="3115232454"/>
+        <p14:creationId xmlns:p14="http://schemas.microsoft.com/office/powerpoint/2010/main" xmlns="" val="3115232454"/>
       </p:ext>
     </p:extLst>
   </p:cSld>
@@ -11180,7 +11189,7 @@
           <p:cNvPr id="2" name="Title 1">
             <a:extLst>
               <a:ext uri="{FF2B5EF4-FFF2-40B4-BE49-F238E27FC236}">
-                <a16:creationId xmlns:a16="http://schemas.microsoft.com/office/drawing/2014/main" id="{7F08F2D0-A056-4E63-8D1F-1B8D1071E2CF}"/>
+                <a16:creationId xmlns:a16="http://schemas.microsoft.com/office/drawing/2014/main" xmlns="" id="{7F08F2D0-A056-4E63-8D1F-1B8D1071E2CF}"/>
               </a:ext>
             </a:extLst>
           </p:cNvPr>
@@ -11209,7 +11218,7 @@
           <p:cNvPr id="7" name="Content Placeholder 6">
             <a:extLst>
               <a:ext uri="{FF2B5EF4-FFF2-40B4-BE49-F238E27FC236}">
-                <a16:creationId xmlns:a16="http://schemas.microsoft.com/office/drawing/2014/main" id="{6909534A-08E7-449C-B591-270D34F86A51}"/>
+                <a16:creationId xmlns:a16="http://schemas.microsoft.com/office/drawing/2014/main" xmlns="" id="{6909534A-08E7-449C-B591-270D34F86A51}"/>
               </a:ext>
             </a:extLst>
           </p:cNvPr>
@@ -11266,7 +11275,7 @@
           <p:cNvPr id="9" name="Picture 8" descr="A screenshot of a cell phone&#10;&#10;Description generated with very high confidence">
             <a:extLst>
               <a:ext uri="{FF2B5EF4-FFF2-40B4-BE49-F238E27FC236}">
-                <a16:creationId xmlns:a16="http://schemas.microsoft.com/office/drawing/2014/main" id="{E0BE3555-6759-4D7F-A2EB-9336B120A522}"/>
+                <a16:creationId xmlns:a16="http://schemas.microsoft.com/office/drawing/2014/main" xmlns="" id="{E0BE3555-6759-4D7F-A2EB-9336B120A522}"/>
               </a:ext>
             </a:extLst>
           </p:cNvPr>
@@ -11276,10 +11285,10 @@
           <p:nvPr/>
         </p:nvPicPr>
         <p:blipFill>
-          <a:blip r:embed="rId4">
+          <a:blip r:embed="rId4" cstate="print">
             <a:extLst>
               <a:ext uri="{28A0092B-C50C-407E-A947-70E740481C1C}">
-                <a14:useLocalDpi xmlns:a14="http://schemas.microsoft.com/office/drawing/2010/main" val="0"/>
+                <a14:useLocalDpi xmlns:a14="http://schemas.microsoft.com/office/drawing/2010/main" xmlns="" val="0"/>
               </a:ext>
             </a:extLst>
           </a:blip>
@@ -11300,7 +11309,7 @@
     </p:spTree>
     <p:extLst>
       <p:ext uri="{BB962C8B-B14F-4D97-AF65-F5344CB8AC3E}">
-        <p14:creationId xmlns:p14="http://schemas.microsoft.com/office/powerpoint/2010/main" val="1813829724"/>
+        <p14:creationId xmlns:p14="http://schemas.microsoft.com/office/powerpoint/2010/main" xmlns="" val="1813829724"/>
       </p:ext>
     </p:extLst>
   </p:cSld>
@@ -11332,7 +11341,7 @@
           <p:cNvPr id="2" name="Title 1">
             <a:extLst>
               <a:ext uri="{FF2B5EF4-FFF2-40B4-BE49-F238E27FC236}">
-                <a16:creationId xmlns:a16="http://schemas.microsoft.com/office/drawing/2014/main" id="{D32E4462-1DA1-4153-9F5F-285C67E6182F}"/>
+                <a16:creationId xmlns:a16="http://schemas.microsoft.com/office/drawing/2014/main" xmlns="" id="{D32E4462-1DA1-4153-9F5F-285C67E6182F}"/>
               </a:ext>
             </a:extLst>
           </p:cNvPr>
@@ -11360,7 +11369,7 @@
           <p:cNvPr id="3" name="Content Placeholder 2">
             <a:extLst>
               <a:ext uri="{FF2B5EF4-FFF2-40B4-BE49-F238E27FC236}">
-                <a16:creationId xmlns:a16="http://schemas.microsoft.com/office/drawing/2014/main" id="{A830400D-587F-407D-A196-8BE5ADA10A80}"/>
+                <a16:creationId xmlns:a16="http://schemas.microsoft.com/office/drawing/2014/main" xmlns="" id="{A830400D-587F-407D-A196-8BE5ADA10A80}"/>
               </a:ext>
             </a:extLst>
           </p:cNvPr>
@@ -11397,8 +11406,12 @@
           <a:p>
             <a:pPr algn="l" rtl="0"/>
             <a:r>
-              <a:rPr lang="en-US" dirty="0"/>
-              <a:t>Th Symbol constructor accepts an optional string key, which can be used for debugging but not to access the symbol itself.</a:t>
+              <a:rPr lang="en-US" dirty="0" smtClean="0"/>
+              <a:t>The </a:t>
+            </a:r>
+            <a:r>
+              <a:rPr lang="en-US" dirty="0"/>
+              <a:t>Symbol constructor accepts an optional string key, which can be used for debugging but not to access the symbol itself.</a:t>
             </a:r>
           </a:p>
         </p:txBody>
@@ -11408,7 +11421,7 @@
           <p:cNvPr id="7" name="Picture 6">
             <a:extLst>
               <a:ext uri="{FF2B5EF4-FFF2-40B4-BE49-F238E27FC236}">
-                <a16:creationId xmlns:a16="http://schemas.microsoft.com/office/drawing/2014/main" id="{131F2B4C-2F59-43E4-84EE-CA5A03B1F030}"/>
+                <a16:creationId xmlns:a16="http://schemas.microsoft.com/office/drawing/2014/main" xmlns="" id="{131F2B4C-2F59-43E4-84EE-CA5A03B1F030}"/>
               </a:ext>
             </a:extLst>
           </p:cNvPr>
@@ -11418,7 +11431,7 @@
           <p:nvPr/>
         </p:nvPicPr>
         <p:blipFill>
-          <a:blip r:embed="rId2"/>
+          <a:blip r:embed="rId2" cstate="print"/>
           <a:stretch>
             <a:fillRect/>
           </a:stretch>
@@ -11436,7 +11449,7 @@
     </p:spTree>
     <p:extLst>
       <p:ext uri="{BB962C8B-B14F-4D97-AF65-F5344CB8AC3E}">
-        <p14:creationId xmlns:p14="http://schemas.microsoft.com/office/powerpoint/2010/main" val="1776338169"/>
+        <p14:creationId xmlns:p14="http://schemas.microsoft.com/office/powerpoint/2010/main" xmlns="" val="1776338169"/>
       </p:ext>
     </p:extLst>
   </p:cSld>
@@ -11468,7 +11481,7 @@
           <p:cNvPr id="2" name="Title 1">
             <a:extLst>
               <a:ext uri="{FF2B5EF4-FFF2-40B4-BE49-F238E27FC236}">
-                <a16:creationId xmlns:a16="http://schemas.microsoft.com/office/drawing/2014/main" id="{858C8845-FECD-4834-9550-162F13043C8C}"/>
+                <a16:creationId xmlns:a16="http://schemas.microsoft.com/office/drawing/2014/main" xmlns="" id="{858C8845-FECD-4834-9550-162F13043C8C}"/>
               </a:ext>
             </a:extLst>
           </p:cNvPr>
@@ -11496,7 +11509,7 @@
           <p:cNvPr id="3" name="Content Placeholder 2">
             <a:extLst>
               <a:ext uri="{FF2B5EF4-FFF2-40B4-BE49-F238E27FC236}">
-                <a16:creationId xmlns:a16="http://schemas.microsoft.com/office/drawing/2014/main" id="{C9A6B373-5D29-4381-A1A3-748A8C485E92}"/>
+                <a16:creationId xmlns:a16="http://schemas.microsoft.com/office/drawing/2014/main" xmlns="" id="{C9A6B373-5D29-4381-A1A3-748A8C485E92}"/>
               </a:ext>
             </a:extLst>
           </p:cNvPr>
@@ -11546,7 +11559,7 @@
           <p:cNvPr id="4" name="Picture 3">
             <a:extLst>
               <a:ext uri="{FF2B5EF4-FFF2-40B4-BE49-F238E27FC236}">
-                <a16:creationId xmlns:a16="http://schemas.microsoft.com/office/drawing/2014/main" id="{2E559FEF-CD7D-4C90-B929-4274F2FF4A93}"/>
+                <a16:creationId xmlns:a16="http://schemas.microsoft.com/office/drawing/2014/main" xmlns="" id="{2E559FEF-CD7D-4C90-B929-4274F2FF4A93}"/>
               </a:ext>
             </a:extLst>
           </p:cNvPr>
@@ -11556,7 +11569,7 @@
           <p:nvPr/>
         </p:nvPicPr>
         <p:blipFill>
-          <a:blip r:embed="rId2"/>
+          <a:blip r:embed="rId2" cstate="print"/>
           <a:stretch>
             <a:fillRect/>
           </a:stretch>
@@ -11576,7 +11589,7 @@
           <p:cNvPr id="5" name="Picture 4">
             <a:extLst>
               <a:ext uri="{FF2B5EF4-FFF2-40B4-BE49-F238E27FC236}">
-                <a16:creationId xmlns:a16="http://schemas.microsoft.com/office/drawing/2014/main" id="{DE27BDB9-E9D8-42D7-9FE8-72AC7EA3CDAA}"/>
+                <a16:creationId xmlns:a16="http://schemas.microsoft.com/office/drawing/2014/main" xmlns="" id="{DE27BDB9-E9D8-42D7-9FE8-72AC7EA3CDAA}"/>
               </a:ext>
             </a:extLst>
           </p:cNvPr>
@@ -11586,7 +11599,7 @@
           <p:nvPr/>
         </p:nvPicPr>
         <p:blipFill>
-          <a:blip r:embed="rId3"/>
+          <a:blip r:embed="rId3" cstate="print"/>
           <a:stretch>
             <a:fillRect/>
           </a:stretch>
@@ -11604,7 +11617,7 @@
     </p:spTree>
     <p:extLst>
       <p:ext uri="{BB962C8B-B14F-4D97-AF65-F5344CB8AC3E}">
-        <p14:creationId xmlns:p14="http://schemas.microsoft.com/office/powerpoint/2010/main" val="2586240817"/>
+        <p14:creationId xmlns:p14="http://schemas.microsoft.com/office/powerpoint/2010/main" xmlns="" val="2586240817"/>
       </p:ext>
     </p:extLst>
   </p:cSld>
@@ -11636,7 +11649,7 @@
           <p:cNvPr id="2" name="Title 1">
             <a:extLst>
               <a:ext uri="{FF2B5EF4-FFF2-40B4-BE49-F238E27FC236}">
-                <a16:creationId xmlns:a16="http://schemas.microsoft.com/office/drawing/2014/main" id="{D3FE3846-8C1F-4071-BFD6-CE0F51CF355E}"/>
+                <a16:creationId xmlns:a16="http://schemas.microsoft.com/office/drawing/2014/main" xmlns="" id="{D3FE3846-8C1F-4071-BFD6-CE0F51CF355E}"/>
               </a:ext>
             </a:extLst>
           </p:cNvPr>
@@ -11664,7 +11677,7 @@
           <p:cNvPr id="3" name="Content Placeholder 2">
             <a:extLst>
               <a:ext uri="{FF2B5EF4-FFF2-40B4-BE49-F238E27FC236}">
-                <a16:creationId xmlns:a16="http://schemas.microsoft.com/office/drawing/2014/main" id="{BE97C54F-39A2-4BED-91FE-5E77AC566179}"/>
+                <a16:creationId xmlns:a16="http://schemas.microsoft.com/office/drawing/2014/main" xmlns="" id="{BE97C54F-39A2-4BED-91FE-5E77AC566179}"/>
               </a:ext>
             </a:extLst>
           </p:cNvPr>
@@ -11716,7 +11729,7 @@
           <p:cNvPr id="6" name="Picture 5">
             <a:extLst>
               <a:ext uri="{FF2B5EF4-FFF2-40B4-BE49-F238E27FC236}">
-                <a16:creationId xmlns:a16="http://schemas.microsoft.com/office/drawing/2014/main" id="{B940AEB2-F8AA-436A-B187-ABC03CC19A39}"/>
+                <a16:creationId xmlns:a16="http://schemas.microsoft.com/office/drawing/2014/main" xmlns="" id="{B940AEB2-F8AA-436A-B187-ABC03CC19A39}"/>
               </a:ext>
             </a:extLst>
           </p:cNvPr>
@@ -11726,7 +11739,7 @@
           <p:nvPr/>
         </p:nvPicPr>
         <p:blipFill>
-          <a:blip r:embed="rId2"/>
+          <a:blip r:embed="rId2" cstate="print"/>
           <a:stretch>
             <a:fillRect/>
           </a:stretch>
@@ -11744,7 +11757,7 @@
     </p:spTree>
     <p:extLst>
       <p:ext uri="{BB962C8B-B14F-4D97-AF65-F5344CB8AC3E}">
-        <p14:creationId xmlns:p14="http://schemas.microsoft.com/office/powerpoint/2010/main" val="4011531002"/>
+        <p14:creationId xmlns:p14="http://schemas.microsoft.com/office/powerpoint/2010/main" xmlns="" val="4011531002"/>
       </p:ext>
     </p:extLst>
   </p:cSld>
@@ -11776,7 +11789,7 @@
           <p:cNvPr id="2" name="Title 1">
             <a:extLst>
               <a:ext uri="{FF2B5EF4-FFF2-40B4-BE49-F238E27FC236}">
-                <a16:creationId xmlns:a16="http://schemas.microsoft.com/office/drawing/2014/main" id="{3C961985-BE9B-4BA9-932E-71FE70B49B84}"/>
+                <a16:creationId xmlns:a16="http://schemas.microsoft.com/office/drawing/2014/main" xmlns="" id="{3C961985-BE9B-4BA9-932E-71FE70B49B84}"/>
               </a:ext>
             </a:extLst>
           </p:cNvPr>
@@ -11804,7 +11817,7 @@
           <p:cNvPr id="3" name="Content Placeholder 2">
             <a:extLst>
               <a:ext uri="{FF2B5EF4-FFF2-40B4-BE49-F238E27FC236}">
-                <a16:creationId xmlns:a16="http://schemas.microsoft.com/office/drawing/2014/main" id="{37B7ECB4-A88C-4A14-9F0F-462D5A393D3C}"/>
+                <a16:creationId xmlns:a16="http://schemas.microsoft.com/office/drawing/2014/main" xmlns="" id="{37B7ECB4-A88C-4A14-9F0F-462D5A393D3C}"/>
               </a:ext>
             </a:extLst>
           </p:cNvPr>
@@ -11916,7 +11929,7 @@
           <p:cNvPr id="5" name="Picture 4">
             <a:extLst>
               <a:ext uri="{FF2B5EF4-FFF2-40B4-BE49-F238E27FC236}">
-                <a16:creationId xmlns:a16="http://schemas.microsoft.com/office/drawing/2014/main" id="{7886B179-B93C-4CDA-8209-EB70382E7770}"/>
+                <a16:creationId xmlns:a16="http://schemas.microsoft.com/office/drawing/2014/main" xmlns="" id="{7886B179-B93C-4CDA-8209-EB70382E7770}"/>
               </a:ext>
             </a:extLst>
           </p:cNvPr>
@@ -11926,7 +11939,7 @@
           <p:nvPr/>
         </p:nvPicPr>
         <p:blipFill>
-          <a:blip r:embed="rId2"/>
+          <a:blip r:embed="rId2" cstate="print"/>
           <a:stretch>
             <a:fillRect/>
           </a:stretch>
@@ -11944,7 +11957,7 @@
     </p:spTree>
     <p:extLst>
       <p:ext uri="{BB962C8B-B14F-4D97-AF65-F5344CB8AC3E}">
-        <p14:creationId xmlns:p14="http://schemas.microsoft.com/office/powerpoint/2010/main" val="3011146725"/>
+        <p14:creationId xmlns:p14="http://schemas.microsoft.com/office/powerpoint/2010/main" xmlns="" val="3011146725"/>
       </p:ext>
     </p:extLst>
   </p:cSld>
@@ -11976,7 +11989,7 @@
           <p:cNvPr id="2" name="Title 1">
             <a:extLst>
               <a:ext uri="{FF2B5EF4-FFF2-40B4-BE49-F238E27FC236}">
-                <a16:creationId xmlns:a16="http://schemas.microsoft.com/office/drawing/2014/main" id="{2201F607-DB8F-4E28-91E9-7D50FC941DBB}"/>
+                <a16:creationId xmlns:a16="http://schemas.microsoft.com/office/drawing/2014/main" xmlns="" id="{2201F607-DB8F-4E28-91E9-7D50FC941DBB}"/>
               </a:ext>
             </a:extLst>
           </p:cNvPr>
@@ -12004,7 +12017,7 @@
           <p:cNvPr id="3" name="Content Placeholder 2">
             <a:extLst>
               <a:ext uri="{FF2B5EF4-FFF2-40B4-BE49-F238E27FC236}">
-                <a16:creationId xmlns:a16="http://schemas.microsoft.com/office/drawing/2014/main" id="{8DD35AA3-71FC-45D7-9CDE-974490470840}"/>
+                <a16:creationId xmlns:a16="http://schemas.microsoft.com/office/drawing/2014/main" xmlns="" id="{8DD35AA3-71FC-45D7-9CDE-974490470840}"/>
               </a:ext>
             </a:extLst>
           </p:cNvPr>
@@ -12099,7 +12112,7 @@
           <p:cNvPr id="6" name="Picture 5">
             <a:extLst>
               <a:ext uri="{FF2B5EF4-FFF2-40B4-BE49-F238E27FC236}">
-                <a16:creationId xmlns:a16="http://schemas.microsoft.com/office/drawing/2014/main" id="{DADFD72D-4E67-4131-BF06-60ABDFCF2201}"/>
+                <a16:creationId xmlns:a16="http://schemas.microsoft.com/office/drawing/2014/main" xmlns="" id="{DADFD72D-4E67-4131-BF06-60ABDFCF2201}"/>
               </a:ext>
             </a:extLst>
           </p:cNvPr>
@@ -12109,7 +12122,7 @@
           <p:nvPr/>
         </p:nvPicPr>
         <p:blipFill>
-          <a:blip r:embed="rId2"/>
+          <a:blip r:embed="rId2" cstate="print"/>
           <a:stretch>
             <a:fillRect/>
           </a:stretch>
@@ -12127,7 +12140,7 @@
     </p:spTree>
     <p:extLst>
       <p:ext uri="{BB962C8B-B14F-4D97-AF65-F5344CB8AC3E}">
-        <p14:creationId xmlns:p14="http://schemas.microsoft.com/office/powerpoint/2010/main" val="658983501"/>
+        <p14:creationId xmlns:p14="http://schemas.microsoft.com/office/powerpoint/2010/main" xmlns="" val="658983501"/>
       </p:ext>
     </p:extLst>
   </p:cSld>
@@ -12403,9 +12416,18 @@
                 </a:solidFill>
                 <a:hlinkClick r:id="rId4"/>
               </a:rPr>
-              <a:t>https://basarat.gitbooks.io/typescript</a:t>
-            </a:r>
-            <a:endParaRPr lang="en-US" dirty="0">
+              <a:t>https://</a:t>
+            </a:r>
+            <a:r>
+              <a:rPr lang="en-US" dirty="0" smtClean="0">
+                <a:solidFill>
+                  <a:srgbClr val="FF0000"/>
+                </a:solidFill>
+                <a:hlinkClick r:id="rId4"/>
+              </a:rPr>
+              <a:t>basarat.gitbooks.io/typescript</a:t>
+            </a:r>
+            <a:endParaRPr lang="en-US" dirty="0" smtClean="0">
               <a:solidFill>
                 <a:srgbClr val="FF0000"/>
               </a:solidFill>
@@ -12414,30 +12436,26 @@
           <a:p>
             <a:pPr algn="l" rtl="0"/>
             <a:r>
-              <a:rPr lang="en-US" dirty="0">
-                <a:solidFill>
-                  <a:srgbClr val="FF0000"/>
-                </a:solidFill>
+              <a:rPr lang="en-US" dirty="0" smtClean="0">
                 <a:hlinkClick r:id="rId5"/>
               </a:rPr>
-              <a:t>https://jameshenry.blog/typescript-null-and-undefined-types/</a:t>
-            </a:r>
-            <a:endParaRPr lang="en-US" dirty="0">
-              <a:solidFill>
-                <a:srgbClr val="FF0000"/>
-              </a:solidFill>
-            </a:endParaRPr>
-          </a:p>
-          <a:p>
-            <a:pPr algn="l" rtl="0"/>
-            <a:r>
-              <a:rPr lang="en-US" dirty="0">
-                <a:solidFill>
-                  <a:srgbClr val="FF0000"/>
-                </a:solidFill>
+              <a:t>https://</a:t>
+            </a:r>
+            <a:r>
+              <a:rPr lang="en-US" dirty="0" smtClean="0">
+                <a:hlinkClick r:id="rId5"/>
+              </a:rPr>
+              <a:t>dev.to/aman_singh/abstract-operations-the-key-to-understand-coercion-in-javascript-453i</a:t>
+            </a:r>
+            <a:endParaRPr lang="en-US" dirty="0" smtClean="0"/>
+          </a:p>
+          <a:p>
+            <a:pPr algn="l" rtl="0"/>
+            <a:r>
+              <a:rPr lang="en-US" dirty="0" smtClean="0">
                 <a:hlinkClick r:id="rId6"/>
               </a:rPr>
-              <a:t>https://codeburst.io/javascript-null-vs-undefined-20f955215a2</a:t>
+              <a:t>https://tc39.es/ecma262/#sec-abstract-operations</a:t>
             </a:r>
             <a:endParaRPr lang="en-US" dirty="0">
               <a:solidFill>
@@ -12454,7 +12472,7 @@
                 </a:solidFill>
                 <a:hlinkClick r:id="rId7"/>
               </a:rPr>
-              <a:t>https://codeburst.io/understanding-null-undefined-and-nan-b603cb74b44c</a:t>
+              <a:t>https://jameshenry.blog/typescript-null-and-undefined-types/</a:t>
             </a:r>
             <a:endParaRPr lang="en-US" dirty="0">
               <a:solidFill>
@@ -12471,7 +12489,7 @@
                 </a:solidFill>
                 <a:hlinkClick r:id="rId8"/>
               </a:rPr>
-              <a:t>https://developer.mozilla.org/en-US/docs/Web/JavaScript/Reference/Global_Objects/null</a:t>
+              <a:t>https://codeburst.io/javascript-null-vs-undefined-20f955215a2</a:t>
             </a:r>
             <a:endParaRPr lang="en-US" dirty="0">
               <a:solidFill>
@@ -12488,7 +12506,7 @@
                 </a:solidFill>
                 <a:hlinkClick r:id="rId9"/>
               </a:rPr>
-              <a:t>https://github.com/Microsoft/TypeScript</a:t>
+              <a:t>https://codeburst.io/understanding-null-undefined-and-nan-b603cb74b44c</a:t>
             </a:r>
             <a:endParaRPr lang="en-US" dirty="0">
               <a:solidFill>
@@ -12505,7 +12523,7 @@
                 </a:solidFill>
                 <a:hlinkClick r:id="rId10"/>
               </a:rPr>
-              <a:t>https://msdn.microsoft.com/en-us/magazine/dn890374.aspx</a:t>
+              <a:t>https://developer.mozilla.org/en-US/docs/Web/JavaScript/Reference/Global_Objects/null</a:t>
             </a:r>
             <a:endParaRPr lang="en-US" dirty="0">
               <a:solidFill>
@@ -12522,7 +12540,7 @@
                 </a:solidFill>
                 <a:hlinkClick r:id="rId11"/>
               </a:rPr>
-              <a:t>https://codeburst.io/how-this-keyword-work-in-javascript-6b31104b5ef9</a:t>
+              <a:t>https://github.com/Microsoft/TypeScript</a:t>
             </a:r>
             <a:endParaRPr lang="en-US" dirty="0">
               <a:solidFill>
@@ -12539,7 +12557,7 @@
                 </a:solidFill>
                 <a:hlinkClick r:id="rId12"/>
               </a:rPr>
-              <a:t>https://bytearcher.com/articles/es6-vs-es2015-name/</a:t>
+              <a:t>https://msdn.microsoft.com/en-us/magazine/dn890374.aspx</a:t>
             </a:r>
             <a:endParaRPr lang="en-US" dirty="0">
               <a:solidFill>
@@ -12556,7 +12574,7 @@
                 </a:solidFill>
                 <a:hlinkClick r:id="rId13"/>
               </a:rPr>
-              <a:t>https://codeburst.io/a-simple-guide-to-es6-iterators-in-javascript-with-examples-189d052c3d8e</a:t>
+              <a:t>https://codeburst.io/how-this-keyword-work-in-javascript-6b31104b5ef9</a:t>
             </a:r>
             <a:endParaRPr lang="en-US" dirty="0">
               <a:solidFill>
@@ -12573,7 +12591,7 @@
                 </a:solidFill>
                 <a:hlinkClick r:id="rId14"/>
               </a:rPr>
-              <a:t>http://www.ecma-international.org/ecma-262/6.0/#sec-iteration</a:t>
+              <a:t>https://bytearcher.com/articles/es6-vs-es2015-name/</a:t>
             </a:r>
             <a:endParaRPr lang="en-US" dirty="0">
               <a:solidFill>
@@ -12590,7 +12608,7 @@
                 </a:solidFill>
                 <a:hlinkClick r:id="rId15"/>
               </a:rPr>
-              <a:t>https://www.ynonperek.com/2017/08/28/3-cool-uses-for/</a:t>
+              <a:t>https://codeburst.io/a-simple-guide-to-es6-iterators-in-javascript-with-examples-189d052c3d8e</a:t>
             </a:r>
             <a:endParaRPr lang="en-US" dirty="0">
               <a:solidFill>
@@ -12607,7 +12625,7 @@
                 </a:solidFill>
                 <a:hlinkClick r:id="rId16"/>
               </a:rPr>
-              <a:t>http://www.benmvp.com/learning-es6-generators-as-iterators/</a:t>
+              <a:t>http://www.ecma-international.org/ecma-262/6.0/#sec-iteration</a:t>
             </a:r>
             <a:endParaRPr lang="en-US" dirty="0">
               <a:solidFill>
@@ -12624,7 +12642,7 @@
                 </a:solidFill>
                 <a:hlinkClick r:id="rId17"/>
               </a:rPr>
-              <a:t>http://exploringjs.com/es6/ch_generators.html#leanpub-auto-iterating-over-trees</a:t>
+              <a:t>https://www.ynonperek.com/2017/08/28/3-cool-uses-for/</a:t>
             </a:r>
             <a:endParaRPr lang="en-US" dirty="0">
               <a:solidFill>
@@ -12636,8 +12654,42 @@
             <a:pPr algn="l" rtl="0"/>
             <a:r>
               <a:rPr lang="en-US" dirty="0">
+                <a:solidFill>
+                  <a:srgbClr val="FF0000"/>
+                </a:solidFill>
                 <a:hlinkClick r:id="rId18"/>
               </a:rPr>
+              <a:t>http://www.benmvp.com/learning-es6-generators-as-iterators/</a:t>
+            </a:r>
+            <a:endParaRPr lang="en-US" dirty="0">
+              <a:solidFill>
+                <a:srgbClr val="FF0000"/>
+              </a:solidFill>
+            </a:endParaRPr>
+          </a:p>
+          <a:p>
+            <a:pPr algn="l" rtl="0"/>
+            <a:r>
+              <a:rPr lang="en-US" dirty="0">
+                <a:solidFill>
+                  <a:srgbClr val="FF0000"/>
+                </a:solidFill>
+                <a:hlinkClick r:id="rId19"/>
+              </a:rPr>
+              <a:t>http://exploringjs.com/es6/ch_generators.html#leanpub-auto-iterating-over-trees</a:t>
+            </a:r>
+            <a:endParaRPr lang="en-US" dirty="0">
+              <a:solidFill>
+                <a:srgbClr val="FF0000"/>
+              </a:solidFill>
+            </a:endParaRPr>
+          </a:p>
+          <a:p>
+            <a:pPr algn="l" rtl="0"/>
+            <a:r>
+              <a:rPr lang="en-US" dirty="0">
+                <a:hlinkClick r:id="rId20"/>
+              </a:rPr>
               <a:t>https://www.typescriptlang.org/docs/handbook/symbols.html</a:t>
             </a:r>
             <a:endParaRPr lang="en-US" dirty="0"/>
@@ -12646,7 +12698,7 @@
             <a:pPr algn="l" rtl="0"/>
             <a:r>
               <a:rPr lang="en-US" dirty="0">
-                <a:hlinkClick r:id="rId19"/>
+                <a:hlinkClick r:id="rId21"/>
               </a:rPr>
               <a:t>https://developer.mozilla.org/en-US/docs/Web/JavaScript/Reference/Global_Objects/Symbol</a:t>
             </a:r>

</xml_diff>

<commit_message>
adding some more content
</commit_message>
<xml_diff>
--- a/Advanced Es6 & TypeScript.pptx
+++ b/Advanced Es6 & TypeScript.pptx
@@ -28,64 +28,61 @@
     <p:sldId id="274" r:id="rId22"/>
     <p:sldId id="275" r:id="rId23"/>
     <p:sldId id="276" r:id="rId24"/>
-    <p:sldId id="277" r:id="rId25"/>
-    <p:sldId id="278" r:id="rId26"/>
-    <p:sldId id="279" r:id="rId27"/>
-    <p:sldId id="280" r:id="rId28"/>
-    <p:sldId id="281" r:id="rId29"/>
-    <p:sldId id="282" r:id="rId30"/>
-    <p:sldId id="283" r:id="rId31"/>
-    <p:sldId id="284" r:id="rId32"/>
-    <p:sldId id="285" r:id="rId33"/>
-    <p:sldId id="286" r:id="rId34"/>
-    <p:sldId id="317" r:id="rId35"/>
-    <p:sldId id="318" r:id="rId36"/>
-    <p:sldId id="319" r:id="rId37"/>
-    <p:sldId id="320" r:id="rId38"/>
-    <p:sldId id="287" r:id="rId39"/>
-    <p:sldId id="288" r:id="rId40"/>
-    <p:sldId id="289" r:id="rId41"/>
-    <p:sldId id="290" r:id="rId42"/>
-    <p:sldId id="291" r:id="rId43"/>
-    <p:sldId id="292" r:id="rId44"/>
-    <p:sldId id="293" r:id="rId45"/>
-    <p:sldId id="294" r:id="rId46"/>
-    <p:sldId id="295" r:id="rId47"/>
-    <p:sldId id="299" r:id="rId48"/>
-    <p:sldId id="301" r:id="rId49"/>
-    <p:sldId id="300" r:id="rId50"/>
-    <p:sldId id="323" r:id="rId51"/>
-    <p:sldId id="324" r:id="rId52"/>
-    <p:sldId id="325" r:id="rId53"/>
-    <p:sldId id="326" r:id="rId54"/>
-    <p:sldId id="327" r:id="rId55"/>
-    <p:sldId id="328" r:id="rId56"/>
-    <p:sldId id="322" r:id="rId57"/>
-    <p:sldId id="330" r:id="rId58"/>
-    <p:sldId id="331" r:id="rId59"/>
-    <p:sldId id="332" r:id="rId60"/>
-    <p:sldId id="333" r:id="rId61"/>
-    <p:sldId id="334" r:id="rId62"/>
-    <p:sldId id="329" r:id="rId63"/>
-    <p:sldId id="321" r:id="rId64"/>
-    <p:sldId id="302" r:id="rId65"/>
-    <p:sldId id="296" r:id="rId66"/>
-    <p:sldId id="297" r:id="rId67"/>
-    <p:sldId id="298" r:id="rId68"/>
-    <p:sldId id="303" r:id="rId69"/>
-    <p:sldId id="304" r:id="rId70"/>
-    <p:sldId id="305" r:id="rId71"/>
-    <p:sldId id="306" r:id="rId72"/>
-    <p:sldId id="307" r:id="rId73"/>
-    <p:sldId id="308" r:id="rId74"/>
-    <p:sldId id="309" r:id="rId75"/>
-    <p:sldId id="310" r:id="rId76"/>
-    <p:sldId id="311" r:id="rId77"/>
-    <p:sldId id="312" r:id="rId78"/>
-    <p:sldId id="313" r:id="rId79"/>
-    <p:sldId id="314" r:id="rId80"/>
-    <p:sldId id="316" r:id="rId81"/>
-    <p:sldId id="268" r:id="rId82"/>
+    <p:sldId id="280" r:id="rId25"/>
+    <p:sldId id="281" r:id="rId26"/>
+    <p:sldId id="282" r:id="rId27"/>
+    <p:sldId id="283" r:id="rId28"/>
+    <p:sldId id="284" r:id="rId29"/>
+    <p:sldId id="285" r:id="rId30"/>
+    <p:sldId id="286" r:id="rId31"/>
+    <p:sldId id="317" r:id="rId32"/>
+    <p:sldId id="318" r:id="rId33"/>
+    <p:sldId id="319" r:id="rId34"/>
+    <p:sldId id="320" r:id="rId35"/>
+    <p:sldId id="287" r:id="rId36"/>
+    <p:sldId id="288" r:id="rId37"/>
+    <p:sldId id="289" r:id="rId38"/>
+    <p:sldId id="290" r:id="rId39"/>
+    <p:sldId id="291" r:id="rId40"/>
+    <p:sldId id="292" r:id="rId41"/>
+    <p:sldId id="293" r:id="rId42"/>
+    <p:sldId id="294" r:id="rId43"/>
+    <p:sldId id="295" r:id="rId44"/>
+    <p:sldId id="299" r:id="rId45"/>
+    <p:sldId id="301" r:id="rId46"/>
+    <p:sldId id="300" r:id="rId47"/>
+    <p:sldId id="323" r:id="rId48"/>
+    <p:sldId id="324" r:id="rId49"/>
+    <p:sldId id="325" r:id="rId50"/>
+    <p:sldId id="326" r:id="rId51"/>
+    <p:sldId id="327" r:id="rId52"/>
+    <p:sldId id="328" r:id="rId53"/>
+    <p:sldId id="322" r:id="rId54"/>
+    <p:sldId id="330" r:id="rId55"/>
+    <p:sldId id="331" r:id="rId56"/>
+    <p:sldId id="332" r:id="rId57"/>
+    <p:sldId id="333" r:id="rId58"/>
+    <p:sldId id="334" r:id="rId59"/>
+    <p:sldId id="329" r:id="rId60"/>
+    <p:sldId id="321" r:id="rId61"/>
+    <p:sldId id="302" r:id="rId62"/>
+    <p:sldId id="296" r:id="rId63"/>
+    <p:sldId id="297" r:id="rId64"/>
+    <p:sldId id="298" r:id="rId65"/>
+    <p:sldId id="303" r:id="rId66"/>
+    <p:sldId id="304" r:id="rId67"/>
+    <p:sldId id="305" r:id="rId68"/>
+    <p:sldId id="306" r:id="rId69"/>
+    <p:sldId id="307" r:id="rId70"/>
+    <p:sldId id="308" r:id="rId71"/>
+    <p:sldId id="309" r:id="rId72"/>
+    <p:sldId id="310" r:id="rId73"/>
+    <p:sldId id="311" r:id="rId74"/>
+    <p:sldId id="312" r:id="rId75"/>
+    <p:sldId id="313" r:id="rId76"/>
+    <p:sldId id="314" r:id="rId77"/>
+    <p:sldId id="316" r:id="rId78"/>
+    <p:sldId id="268" r:id="rId79"/>
   </p:sldIdLst>
   <p:sldSz cx="9144000" cy="6858000" type="screen4x3"/>
   <p:notesSz cx="6858000" cy="9144000"/>
@@ -4351,63 +4348,73 @@
         </p:nvSpPr>
         <p:spPr/>
         <p:txBody>
-          <a:bodyPr/>
-          <a:lstStyle/>
-          <a:p>
-            <a:pPr algn="l" rtl="0"/>
-            <a:r>
-              <a:rPr lang="en-US" dirty="0"/>
+          <a:bodyPr>
+            <a:normAutofit/>
+          </a:bodyPr>
+          <a:lstStyle/>
+          <a:p>
+            <a:pPr algn="l" rtl="0"/>
+            <a:r>
+              <a:rPr lang="en-US" sz="2300" dirty="0"/>
               <a:t>A </a:t>
             </a:r>
             <a:r>
-              <a:rPr lang="en-US" b="1" dirty="0"/>
+              <a:rPr lang="en-US" sz="2300" b="1" dirty="0"/>
               <a:t>null</a:t>
             </a:r>
             <a:r>
-              <a:rPr lang="en-US" dirty="0"/>
+              <a:rPr lang="en-US" sz="2300" dirty="0"/>
               <a:t> value represents a reference that points, generally intentionally, to a nonexistent or invalid object or address.</a:t>
             </a:r>
           </a:p>
           <a:p>
             <a:pPr algn="l" rtl="0"/>
-            <a:r>
-              <a:rPr lang="en-US" dirty="0"/>
+            <a:endParaRPr lang="en-US" sz="2300" dirty="0"/>
+          </a:p>
+          <a:p>
+            <a:pPr algn="l" rtl="0"/>
+            <a:r>
+              <a:rPr lang="en-US" sz="2300" dirty="0"/>
               <a:t>In APIs, null is often retrieved in a place where an object can be expected but no object is relevant.</a:t>
             </a:r>
           </a:p>
           <a:p>
             <a:pPr algn="l" rtl="0"/>
-            <a:r>
-              <a:rPr lang="en-US" dirty="0"/>
+            <a:endParaRPr lang="en-US" sz="2300" dirty="0"/>
+          </a:p>
+          <a:p>
+            <a:pPr algn="l" rtl="0"/>
+            <a:r>
+              <a:rPr lang="en-US" sz="2300" dirty="0"/>
               <a:t>Something hasn't been initialized :</a:t>
             </a:r>
             <a:r>
-              <a:rPr lang="en-US" b="1" dirty="0"/>
+              <a:rPr lang="en-US" sz="2300" b="1" dirty="0"/>
               <a:t> undefined</a:t>
             </a:r>
             <a:r>
-              <a:rPr lang="en-US" dirty="0"/>
+              <a:rPr lang="en-US" sz="2300" dirty="0"/>
               <a:t>.</a:t>
             </a:r>
           </a:p>
           <a:p>
             <a:pPr algn="l" rtl="0"/>
             <a:r>
-              <a:rPr lang="en-US" dirty="0"/>
+              <a:rPr lang="en-US" sz="2300" dirty="0"/>
               <a:t>Something is currently unavailable: </a:t>
             </a:r>
             <a:r>
-              <a:rPr lang="en-US" b="1" dirty="0"/>
+              <a:rPr lang="en-US" sz="2300" b="1" dirty="0"/>
               <a:t>null</a:t>
             </a:r>
             <a:r>
-              <a:rPr lang="en-US" dirty="0"/>
+              <a:rPr lang="en-US" sz="2300" dirty="0"/>
               <a:t>.</a:t>
             </a:r>
           </a:p>
           <a:p>
             <a:pPr algn="l" rtl="0"/>
-            <a:endParaRPr lang="he-IL" dirty="0"/>
+            <a:endParaRPr lang="he-IL" sz="2300" dirty="0"/>
           </a:p>
         </p:txBody>
       </p:sp>
@@ -5069,52 +5076,6 @@
             </a:pPr>
             <a:endParaRPr lang="en-US" dirty="0"/>
           </a:p>
-          <a:p>
-            <a:pPr algn="l">
-              <a:buNone/>
-            </a:pPr>
-            <a:endParaRPr lang="en-US" dirty="0"/>
-          </a:p>
-          <a:p>
-            <a:pPr algn="l">
-              <a:buNone/>
-            </a:pPr>
-            <a:endParaRPr lang="en-US" dirty="0"/>
-          </a:p>
-          <a:p>
-            <a:pPr algn="l">
-              <a:buNone/>
-            </a:pPr>
-            <a:r>
-              <a:rPr lang="en-US" dirty="0"/>
-              <a:t>Why </a:t>
-            </a:r>
-            <a:r>
-              <a:rPr lang="en-US" dirty="0">
-                <a:solidFill>
-                  <a:srgbClr val="00B0F0"/>
-                </a:solidFill>
-              </a:rPr>
-              <a:t>null</a:t>
-            </a:r>
-            <a:r>
-              <a:rPr lang="en-US" dirty="0"/>
-              <a:t> == </a:t>
-            </a:r>
-            <a:r>
-              <a:rPr lang="en-US" dirty="0">
-                <a:solidFill>
-                  <a:srgbClr val="00B0F0"/>
-                </a:solidFill>
-              </a:rPr>
-              <a:t>undefined</a:t>
-            </a:r>
-            <a:r>
-              <a:rPr lang="en-US" dirty="0"/>
-              <a:t> equals to true ? </a:t>
-            </a:r>
-            <a:endParaRPr lang="he-IL" dirty="0"/>
-          </a:p>
         </p:txBody>
       </p:sp>
       <p:pic>
@@ -5408,7 +5369,15 @@
             <a:pPr algn="l" rtl="0"/>
             <a:r>
               <a:rPr lang="en-US" dirty="0"/>
-              <a:t>The this keyword in JavaScript (and thus TypeScript) behaves differently than it does in many other languages.</a:t>
+              <a:t>The </a:t>
+            </a:r>
+            <a:r>
+              <a:rPr lang="en-US" b="1" dirty="0"/>
+              <a:t>this</a:t>
+            </a:r>
+            <a:r>
+              <a:rPr lang="en-US" dirty="0"/>
+              <a:t> keyword in JavaScript (and thus in TypeScript) behaves differently than it does in many other languages.</a:t>
             </a:r>
           </a:p>
           <a:p>
@@ -5480,7 +5449,7 @@
         <p:spPr/>
         <p:txBody>
           <a:bodyPr>
-            <a:normAutofit fontScale="85000" lnSpcReduction="20000"/>
+            <a:normAutofit/>
           </a:bodyPr>
           <a:lstStyle/>
           <a:p>
@@ -5488,15 +5457,15 @@
               <a:buNone/>
             </a:pPr>
             <a:r>
-              <a:rPr lang="en-US" dirty="0"/>
+              <a:rPr lang="en-US" sz="1800" dirty="0"/>
               <a:t>What is </a:t>
             </a:r>
             <a:r>
-              <a:rPr lang="en-US" b="1" dirty="0"/>
+              <a:rPr lang="en-US" sz="1800" b="1" dirty="0"/>
               <a:t>this</a:t>
             </a:r>
             <a:r>
-              <a:rPr lang="en-US" dirty="0"/>
+              <a:rPr lang="en-US" sz="1800" dirty="0"/>
               <a:t> in JavaScript?</a:t>
             </a:r>
           </a:p>
@@ -5504,14 +5473,14 @@
             <a:pPr algn="l" rtl="0">
               <a:buNone/>
             </a:pPr>
-            <a:endParaRPr lang="en-US" dirty="0"/>
+            <a:endParaRPr lang="en-US" sz="1000" dirty="0"/>
           </a:p>
           <a:p>
             <a:pPr algn="l" rtl="0">
               <a:buNone/>
             </a:pPr>
             <a:r>
-              <a:rPr lang="en-US" dirty="0"/>
+              <a:rPr lang="en-US" sz="1800" dirty="0"/>
               <a:t>When a function is invoked in JavaScript, you can</a:t>
             </a:r>
           </a:p>
@@ -5520,7 +5489,7 @@
               <a:buNone/>
             </a:pPr>
             <a:r>
-              <a:rPr lang="en-US" dirty="0"/>
+              <a:rPr lang="en-US" sz="1800" dirty="0"/>
               <a:t>follow these steps to determine what this will be</a:t>
             </a:r>
           </a:p>
@@ -5529,7 +5498,7 @@
               <a:buNone/>
             </a:pPr>
             <a:r>
-              <a:rPr lang="en-US" dirty="0"/>
+              <a:rPr lang="en-US" sz="1800" dirty="0"/>
               <a:t>(these rules are in priority order):</a:t>
             </a:r>
           </a:p>
@@ -5537,60 +5506,65 @@
             <a:pPr algn="l" rtl="0">
               <a:buNone/>
             </a:pPr>
-            <a:endParaRPr lang="en-US" dirty="0"/>
-          </a:p>
-          <a:p>
-            <a:pPr algn="l" rtl="0"/>
-            <a:r>
-              <a:rPr lang="en-US" dirty="0"/>
-              <a:t>If the function was the result of a call to </a:t>
-            </a:r>
-            <a:r>
-              <a:rPr lang="en-US" dirty="0" err="1"/>
+            <a:endParaRPr lang="en-US" sz="1200" dirty="0"/>
+          </a:p>
+          <a:p>
+            <a:pPr algn="l" rtl="0"/>
+            <a:r>
+              <a:rPr lang="en-US" sz="1900" dirty="0"/>
+              <a:t>If the function was the result of a call to ’</a:t>
+            </a:r>
+            <a:r>
+              <a:rPr lang="en-US" sz="1900" dirty="0" err="1"/>
               <a:t>function.bind</a:t>
             </a:r>
             <a:r>
-              <a:rPr lang="en-US" dirty="0"/>
-              <a:t>, this will be the argument given to bind.</a:t>
-            </a:r>
-          </a:p>
-          <a:p>
-            <a:pPr algn="l" rtl="0"/>
-            <a:r>
-              <a:rPr lang="en-US" dirty="0"/>
-              <a:t>If the function was invoked in the form </a:t>
-            </a:r>
-            <a:r>
-              <a:rPr lang="en-US" dirty="0" err="1"/>
+              <a:rPr lang="en-US" sz="1900" dirty="0"/>
+              <a:t>’, this will be the argument given to bind.</a:t>
+            </a:r>
+          </a:p>
+          <a:p>
+            <a:pPr algn="l" rtl="0"/>
+            <a:endParaRPr lang="en-US" sz="1000" dirty="0"/>
+          </a:p>
+          <a:p>
+            <a:pPr algn="l" rtl="0"/>
+            <a:r>
+              <a:rPr lang="en-US" sz="1900" dirty="0"/>
+              <a:t>If the function was invoked in the form of ‘</a:t>
+            </a:r>
+            <a:r>
+              <a:rPr lang="en-US" sz="1900" dirty="0" err="1"/>
               <a:t>foo.func</a:t>
             </a:r>
             <a:r>
-              <a:rPr lang="en-US" dirty="0"/>
-              <a:t>(), this will be </a:t>
-            </a:r>
-            <a:r>
-              <a:rPr lang="en-US" dirty="0" err="1"/>
-              <a:t>foo</a:t>
-            </a:r>
-            <a:r>
-              <a:rPr lang="en-US" dirty="0"/>
-              <a:t>.</a:t>
-            </a:r>
-          </a:p>
-          <a:p>
-            <a:pPr algn="l" rtl="0"/>
-            <a:r>
-              <a:rPr lang="en-US" dirty="0"/>
-              <a:t>In a global context, If in strict mode, this will be undefined.</a:t>
-            </a:r>
-          </a:p>
-          <a:p>
-            <a:pPr algn="l" rtl="0">
-              <a:buNone/>
-            </a:pPr>
-            <a:r>
-              <a:rPr lang="en-US" dirty="0"/>
-              <a:t>	Otherwise, this will be the global object (window in a browser).</a:t>
+              <a:rPr lang="en-US" sz="1900" dirty="0"/>
+              <a:t>()’, this will be ’foo’.</a:t>
+            </a:r>
+          </a:p>
+          <a:p>
+            <a:pPr algn="l" rtl="0"/>
+            <a:endParaRPr lang="en-US" sz="1000" dirty="0"/>
+          </a:p>
+          <a:p>
+            <a:pPr algn="l" rtl="0"/>
+            <a:r>
+              <a:rPr lang="en-US" sz="1900" dirty="0"/>
+              <a:t>In a global context:</a:t>
+            </a:r>
+          </a:p>
+          <a:p>
+            <a:pPr lvl="1" algn="l" rtl="0"/>
+            <a:r>
+              <a:rPr lang="en-US" sz="1600" dirty="0"/>
+              <a:t> If in strict mode, this will be undefined.</a:t>
+            </a:r>
+          </a:p>
+          <a:p>
+            <a:pPr lvl="1" algn="l" rtl="0"/>
+            <a:r>
+              <a:rPr lang="en-US" sz="1600" dirty="0"/>
+              <a:t>Otherwise, this will be the global object (window in a browser).</a:t>
             </a:r>
           </a:p>
           <a:p>
@@ -5979,403 +5953,6 @@
               <a:buNone/>
             </a:pPr>
             <a:r>
-              <a:rPr lang="en-US" sz="2000" dirty="0"/>
-              <a:t>TypeScript uses </a:t>
-            </a:r>
-            <a:r>
-              <a:rPr lang="en-US" sz="2000" dirty="0">
-                <a:solidFill>
-                  <a:srgbClr val="FF0000"/>
-                </a:solidFill>
-              </a:rPr>
-              <a:t>_this </a:t>
-            </a:r>
-            <a:r>
-              <a:rPr lang="en-US" sz="2000" dirty="0"/>
-              <a:t>in its </a:t>
-            </a:r>
-            <a:r>
-              <a:rPr lang="en-US" sz="2000" dirty="0" err="1"/>
-              <a:t>transpile</a:t>
-            </a:r>
-            <a:r>
-              <a:rPr lang="en-US" sz="2000" dirty="0"/>
-              <a:t> process, </a:t>
-            </a:r>
-          </a:p>
-          <a:p>
-            <a:pPr algn="l" rtl="0">
-              <a:buNone/>
-            </a:pPr>
-            <a:r>
-              <a:rPr lang="en-US" sz="2000" dirty="0"/>
-              <a:t>so </a:t>
-            </a:r>
-            <a:r>
-              <a:rPr lang="en-US" sz="2000" dirty="0">
-                <a:solidFill>
-                  <a:srgbClr val="FF0000"/>
-                </a:solidFill>
-              </a:rPr>
-              <a:t>never use _this </a:t>
-            </a:r>
-            <a:r>
-              <a:rPr lang="en-US" sz="2000" dirty="0"/>
-              <a:t>as a variable or property name.</a:t>
-            </a:r>
-          </a:p>
-        </p:txBody>
-      </p:sp>
-    </p:spTree>
-  </p:cSld>
-  <p:clrMapOvr>
-    <a:masterClrMapping/>
-  </p:clrMapOvr>
-</p:sld>
-</file>
-
-<file path=ppt/slides/slide25.xml><?xml version="1.0" encoding="utf-8"?>
-<p:sld xmlns:a="http://schemas.openxmlformats.org/drawingml/2006/main" xmlns:r="http://schemas.openxmlformats.org/officeDocument/2006/relationships" xmlns:p="http://schemas.openxmlformats.org/presentationml/2006/main">
-  <p:cSld>
-    <p:spTree>
-      <p:nvGrpSpPr>
-        <p:cNvPr id="1" name=""/>
-        <p:cNvGrpSpPr/>
-        <p:nvPr/>
-      </p:nvGrpSpPr>
-      <p:grpSpPr>
-        <a:xfrm>
-          <a:off x="0" y="0"/>
-          <a:ext cx="0" cy="0"/>
-          <a:chOff x="0" y="0"/>
-          <a:chExt cx="0" cy="0"/>
-        </a:xfrm>
-      </p:grpSpPr>
-      <p:sp>
-        <p:nvSpPr>
-          <p:cNvPr id="2" name="Title 1"/>
-          <p:cNvSpPr>
-            <a:spLocks noGrp="1"/>
-          </p:cNvSpPr>
-          <p:nvPr>
-            <p:ph type="title"/>
-          </p:nvPr>
-        </p:nvSpPr>
-        <p:spPr/>
-        <p:txBody>
-          <a:bodyPr>
-            <a:normAutofit fontScale="90000"/>
-          </a:bodyPr>
-          <a:lstStyle/>
-          <a:p>
-            <a:pPr rtl="0"/>
-            <a:r>
-              <a:rPr lang="en-US" sz="4000" dirty="0"/>
-              <a:t>‘This’ key word and Closure</a:t>
-            </a:r>
-          </a:p>
-        </p:txBody>
-      </p:sp>
-      <p:sp>
-        <p:nvSpPr>
-          <p:cNvPr id="3" name="Content Placeholder 2"/>
-          <p:cNvSpPr>
-            <a:spLocks noGrp="1"/>
-          </p:cNvSpPr>
-          <p:nvPr>
-            <p:ph idx="1"/>
-          </p:nvPr>
-        </p:nvSpPr>
-        <p:spPr/>
-        <p:txBody>
-          <a:bodyPr>
-            <a:normAutofit/>
-          </a:bodyPr>
-          <a:lstStyle/>
-          <a:p>
-            <a:pPr algn="l" rtl="0">
-              <a:lnSpc>
-                <a:spcPct val="150000"/>
-              </a:lnSpc>
-              <a:buNone/>
-            </a:pPr>
-            <a:r>
-              <a:rPr lang="en-US" sz="1600" dirty="0"/>
-              <a:t>For example:</a:t>
-            </a:r>
-          </a:p>
-          <a:p>
-            <a:pPr algn="l" rtl="0">
-              <a:lnSpc>
-                <a:spcPct val="150000"/>
-              </a:lnSpc>
-              <a:buNone/>
-            </a:pPr>
-            <a:endParaRPr lang="en-US" sz="1600" dirty="0"/>
-          </a:p>
-          <a:p>
-            <a:pPr algn="l" rtl="0">
-              <a:lnSpc>
-                <a:spcPct val="150000"/>
-              </a:lnSpc>
-              <a:buNone/>
-            </a:pPr>
-            <a:endParaRPr lang="en-US" sz="1600" dirty="0"/>
-          </a:p>
-          <a:p>
-            <a:pPr algn="l" rtl="0">
-              <a:lnSpc>
-                <a:spcPct val="150000"/>
-              </a:lnSpc>
-              <a:buNone/>
-            </a:pPr>
-            <a:endParaRPr lang="en-US" sz="1600" dirty="0"/>
-          </a:p>
-          <a:p>
-            <a:pPr algn="l" rtl="0">
-              <a:lnSpc>
-                <a:spcPct val="150000"/>
-              </a:lnSpc>
-              <a:buNone/>
-            </a:pPr>
-            <a:endParaRPr lang="en-US" sz="1600" dirty="0"/>
-          </a:p>
-          <a:p>
-            <a:pPr algn="l" rtl="0">
-              <a:lnSpc>
-                <a:spcPct val="200000"/>
-              </a:lnSpc>
-              <a:buNone/>
-            </a:pPr>
-            <a:r>
-              <a:rPr lang="en-US" sz="1600" dirty="0" err="1"/>
-              <a:t>Transpiles</a:t>
-            </a:r>
-            <a:r>
-              <a:rPr lang="en-US" sz="1600" dirty="0"/>
-              <a:t> to: </a:t>
-            </a:r>
-          </a:p>
-        </p:txBody>
-      </p:sp>
-      <p:pic>
-        <p:nvPicPr>
-          <p:cNvPr id="8195" name="Picture 3" descr="C:\Users\israel\Desktop\Capture.PNG"/>
-          <p:cNvPicPr>
-            <a:picLocks noChangeAspect="1" noChangeArrowheads="1"/>
-          </p:cNvPicPr>
-          <p:nvPr/>
-        </p:nvPicPr>
-        <p:blipFill>
-          <a:blip r:embed="rId2" cstate="print"/>
-          <a:srcRect/>
-          <a:stretch>
-            <a:fillRect/>
-          </a:stretch>
-        </p:blipFill>
-        <p:spPr bwMode="auto">
-          <a:xfrm>
-            <a:off x="533400" y="2057400"/>
-            <a:ext cx="5715000" cy="1905000"/>
-          </a:xfrm>
-          <a:prstGeom prst="rect">
-            <a:avLst/>
-          </a:prstGeom>
-          <a:noFill/>
-        </p:spPr>
-      </p:pic>
-      <p:pic>
-        <p:nvPicPr>
-          <p:cNvPr id="8196" name="Picture 4" descr="C:\Users\israel\Desktop\Capture.PNG"/>
-          <p:cNvPicPr>
-            <a:picLocks noChangeAspect="1" noChangeArrowheads="1"/>
-          </p:cNvPicPr>
-          <p:nvPr/>
-        </p:nvPicPr>
-        <p:blipFill>
-          <a:blip r:embed="rId3" cstate="print"/>
-          <a:srcRect/>
-          <a:stretch>
-            <a:fillRect/>
-          </a:stretch>
-        </p:blipFill>
-        <p:spPr bwMode="auto">
-          <a:xfrm>
-            <a:off x="533400" y="4419600"/>
-            <a:ext cx="5648325" cy="2219325"/>
-          </a:xfrm>
-          <a:prstGeom prst="rect">
-            <a:avLst/>
-          </a:prstGeom>
-          <a:noFill/>
-        </p:spPr>
-      </p:pic>
-    </p:spTree>
-  </p:cSld>
-  <p:clrMapOvr>
-    <a:masterClrMapping/>
-  </p:clrMapOvr>
-</p:sld>
-</file>
-
-<file path=ppt/slides/slide26.xml><?xml version="1.0" encoding="utf-8"?>
-<p:sld xmlns:a="http://schemas.openxmlformats.org/drawingml/2006/main" xmlns:r="http://schemas.openxmlformats.org/officeDocument/2006/relationships" xmlns:p="http://schemas.openxmlformats.org/presentationml/2006/main">
-  <p:cSld>
-    <p:spTree>
-      <p:nvGrpSpPr>
-        <p:cNvPr id="1" name=""/>
-        <p:cNvGrpSpPr/>
-        <p:nvPr/>
-      </p:nvGrpSpPr>
-      <p:grpSpPr>
-        <a:xfrm>
-          <a:off x="0" y="0"/>
-          <a:ext cx="0" cy="0"/>
-          <a:chOff x="0" y="0"/>
-          <a:chExt cx="0" cy="0"/>
-        </a:xfrm>
-      </p:grpSpPr>
-      <p:sp>
-        <p:nvSpPr>
-          <p:cNvPr id="2" name="Title 1"/>
-          <p:cNvSpPr>
-            <a:spLocks noGrp="1"/>
-          </p:cNvSpPr>
-          <p:nvPr>
-            <p:ph type="title"/>
-          </p:nvPr>
-        </p:nvSpPr>
-        <p:spPr/>
-        <p:txBody>
-          <a:bodyPr>
-            <a:normAutofit fontScale="90000"/>
-          </a:bodyPr>
-          <a:lstStyle/>
-          <a:p>
-            <a:pPr rtl="0"/>
-            <a:r>
-              <a:rPr lang="en-US" sz="4000" dirty="0"/>
-              <a:t>‘This’ key word and Closure</a:t>
-            </a:r>
-          </a:p>
-        </p:txBody>
-      </p:sp>
-      <p:sp>
-        <p:nvSpPr>
-          <p:cNvPr id="3" name="Content Placeholder 2"/>
-          <p:cNvSpPr>
-            <a:spLocks noGrp="1"/>
-          </p:cNvSpPr>
-          <p:nvPr>
-            <p:ph idx="1"/>
-          </p:nvPr>
-        </p:nvSpPr>
-        <p:spPr/>
-        <p:txBody>
-          <a:bodyPr>
-            <a:normAutofit/>
-          </a:bodyPr>
-          <a:lstStyle/>
-          <a:p>
-            <a:pPr algn="l" rtl="0">
-              <a:buNone/>
-            </a:pPr>
-            <a:r>
-              <a:rPr lang="en-US" sz="2000" dirty="0"/>
-              <a:t>The TypeScript compiler applies this type of transformation </a:t>
-            </a:r>
-          </a:p>
-          <a:p>
-            <a:pPr algn="l" rtl="0">
-              <a:buNone/>
-            </a:pPr>
-            <a:r>
-              <a:rPr lang="en-US" sz="2000" dirty="0"/>
-              <a:t>to rewrite arrow function expressions into standard function </a:t>
-            </a:r>
-          </a:p>
-          <a:p>
-            <a:pPr algn="l" rtl="0">
-              <a:buNone/>
-            </a:pPr>
-            <a:r>
-              <a:rPr lang="en-US" sz="2000" dirty="0"/>
-              <a:t>expressions.</a:t>
-            </a:r>
-          </a:p>
-        </p:txBody>
-      </p:sp>
-    </p:spTree>
-  </p:cSld>
-  <p:clrMapOvr>
-    <a:masterClrMapping/>
-  </p:clrMapOvr>
-</p:sld>
-</file>
-
-<file path=ppt/slides/slide27.xml><?xml version="1.0" encoding="utf-8"?>
-<p:sld xmlns:a="http://schemas.openxmlformats.org/drawingml/2006/main" xmlns:r="http://schemas.openxmlformats.org/officeDocument/2006/relationships" xmlns:p="http://schemas.openxmlformats.org/presentationml/2006/main">
-  <p:cSld>
-    <p:spTree>
-      <p:nvGrpSpPr>
-        <p:cNvPr id="1" name=""/>
-        <p:cNvGrpSpPr/>
-        <p:nvPr/>
-      </p:nvGrpSpPr>
-      <p:grpSpPr>
-        <a:xfrm>
-          <a:off x="0" y="0"/>
-          <a:ext cx="0" cy="0"/>
-          <a:chOff x="0" y="0"/>
-          <a:chExt cx="0" cy="0"/>
-        </a:xfrm>
-      </p:grpSpPr>
-      <p:sp>
-        <p:nvSpPr>
-          <p:cNvPr id="2" name="Title 1"/>
-          <p:cNvSpPr>
-            <a:spLocks noGrp="1"/>
-          </p:cNvSpPr>
-          <p:nvPr>
-            <p:ph type="title"/>
-          </p:nvPr>
-        </p:nvSpPr>
-        <p:spPr/>
-        <p:txBody>
-          <a:bodyPr>
-            <a:normAutofit fontScale="90000"/>
-          </a:bodyPr>
-          <a:lstStyle/>
-          <a:p>
-            <a:pPr rtl="0"/>
-            <a:r>
-              <a:rPr lang="en-US" sz="4000" dirty="0"/>
-              <a:t>‘This’ key word and Closure</a:t>
-            </a:r>
-          </a:p>
-        </p:txBody>
-      </p:sp>
-      <p:sp>
-        <p:nvSpPr>
-          <p:cNvPr id="3" name="Content Placeholder 2"/>
-          <p:cNvSpPr>
-            <a:spLocks noGrp="1"/>
-          </p:cNvSpPr>
-          <p:nvPr>
-            <p:ph idx="1"/>
-          </p:nvPr>
-        </p:nvSpPr>
-        <p:spPr/>
-        <p:txBody>
-          <a:bodyPr>
-            <a:normAutofit/>
-          </a:bodyPr>
-          <a:lstStyle/>
-          <a:p>
-            <a:pPr algn="l" rtl="0">
-              <a:buNone/>
-            </a:pPr>
-            <a:r>
               <a:rPr lang="en-US" sz="2400" b="1" dirty="0"/>
               <a:t>Closure</a:t>
             </a:r>
@@ -6450,7 +6027,7 @@
 </p:sld>
 </file>
 
-<file path=ppt/slides/slide28.xml><?xml version="1.0" encoding="utf-8"?>
+<file path=ppt/slides/slide25.xml><?xml version="1.0" encoding="utf-8"?>
 <p:sld xmlns:a="http://schemas.openxmlformats.org/drawingml/2006/main" xmlns:r="http://schemas.openxmlformats.org/officeDocument/2006/relationships" xmlns:p="http://schemas.openxmlformats.org/presentationml/2006/main">
   <p:cSld>
     <p:spTree>
@@ -6505,7 +6082,7 @@
         <p:spPr/>
         <p:txBody>
           <a:bodyPr>
-            <a:normAutofit/>
+            <a:normAutofit fontScale="92500" lnSpcReduction="20000"/>
           </a:bodyPr>
           <a:lstStyle/>
           <a:p>
@@ -6585,16 +6162,84 @@
             </a:r>
             <a:r>
               <a:rPr lang="en-US" sz="2000" dirty="0"/>
-              <a:t>. </a:t>
+              <a:t>.</a:t>
             </a:r>
           </a:p>
           <a:p>
             <a:pPr algn="l" rtl="0">
               <a:buNone/>
             </a:pPr>
+            <a:endParaRPr lang="en-US" sz="2000" dirty="0"/>
+          </a:p>
+          <a:p>
+            <a:pPr algn="l" rtl="0">
+              <a:buNone/>
+            </a:pPr>
             <a:r>
               <a:rPr lang="en-US" sz="2000" dirty="0"/>
-              <a:t>The concept in itself is simple enough and pretty intuitive.</a:t>
+              <a:t>From </a:t>
+            </a:r>
+            <a:r>
+              <a:rPr lang="en-US" sz="2000" dirty="0" err="1"/>
+              <a:t>Mozila</a:t>
+            </a:r>
+            <a:r>
+              <a:rPr lang="en-US" sz="2000" dirty="0"/>
+              <a:t> docs:</a:t>
+            </a:r>
+          </a:p>
+          <a:p>
+            <a:pPr algn="l" rtl="0">
+              <a:buNone/>
+            </a:pPr>
+            <a:r>
+              <a:rPr lang="en-US" sz="2000" dirty="0"/>
+              <a:t>“A closure is the combination of a function bundled together</a:t>
+            </a:r>
+          </a:p>
+          <a:p>
+            <a:pPr algn="l" rtl="0">
+              <a:buNone/>
+            </a:pPr>
+            <a:r>
+              <a:rPr lang="en-US" sz="2000" dirty="0"/>
+              <a:t>(enclosed) with references to its surrounding state</a:t>
+            </a:r>
+          </a:p>
+          <a:p>
+            <a:pPr algn="l" rtl="0">
+              <a:buNone/>
+            </a:pPr>
+            <a:r>
+              <a:rPr lang="en-US" sz="2000" dirty="0"/>
+              <a:t>(the lexical environment). In other words, a closure gives you</a:t>
+            </a:r>
+          </a:p>
+          <a:p>
+            <a:pPr algn="l" rtl="0">
+              <a:buNone/>
+            </a:pPr>
+            <a:r>
+              <a:rPr lang="en-US" sz="2000" dirty="0"/>
+              <a:t>access to an outer function’s scope from an inner function. In</a:t>
+            </a:r>
+          </a:p>
+          <a:p>
+            <a:pPr algn="l" rtl="0">
+              <a:buNone/>
+            </a:pPr>
+            <a:r>
+              <a:rPr lang="en-US" sz="2000" dirty="0"/>
+              <a:t>JavaScript, closures are created every time a function is</a:t>
+            </a:r>
+          </a:p>
+          <a:p>
+            <a:pPr algn="l" rtl="0">
+              <a:buNone/>
+            </a:pPr>
+            <a:r>
+              <a:rPr lang="en-US" sz="2000" dirty="0"/>
+              <a:t>created, at function creation time.”</a:t>
             </a:r>
           </a:p>
         </p:txBody>
@@ -6607,7 +6252,7 @@
 </p:sld>
 </file>
 
-<file path=ppt/slides/slide29.xml><?xml version="1.0" encoding="utf-8"?>
+<file path=ppt/slides/slide26.xml><?xml version="1.0" encoding="utf-8"?>
 <p:sld xmlns:a="http://schemas.openxmlformats.org/drawingml/2006/main" xmlns:r="http://schemas.openxmlformats.org/officeDocument/2006/relationships" xmlns:p="http://schemas.openxmlformats.org/presentationml/2006/main">
   <p:cSld>
     <p:spTree>
@@ -6725,125 +6370,7 @@
 </p:sld>
 </file>
 
-<file path=ppt/slides/slide3.xml><?xml version="1.0" encoding="utf-8"?>
-<p:sld xmlns:a="http://schemas.openxmlformats.org/drawingml/2006/main" xmlns:r="http://schemas.openxmlformats.org/officeDocument/2006/relationships" xmlns:p="http://schemas.openxmlformats.org/presentationml/2006/main">
-  <p:cSld>
-    <p:spTree>
-      <p:nvGrpSpPr>
-        <p:cNvPr id="1" name=""/>
-        <p:cNvGrpSpPr/>
-        <p:nvPr/>
-      </p:nvGrpSpPr>
-      <p:grpSpPr>
-        <a:xfrm>
-          <a:off x="0" y="0"/>
-          <a:ext cx="0" cy="0"/>
-          <a:chOff x="0" y="0"/>
-          <a:chExt cx="0" cy="0"/>
-        </a:xfrm>
-      </p:grpSpPr>
-      <p:sp>
-        <p:nvSpPr>
-          <p:cNvPr id="2" name="Title 1"/>
-          <p:cNvSpPr>
-            <a:spLocks noGrp="1"/>
-          </p:cNvSpPr>
-          <p:nvPr>
-            <p:ph type="title"/>
-          </p:nvPr>
-        </p:nvSpPr>
-        <p:spPr/>
-        <p:txBody>
-          <a:bodyPr/>
-          <a:lstStyle/>
-          <a:p>
-            <a:r>
-              <a:rPr lang="en-US" sz="4000" dirty="0"/>
-              <a:t>Equality</a:t>
-            </a:r>
-            <a:endParaRPr lang="he-IL" dirty="0"/>
-          </a:p>
-        </p:txBody>
-      </p:sp>
-      <p:sp>
-        <p:nvSpPr>
-          <p:cNvPr id="3" name="Content Placeholder 2"/>
-          <p:cNvSpPr>
-            <a:spLocks noGrp="1"/>
-          </p:cNvSpPr>
-          <p:nvPr>
-            <p:ph idx="1"/>
-          </p:nvPr>
-        </p:nvSpPr>
-        <p:spPr/>
-        <p:txBody>
-          <a:bodyPr/>
-          <a:lstStyle/>
-          <a:p>
-            <a:pPr algn="l" rtl="0"/>
-            <a:r>
-              <a:rPr lang="en-US" dirty="0"/>
-              <a:t>One thing to be careful about in JavaScript is</a:t>
-            </a:r>
-          </a:p>
-          <a:p>
-            <a:pPr algn="l" rtl="0">
-              <a:buNone/>
-            </a:pPr>
-            <a:r>
-              <a:rPr lang="en-US" dirty="0"/>
-              <a:t>	the difference between == and ===.</a:t>
-            </a:r>
-          </a:p>
-          <a:p>
-            <a:pPr algn="l" rtl="0">
-              <a:buNone/>
-            </a:pPr>
-            <a:endParaRPr lang="en-US" dirty="0"/>
-          </a:p>
-          <a:p>
-            <a:pPr algn="l" rtl="0">
-              <a:buNone/>
-            </a:pPr>
-            <a:endParaRPr lang="en-US" dirty="0"/>
-          </a:p>
-        </p:txBody>
-      </p:sp>
-      <p:pic>
-        <p:nvPicPr>
-          <p:cNvPr id="1026" name="Picture 2" descr="C:\Users\israel\Desktop\Capture.PNG"/>
-          <p:cNvPicPr>
-            <a:picLocks noChangeAspect="1" noChangeArrowheads="1"/>
-          </p:cNvPicPr>
-          <p:nvPr/>
-        </p:nvPicPr>
-        <p:blipFill>
-          <a:blip r:embed="rId2" cstate="print"/>
-          <a:srcRect/>
-          <a:stretch>
-            <a:fillRect/>
-          </a:stretch>
-        </p:blipFill>
-        <p:spPr bwMode="auto">
-          <a:xfrm>
-            <a:off x="533400" y="2667000"/>
-            <a:ext cx="7354888" cy="809625"/>
-          </a:xfrm>
-          <a:prstGeom prst="rect">
-            <a:avLst/>
-          </a:prstGeom>
-          <a:noFill/>
-        </p:spPr>
-      </p:pic>
-    </p:spTree>
-  </p:cSld>
-  <p:clrMapOvr>
-    <a:masterClrMapping/>
-  </p:clrMapOvr>
-</p:sld>
-</file>
-
-<file path=ppt/slides/slide30.xml><?xml version="1.0" encoding="utf-8"?>
+<file path=ppt/slides/slide27.xml><?xml version="1.0" encoding="utf-8"?>
 <p:sld xmlns:a="http://schemas.openxmlformats.org/drawingml/2006/main" xmlns:r="http://schemas.openxmlformats.org/officeDocument/2006/relationships" xmlns:p="http://schemas.openxmlformats.org/presentationml/2006/main">
   <p:cSld>
     <p:spTree>
@@ -6988,7 +6515,7 @@
 </p:sld>
 </file>
 
-<file path=ppt/slides/slide31.xml><?xml version="1.0" encoding="utf-8"?>
+<file path=ppt/slides/slide28.xml><?xml version="1.0" encoding="utf-8"?>
 <p:sld xmlns:a="http://schemas.openxmlformats.org/drawingml/2006/main" xmlns:r="http://schemas.openxmlformats.org/officeDocument/2006/relationships" xmlns:p="http://schemas.openxmlformats.org/presentationml/2006/main">
   <p:cSld>
     <p:spTree>
@@ -7114,7 +6641,7 @@
 </p:sld>
 </file>
 
-<file path=ppt/slides/slide32.xml><?xml version="1.0" encoding="utf-8"?>
+<file path=ppt/slides/slide29.xml><?xml version="1.0" encoding="utf-8"?>
 <p:sld xmlns:a="http://schemas.openxmlformats.org/drawingml/2006/main" xmlns:r="http://schemas.openxmlformats.org/officeDocument/2006/relationships" xmlns:p="http://schemas.openxmlformats.org/presentationml/2006/main">
   <p:cSld>
     <p:spTree>
@@ -7458,7 +6985,125 @@
 </p:sld>
 </file>
 
-<file path=ppt/slides/slide33.xml><?xml version="1.0" encoding="utf-8"?>
+<file path=ppt/slides/slide3.xml><?xml version="1.0" encoding="utf-8"?>
+<p:sld xmlns:a="http://schemas.openxmlformats.org/drawingml/2006/main" xmlns:r="http://schemas.openxmlformats.org/officeDocument/2006/relationships" xmlns:p="http://schemas.openxmlformats.org/presentationml/2006/main">
+  <p:cSld>
+    <p:spTree>
+      <p:nvGrpSpPr>
+        <p:cNvPr id="1" name=""/>
+        <p:cNvGrpSpPr/>
+        <p:nvPr/>
+      </p:nvGrpSpPr>
+      <p:grpSpPr>
+        <a:xfrm>
+          <a:off x="0" y="0"/>
+          <a:ext cx="0" cy="0"/>
+          <a:chOff x="0" y="0"/>
+          <a:chExt cx="0" cy="0"/>
+        </a:xfrm>
+      </p:grpSpPr>
+      <p:sp>
+        <p:nvSpPr>
+          <p:cNvPr id="2" name="Title 1"/>
+          <p:cNvSpPr>
+            <a:spLocks noGrp="1"/>
+          </p:cNvSpPr>
+          <p:nvPr>
+            <p:ph type="title"/>
+          </p:nvPr>
+        </p:nvSpPr>
+        <p:spPr/>
+        <p:txBody>
+          <a:bodyPr/>
+          <a:lstStyle/>
+          <a:p>
+            <a:r>
+              <a:rPr lang="en-US" sz="4000" dirty="0"/>
+              <a:t>Equality</a:t>
+            </a:r>
+            <a:endParaRPr lang="he-IL" dirty="0"/>
+          </a:p>
+        </p:txBody>
+      </p:sp>
+      <p:sp>
+        <p:nvSpPr>
+          <p:cNvPr id="3" name="Content Placeholder 2"/>
+          <p:cNvSpPr>
+            <a:spLocks noGrp="1"/>
+          </p:cNvSpPr>
+          <p:nvPr>
+            <p:ph idx="1"/>
+          </p:nvPr>
+        </p:nvSpPr>
+        <p:spPr/>
+        <p:txBody>
+          <a:bodyPr/>
+          <a:lstStyle/>
+          <a:p>
+            <a:pPr algn="l" rtl="0"/>
+            <a:r>
+              <a:rPr lang="en-US" dirty="0"/>
+              <a:t>One thing to be careful about in JavaScript is</a:t>
+            </a:r>
+          </a:p>
+          <a:p>
+            <a:pPr algn="l" rtl="0">
+              <a:buNone/>
+            </a:pPr>
+            <a:r>
+              <a:rPr lang="en-US" dirty="0"/>
+              <a:t>	the difference between == and ===.</a:t>
+            </a:r>
+          </a:p>
+          <a:p>
+            <a:pPr algn="l" rtl="0">
+              <a:buNone/>
+            </a:pPr>
+            <a:endParaRPr lang="en-US" dirty="0"/>
+          </a:p>
+          <a:p>
+            <a:pPr algn="l" rtl="0">
+              <a:buNone/>
+            </a:pPr>
+            <a:endParaRPr lang="en-US" dirty="0"/>
+          </a:p>
+        </p:txBody>
+      </p:sp>
+      <p:pic>
+        <p:nvPicPr>
+          <p:cNvPr id="1026" name="Picture 2" descr="C:\Users\israel\Desktop\Capture.PNG"/>
+          <p:cNvPicPr>
+            <a:picLocks noChangeAspect="1" noChangeArrowheads="1"/>
+          </p:cNvPicPr>
+          <p:nvPr/>
+        </p:nvPicPr>
+        <p:blipFill>
+          <a:blip r:embed="rId2" cstate="print"/>
+          <a:srcRect/>
+          <a:stretch>
+            <a:fillRect/>
+          </a:stretch>
+        </p:blipFill>
+        <p:spPr bwMode="auto">
+          <a:xfrm>
+            <a:off x="533400" y="2667000"/>
+            <a:ext cx="7354888" cy="809625"/>
+          </a:xfrm>
+          <a:prstGeom prst="rect">
+            <a:avLst/>
+          </a:prstGeom>
+          <a:noFill/>
+        </p:spPr>
+      </p:pic>
+    </p:spTree>
+  </p:cSld>
+  <p:clrMapOvr>
+    <a:masterClrMapping/>
+  </p:clrMapOvr>
+</p:sld>
+</file>
+
+<file path=ppt/slides/slide30.xml><?xml version="1.0" encoding="utf-8"?>
 <p:sld xmlns:a="http://schemas.openxmlformats.org/drawingml/2006/main" xmlns:r="http://schemas.openxmlformats.org/officeDocument/2006/relationships" xmlns:p="http://schemas.openxmlformats.org/presentationml/2006/main">
   <p:cSld>
     <p:spTree>
@@ -7580,7 +7225,7 @@
 </p:sld>
 </file>
 
-<file path=ppt/slides/slide34.xml><?xml version="1.0" encoding="utf-8"?>
+<file path=ppt/slides/slide31.xml><?xml version="1.0" encoding="utf-8"?>
 <p:sld xmlns:a="http://schemas.openxmlformats.org/drawingml/2006/main" xmlns:r="http://schemas.openxmlformats.org/officeDocument/2006/relationships" xmlns:p="http://schemas.openxmlformats.org/presentationml/2006/main">
   <p:cSld>
     <p:spTree>
@@ -7764,7 +7409,7 @@
 </p:sld>
 </file>
 
-<file path=ppt/slides/slide35.xml><?xml version="1.0" encoding="utf-8"?>
+<file path=ppt/slides/slide32.xml><?xml version="1.0" encoding="utf-8"?>
 <p:sld xmlns:a="http://schemas.openxmlformats.org/drawingml/2006/main" xmlns:r="http://schemas.openxmlformats.org/officeDocument/2006/relationships" xmlns:p="http://schemas.openxmlformats.org/presentationml/2006/main">
   <p:cSld>
     <p:spTree>
@@ -7970,7 +7615,7 @@
 </p:sld>
 </file>
 
-<file path=ppt/slides/slide36.xml><?xml version="1.0" encoding="utf-8"?>
+<file path=ppt/slides/slide33.xml><?xml version="1.0" encoding="utf-8"?>
 <p:sld xmlns:a="http://schemas.openxmlformats.org/drawingml/2006/main" xmlns:r="http://schemas.openxmlformats.org/officeDocument/2006/relationships" xmlns:p="http://schemas.openxmlformats.org/presentationml/2006/main">
   <p:cSld>
     <p:spTree>
@@ -8211,7 +7856,7 @@
 </p:sld>
 </file>
 
-<file path=ppt/slides/slide37.xml><?xml version="1.0" encoding="utf-8"?>
+<file path=ppt/slides/slide34.xml><?xml version="1.0" encoding="utf-8"?>
 <p:sld xmlns:a="http://schemas.openxmlformats.org/drawingml/2006/main" xmlns:r="http://schemas.openxmlformats.org/officeDocument/2006/relationships" xmlns:p="http://schemas.openxmlformats.org/presentationml/2006/main">
   <p:cSld>
     <p:spTree>
@@ -8395,7 +8040,7 @@
 </p:sld>
 </file>
 
-<file path=ppt/slides/slide38.xml><?xml version="1.0" encoding="utf-8"?>
+<file path=ppt/slides/slide35.xml><?xml version="1.0" encoding="utf-8"?>
 <p:sld xmlns:a="http://schemas.openxmlformats.org/drawingml/2006/main" xmlns:r="http://schemas.openxmlformats.org/officeDocument/2006/relationships" xmlns:p="http://schemas.openxmlformats.org/presentationml/2006/main">
   <p:cSld>
     <p:spTree>
@@ -8534,7 +8179,7 @@
 </p:sld>
 </file>
 
-<file path=ppt/slides/slide39.xml><?xml version="1.0" encoding="utf-8"?>
+<file path=ppt/slides/slide36.xml><?xml version="1.0" encoding="utf-8"?>
 <p:sld xmlns:a="http://schemas.openxmlformats.org/drawingml/2006/main" xmlns:r="http://schemas.openxmlformats.org/officeDocument/2006/relationships" xmlns:p="http://schemas.openxmlformats.org/presentationml/2006/main">
   <p:cSld>
     <p:spTree>
@@ -8701,151 +8346,7 @@
 </p:sld>
 </file>
 
-<file path=ppt/slides/slide4.xml><?xml version="1.0" encoding="utf-8"?>
-<p:sld xmlns:a="http://schemas.openxmlformats.org/drawingml/2006/main" xmlns:r="http://schemas.openxmlformats.org/officeDocument/2006/relationships" xmlns:p="http://schemas.openxmlformats.org/presentationml/2006/main">
-  <p:cSld>
-    <p:spTree>
-      <p:nvGrpSpPr>
-        <p:cNvPr id="1" name=""/>
-        <p:cNvGrpSpPr/>
-        <p:nvPr/>
-      </p:nvGrpSpPr>
-      <p:grpSpPr>
-        <a:xfrm>
-          <a:off x="0" y="0"/>
-          <a:ext cx="0" cy="0"/>
-          <a:chOff x="0" y="0"/>
-          <a:chExt cx="0" cy="0"/>
-        </a:xfrm>
-      </p:grpSpPr>
-      <p:sp>
-        <p:nvSpPr>
-          <p:cNvPr id="2" name="Title 1"/>
-          <p:cNvSpPr>
-            <a:spLocks noGrp="1"/>
-          </p:cNvSpPr>
-          <p:nvPr>
-            <p:ph type="title"/>
-          </p:nvPr>
-        </p:nvSpPr>
-        <p:spPr/>
-        <p:txBody>
-          <a:bodyPr/>
-          <a:lstStyle/>
-          <a:p>
-            <a:r>
-              <a:rPr lang="en-US" sz="4000" dirty="0"/>
-              <a:t>Equality</a:t>
-            </a:r>
-            <a:endParaRPr lang="he-IL" dirty="0"/>
-          </a:p>
-        </p:txBody>
-      </p:sp>
-      <p:sp>
-        <p:nvSpPr>
-          <p:cNvPr id="3" name="Content Placeholder 2"/>
-          <p:cNvSpPr>
-            <a:spLocks noGrp="1"/>
-          </p:cNvSpPr>
-          <p:nvPr>
-            <p:ph idx="1"/>
-          </p:nvPr>
-        </p:nvSpPr>
-        <p:spPr/>
-        <p:txBody>
-          <a:bodyPr/>
-          <a:lstStyle/>
-          <a:p>
-            <a:pPr marL="0" indent="0" algn="l" rtl="0">
-              <a:buNone/>
-            </a:pPr>
-            <a:endParaRPr lang="en-US" b="1" dirty="0"/>
-          </a:p>
-          <a:p>
-            <a:pPr marL="0" indent="0" algn="l" rtl="0">
-              <a:buNone/>
-            </a:pPr>
-            <a:r>
-              <a:rPr lang="en-US" b="1" dirty="0"/>
-              <a:t>Equals Operator ( == )</a:t>
-            </a:r>
-          </a:p>
-          <a:p>
-            <a:pPr marL="0" indent="0" algn="l" rtl="0">
-              <a:buNone/>
-            </a:pPr>
-            <a:r>
-              <a:rPr lang="en-US" sz="1800" dirty="0"/>
-              <a:t>The comparison x == y with equals operator, where x and y are values, produces true or false. The important thing to know is that while comparing both values, JavaScript runtime will perform type conversions to make both values of same type.</a:t>
-            </a:r>
-          </a:p>
-          <a:p>
-            <a:pPr marL="0" indent="0" algn="l" rtl="0">
-              <a:buNone/>
-            </a:pPr>
-            <a:endParaRPr lang="en-US" sz="1800" dirty="0"/>
-          </a:p>
-          <a:p>
-            <a:pPr marL="0" indent="0" algn="l" rtl="0">
-              <a:buNone/>
-            </a:pPr>
-            <a:r>
-              <a:rPr lang="en-US" b="1" dirty="0"/>
-              <a:t>Strict Equals Operator ( === )</a:t>
-            </a:r>
-          </a:p>
-          <a:p>
-            <a:pPr marL="0" indent="0" algn="l" rtl="0">
-              <a:buNone/>
-            </a:pPr>
-            <a:r>
-              <a:rPr lang="en-US" sz="1800" dirty="0"/>
-              <a:t>The comparison x === y with equals operator, where x and y are values, produces true or false only when –</a:t>
-            </a:r>
-          </a:p>
-          <a:p>
-            <a:pPr marL="342900" indent="-342900" algn="l" rtl="0">
-              <a:buFont typeface="+mj-lt"/>
-              <a:buAutoNum type="arabicPeriod"/>
-            </a:pPr>
-            <a:r>
-              <a:rPr lang="en-US" sz="1800" dirty="0"/>
-              <a:t>types of x and y are same.</a:t>
-            </a:r>
-          </a:p>
-          <a:p>
-            <a:pPr marL="342900" indent="-342900" algn="l" rtl="0">
-              <a:buFont typeface="+mj-lt"/>
-              <a:buAutoNum type="arabicPeriod"/>
-            </a:pPr>
-            <a:r>
-              <a:rPr lang="en-US" sz="1800" dirty="0"/>
-              <a:t>values of x and y are equal.</a:t>
-            </a:r>
-          </a:p>
-          <a:p>
-            <a:pPr marL="0" indent="0" algn="l" rtl="0">
-              <a:buNone/>
-            </a:pPr>
-            <a:endParaRPr lang="en-US" sz="1800" dirty="0"/>
-          </a:p>
-          <a:p>
-            <a:pPr marL="0" indent="0" algn="l" rtl="0">
-              <a:buNone/>
-            </a:pPr>
-            <a:endParaRPr lang="en-US" dirty="0"/>
-          </a:p>
-        </p:txBody>
-      </p:sp>
-    </p:spTree>
-  </p:cSld>
-  <p:clrMapOvr>
-    <a:masterClrMapping/>
-  </p:clrMapOvr>
-</p:sld>
-</file>
-
-<file path=ppt/slides/slide40.xml><?xml version="1.0" encoding="utf-8"?>
+<file path=ppt/slides/slide37.xml><?xml version="1.0" encoding="utf-8"?>
 <p:sld xmlns:a="http://schemas.openxmlformats.org/drawingml/2006/main" xmlns:r="http://schemas.openxmlformats.org/officeDocument/2006/relationships" xmlns:p="http://schemas.openxmlformats.org/presentationml/2006/main">
   <p:cSld>
     <p:spTree>
@@ -8969,7 +8470,7 @@
 </p:sld>
 </file>
 
-<file path=ppt/slides/slide41.xml><?xml version="1.0" encoding="utf-8"?>
+<file path=ppt/slides/slide38.xml><?xml version="1.0" encoding="utf-8"?>
 <p:sld xmlns:a="http://schemas.openxmlformats.org/drawingml/2006/main" xmlns:r="http://schemas.openxmlformats.org/officeDocument/2006/relationships" xmlns:p="http://schemas.openxmlformats.org/presentationml/2006/main">
   <p:cSld>
     <p:spTree>
@@ -9109,7 +8610,7 @@
 </p:sld>
 </file>
 
-<file path=ppt/slides/slide42.xml><?xml version="1.0" encoding="utf-8"?>
+<file path=ppt/slides/slide39.xml><?xml version="1.0" encoding="utf-8"?>
 <p:sld xmlns:a="http://schemas.openxmlformats.org/drawingml/2006/main" xmlns:r="http://schemas.openxmlformats.org/officeDocument/2006/relationships" xmlns:p="http://schemas.openxmlformats.org/presentationml/2006/main">
   <p:cSld>
     <p:spTree>
@@ -9287,7 +8788,151 @@
 </p:sld>
 </file>
 
-<file path=ppt/slides/slide43.xml><?xml version="1.0" encoding="utf-8"?>
+<file path=ppt/slides/slide4.xml><?xml version="1.0" encoding="utf-8"?>
+<p:sld xmlns:a="http://schemas.openxmlformats.org/drawingml/2006/main" xmlns:r="http://schemas.openxmlformats.org/officeDocument/2006/relationships" xmlns:p="http://schemas.openxmlformats.org/presentationml/2006/main">
+  <p:cSld>
+    <p:spTree>
+      <p:nvGrpSpPr>
+        <p:cNvPr id="1" name=""/>
+        <p:cNvGrpSpPr/>
+        <p:nvPr/>
+      </p:nvGrpSpPr>
+      <p:grpSpPr>
+        <a:xfrm>
+          <a:off x="0" y="0"/>
+          <a:ext cx="0" cy="0"/>
+          <a:chOff x="0" y="0"/>
+          <a:chExt cx="0" cy="0"/>
+        </a:xfrm>
+      </p:grpSpPr>
+      <p:sp>
+        <p:nvSpPr>
+          <p:cNvPr id="2" name="Title 1"/>
+          <p:cNvSpPr>
+            <a:spLocks noGrp="1"/>
+          </p:cNvSpPr>
+          <p:nvPr>
+            <p:ph type="title"/>
+          </p:nvPr>
+        </p:nvSpPr>
+        <p:spPr/>
+        <p:txBody>
+          <a:bodyPr/>
+          <a:lstStyle/>
+          <a:p>
+            <a:r>
+              <a:rPr lang="en-US" sz="4000" dirty="0"/>
+              <a:t>Equality</a:t>
+            </a:r>
+            <a:endParaRPr lang="he-IL" dirty="0"/>
+          </a:p>
+        </p:txBody>
+      </p:sp>
+      <p:sp>
+        <p:nvSpPr>
+          <p:cNvPr id="3" name="Content Placeholder 2"/>
+          <p:cNvSpPr>
+            <a:spLocks noGrp="1"/>
+          </p:cNvSpPr>
+          <p:nvPr>
+            <p:ph idx="1"/>
+          </p:nvPr>
+        </p:nvSpPr>
+        <p:spPr/>
+        <p:txBody>
+          <a:bodyPr/>
+          <a:lstStyle/>
+          <a:p>
+            <a:pPr marL="0" indent="0" algn="l" rtl="0">
+              <a:buNone/>
+            </a:pPr>
+            <a:endParaRPr lang="en-US" b="1" dirty="0"/>
+          </a:p>
+          <a:p>
+            <a:pPr marL="0" indent="0" algn="l" rtl="0">
+              <a:buNone/>
+            </a:pPr>
+            <a:r>
+              <a:rPr lang="en-US" b="1" dirty="0"/>
+              <a:t>Equals Operator ( == )</a:t>
+            </a:r>
+          </a:p>
+          <a:p>
+            <a:pPr marL="0" indent="0" algn="l" rtl="0">
+              <a:buNone/>
+            </a:pPr>
+            <a:r>
+              <a:rPr lang="en-US" sz="1800" dirty="0"/>
+              <a:t>The comparison x == y with equals operator, where x and y are values, produces true or false. The important thing to know is that while comparing both values, JavaScript runtime will perform type conversions to make both values of same type.</a:t>
+            </a:r>
+          </a:p>
+          <a:p>
+            <a:pPr marL="0" indent="0" algn="l" rtl="0">
+              <a:buNone/>
+            </a:pPr>
+            <a:endParaRPr lang="en-US" sz="1800" dirty="0"/>
+          </a:p>
+          <a:p>
+            <a:pPr marL="0" indent="0" algn="l" rtl="0">
+              <a:buNone/>
+            </a:pPr>
+            <a:r>
+              <a:rPr lang="en-US" b="1" dirty="0"/>
+              <a:t>Strict Equals Operator ( === )</a:t>
+            </a:r>
+          </a:p>
+          <a:p>
+            <a:pPr marL="0" indent="0" algn="l" rtl="0">
+              <a:buNone/>
+            </a:pPr>
+            <a:r>
+              <a:rPr lang="en-US" sz="1800" dirty="0"/>
+              <a:t>The comparison x === y with equals operator, where x and y are values, produces true or false only when –</a:t>
+            </a:r>
+          </a:p>
+          <a:p>
+            <a:pPr marL="342900" indent="-342900" algn="l" rtl="0">
+              <a:buFont typeface="+mj-lt"/>
+              <a:buAutoNum type="arabicPeriod"/>
+            </a:pPr>
+            <a:r>
+              <a:rPr lang="en-US" sz="1800" dirty="0"/>
+              <a:t>types of x and y are same.</a:t>
+            </a:r>
+          </a:p>
+          <a:p>
+            <a:pPr marL="342900" indent="-342900" algn="l" rtl="0">
+              <a:buFont typeface="+mj-lt"/>
+              <a:buAutoNum type="arabicPeriod"/>
+            </a:pPr>
+            <a:r>
+              <a:rPr lang="en-US" sz="1800" dirty="0"/>
+              <a:t>values of x and y are equal.</a:t>
+            </a:r>
+          </a:p>
+          <a:p>
+            <a:pPr marL="0" indent="0" algn="l" rtl="0">
+              <a:buNone/>
+            </a:pPr>
+            <a:endParaRPr lang="en-US" sz="1800" dirty="0"/>
+          </a:p>
+          <a:p>
+            <a:pPr marL="0" indent="0" algn="l" rtl="0">
+              <a:buNone/>
+            </a:pPr>
+            <a:endParaRPr lang="en-US" dirty="0"/>
+          </a:p>
+        </p:txBody>
+      </p:sp>
+    </p:spTree>
+  </p:cSld>
+  <p:clrMapOvr>
+    <a:masterClrMapping/>
+  </p:clrMapOvr>
+</p:sld>
+</file>
+
+<file path=ppt/slides/slide40.xml><?xml version="1.0" encoding="utf-8"?>
 <p:sld xmlns:a="http://schemas.openxmlformats.org/drawingml/2006/main" xmlns:r="http://schemas.openxmlformats.org/officeDocument/2006/relationships" xmlns:p="http://schemas.openxmlformats.org/presentationml/2006/main">
   <p:cSld>
     <p:spTree>
@@ -9492,7 +9137,7 @@
 </p:sld>
 </file>
 
-<file path=ppt/slides/slide44.xml><?xml version="1.0" encoding="utf-8"?>
+<file path=ppt/slides/slide41.xml><?xml version="1.0" encoding="utf-8"?>
 <p:sld xmlns:a="http://schemas.openxmlformats.org/drawingml/2006/main" xmlns:r="http://schemas.openxmlformats.org/officeDocument/2006/relationships" xmlns:p="http://schemas.openxmlformats.org/presentationml/2006/main">
   <p:cSld>
     <p:spTree>
@@ -9684,7 +9329,7 @@
 </p:sld>
 </file>
 
-<file path=ppt/slides/slide45.xml><?xml version="1.0" encoding="utf-8"?>
+<file path=ppt/slides/slide42.xml><?xml version="1.0" encoding="utf-8"?>
 <p:sld xmlns:a="http://schemas.openxmlformats.org/drawingml/2006/main" xmlns:r="http://schemas.openxmlformats.org/officeDocument/2006/relationships" xmlns:p="http://schemas.openxmlformats.org/presentationml/2006/main">
   <p:cSld>
     <p:spTree>
@@ -9850,7 +9495,7 @@
 </p:sld>
 </file>
 
-<file path=ppt/slides/slide46.xml><?xml version="1.0" encoding="utf-8"?>
+<file path=ppt/slides/slide43.xml><?xml version="1.0" encoding="utf-8"?>
 <p:sld xmlns:a="http://schemas.openxmlformats.org/drawingml/2006/main" xmlns:r="http://schemas.openxmlformats.org/officeDocument/2006/relationships" xmlns:p="http://schemas.openxmlformats.org/presentationml/2006/main">
   <p:cSld>
     <p:spTree>
@@ -10054,7 +9699,7 @@
 </p:sld>
 </file>
 
-<file path=ppt/slides/slide47.xml><?xml version="1.0" encoding="utf-8"?>
+<file path=ppt/slides/slide44.xml><?xml version="1.0" encoding="utf-8"?>
 <p:sld xmlns:a="http://schemas.openxmlformats.org/drawingml/2006/main" xmlns:r="http://schemas.openxmlformats.org/officeDocument/2006/relationships" xmlns:p="http://schemas.openxmlformats.org/presentationml/2006/main">
   <p:cSld>
     <p:spTree>
@@ -10310,7 +9955,7 @@
 </p:sld>
 </file>
 
-<file path=ppt/slides/slide48.xml><?xml version="1.0" encoding="utf-8"?>
+<file path=ppt/slides/slide45.xml><?xml version="1.0" encoding="utf-8"?>
 <p:sld xmlns:a="http://schemas.openxmlformats.org/drawingml/2006/main" xmlns:r="http://schemas.openxmlformats.org/officeDocument/2006/relationships" xmlns:p="http://schemas.openxmlformats.org/presentationml/2006/main">
   <p:cSld>
     <p:spTree>
@@ -10518,7 +10163,7 @@
 </p:sld>
 </file>
 
-<file path=ppt/slides/slide49.xml><?xml version="1.0" encoding="utf-8"?>
+<file path=ppt/slides/slide46.xml><?xml version="1.0" encoding="utf-8"?>
 <p:sld xmlns:a="http://schemas.openxmlformats.org/drawingml/2006/main" xmlns:r="http://schemas.openxmlformats.org/officeDocument/2006/relationships" xmlns:p="http://schemas.openxmlformats.org/presentationml/2006/main">
   <p:cSld>
     <p:spTree>
@@ -10624,109 +10269,7 @@
 </p:sld>
 </file>
 
-<file path=ppt/slides/slide5.xml><?xml version="1.0" encoding="utf-8"?>
-<p:sld xmlns:a="http://schemas.openxmlformats.org/drawingml/2006/main" xmlns:r="http://schemas.openxmlformats.org/officeDocument/2006/relationships" xmlns:p="http://schemas.openxmlformats.org/presentationml/2006/main">
-  <p:cSld>
-    <p:spTree>
-      <p:nvGrpSpPr>
-        <p:cNvPr id="1" name=""/>
-        <p:cNvGrpSpPr/>
-        <p:nvPr/>
-      </p:nvGrpSpPr>
-      <p:grpSpPr>
-        <a:xfrm>
-          <a:off x="0" y="0"/>
-          <a:ext cx="0" cy="0"/>
-          <a:chOff x="0" y="0"/>
-          <a:chExt cx="0" cy="0"/>
-        </a:xfrm>
-      </p:grpSpPr>
-      <p:sp>
-        <p:nvSpPr>
-          <p:cNvPr id="2" name="Title 1"/>
-          <p:cNvSpPr>
-            <a:spLocks noGrp="1"/>
-          </p:cNvSpPr>
-          <p:nvPr>
-            <p:ph type="title"/>
-          </p:nvPr>
-        </p:nvSpPr>
-        <p:spPr/>
-        <p:txBody>
-          <a:bodyPr/>
-          <a:lstStyle/>
-          <a:p>
-            <a:r>
-              <a:rPr lang="en-US" sz="4000" dirty="0"/>
-              <a:t>Equality</a:t>
-            </a:r>
-            <a:endParaRPr lang="he-IL" dirty="0"/>
-          </a:p>
-        </p:txBody>
-      </p:sp>
-      <p:sp>
-        <p:nvSpPr>
-          <p:cNvPr id="3" name="Content Placeholder 2"/>
-          <p:cNvSpPr>
-            <a:spLocks noGrp="1"/>
-          </p:cNvSpPr>
-          <p:nvPr>
-            <p:ph idx="1"/>
-          </p:nvPr>
-        </p:nvSpPr>
-        <p:spPr/>
-        <p:txBody>
-          <a:bodyPr/>
-          <a:lstStyle/>
-          <a:p>
-            <a:pPr algn="l" rtl="0"/>
-            <a:r>
-              <a:rPr lang="en-US" dirty="0"/>
-              <a:t>Similar to == vs. ===, there is != vs. !==.</a:t>
-            </a:r>
-          </a:p>
-          <a:p>
-            <a:pPr algn="l" rtl="0"/>
-            <a:r>
-              <a:rPr lang="en-US" dirty="0"/>
-              <a:t>Always use === and !==.</a:t>
-            </a:r>
-          </a:p>
-          <a:p>
-            <a:pPr algn="l" rtl="0"/>
-            <a:r>
-              <a:rPr lang="en-US" dirty="0"/>
-              <a:t>TypeScript object equality is the same as JavaScript object equality.</a:t>
-            </a:r>
-          </a:p>
-          <a:p>
-            <a:pPr marL="0" indent="0" algn="l" rtl="0">
-              <a:buNone/>
-            </a:pPr>
-            <a:endParaRPr lang="en-US" sz="1800" dirty="0"/>
-          </a:p>
-          <a:p>
-            <a:pPr marL="0" indent="0" algn="l" rtl="0">
-              <a:buNone/>
-            </a:pPr>
-            <a:endParaRPr lang="en-US" dirty="0"/>
-          </a:p>
-        </p:txBody>
-      </p:sp>
-    </p:spTree>
-    <p:extLst>
-      <p:ext uri="{BB962C8B-B14F-4D97-AF65-F5344CB8AC3E}">
-        <p14:creationId xmlns:p14="http://schemas.microsoft.com/office/powerpoint/2010/main" val="1378526269"/>
-      </p:ext>
-    </p:extLst>
-  </p:cSld>
-  <p:clrMapOvr>
-    <a:masterClrMapping/>
-  </p:clrMapOvr>
-</p:sld>
-</file>
-
-<file path=ppt/slides/slide50.xml><?xml version="1.0" encoding="utf-8"?>
+<file path=ppt/slides/slide47.xml><?xml version="1.0" encoding="utf-8"?>
 <p:sld xmlns:a="http://schemas.openxmlformats.org/drawingml/2006/main" xmlns:r="http://schemas.openxmlformats.org/officeDocument/2006/relationships" xmlns:p="http://schemas.openxmlformats.org/presentationml/2006/main">
   <p:cSld>
     <p:spTree>
@@ -10856,7 +10399,7 @@
 </p:sld>
 </file>
 
-<file path=ppt/slides/slide51.xml><?xml version="1.0" encoding="utf-8"?>
+<file path=ppt/slides/slide48.xml><?xml version="1.0" encoding="utf-8"?>
 <p:sld xmlns:a="http://schemas.openxmlformats.org/drawingml/2006/main" xmlns:r="http://schemas.openxmlformats.org/officeDocument/2006/relationships" xmlns:p="http://schemas.openxmlformats.org/presentationml/2006/main">
   <p:cSld>
     <p:spTree>
@@ -11001,7 +10544,7 @@
 </p:sld>
 </file>
 
-<file path=ppt/slides/slide52.xml><?xml version="1.0" encoding="utf-8"?>
+<file path=ppt/slides/slide49.xml><?xml version="1.0" encoding="utf-8"?>
 <p:sld xmlns:a="http://schemas.openxmlformats.org/drawingml/2006/main" xmlns:r="http://schemas.openxmlformats.org/officeDocument/2006/relationships" xmlns:p="http://schemas.openxmlformats.org/presentationml/2006/main">
   <p:cSld>
     <p:spTree>
@@ -11135,7 +10678,7 @@
 </p:sld>
 </file>
 
-<file path=ppt/slides/slide53.xml><?xml version="1.0" encoding="utf-8"?>
+<file path=ppt/slides/slide5.xml><?xml version="1.0" encoding="utf-8"?>
 <p:sld xmlns:a="http://schemas.openxmlformats.org/drawingml/2006/main" xmlns:r="http://schemas.openxmlformats.org/officeDocument/2006/relationships" xmlns:p="http://schemas.openxmlformats.org/presentationml/2006/main">
   <p:cSld>
     <p:spTree>
@@ -11154,6 +10697,108 @@
       </p:grpSpPr>
       <p:sp>
         <p:nvSpPr>
+          <p:cNvPr id="2" name="Title 1"/>
+          <p:cNvSpPr>
+            <a:spLocks noGrp="1"/>
+          </p:cNvSpPr>
+          <p:nvPr>
+            <p:ph type="title"/>
+          </p:nvPr>
+        </p:nvSpPr>
+        <p:spPr/>
+        <p:txBody>
+          <a:bodyPr/>
+          <a:lstStyle/>
+          <a:p>
+            <a:r>
+              <a:rPr lang="en-US" sz="4000" dirty="0"/>
+              <a:t>Equality</a:t>
+            </a:r>
+            <a:endParaRPr lang="he-IL" dirty="0"/>
+          </a:p>
+        </p:txBody>
+      </p:sp>
+      <p:sp>
+        <p:nvSpPr>
+          <p:cNvPr id="3" name="Content Placeholder 2"/>
+          <p:cNvSpPr>
+            <a:spLocks noGrp="1"/>
+          </p:cNvSpPr>
+          <p:nvPr>
+            <p:ph idx="1"/>
+          </p:nvPr>
+        </p:nvSpPr>
+        <p:spPr/>
+        <p:txBody>
+          <a:bodyPr/>
+          <a:lstStyle/>
+          <a:p>
+            <a:pPr algn="l" rtl="0"/>
+            <a:r>
+              <a:rPr lang="en-US" dirty="0"/>
+              <a:t>Similar to == vs. ===, there is != vs. !==.</a:t>
+            </a:r>
+          </a:p>
+          <a:p>
+            <a:pPr algn="l" rtl="0"/>
+            <a:r>
+              <a:rPr lang="en-US" dirty="0"/>
+              <a:t>Always use === and !==.</a:t>
+            </a:r>
+          </a:p>
+          <a:p>
+            <a:pPr algn="l" rtl="0"/>
+            <a:r>
+              <a:rPr lang="en-US" dirty="0"/>
+              <a:t>TypeScript object equality is the same as JavaScript object equality.</a:t>
+            </a:r>
+          </a:p>
+          <a:p>
+            <a:pPr marL="0" indent="0" algn="l" rtl="0">
+              <a:buNone/>
+            </a:pPr>
+            <a:endParaRPr lang="en-US" sz="1800" dirty="0"/>
+          </a:p>
+          <a:p>
+            <a:pPr marL="0" indent="0" algn="l" rtl="0">
+              <a:buNone/>
+            </a:pPr>
+            <a:endParaRPr lang="en-US" dirty="0"/>
+          </a:p>
+        </p:txBody>
+      </p:sp>
+    </p:spTree>
+    <p:extLst>
+      <p:ext uri="{BB962C8B-B14F-4D97-AF65-F5344CB8AC3E}">
+        <p14:creationId xmlns:p14="http://schemas.microsoft.com/office/powerpoint/2010/main" val="1378526269"/>
+      </p:ext>
+    </p:extLst>
+  </p:cSld>
+  <p:clrMapOvr>
+    <a:masterClrMapping/>
+  </p:clrMapOvr>
+</p:sld>
+</file>
+
+<file path=ppt/slides/slide50.xml><?xml version="1.0" encoding="utf-8"?>
+<p:sld xmlns:a="http://schemas.openxmlformats.org/drawingml/2006/main" xmlns:r="http://schemas.openxmlformats.org/officeDocument/2006/relationships" xmlns:p="http://schemas.openxmlformats.org/presentationml/2006/main">
+  <p:cSld>
+    <p:spTree>
+      <p:nvGrpSpPr>
+        <p:cNvPr id="1" name=""/>
+        <p:cNvGrpSpPr/>
+        <p:nvPr/>
+      </p:nvGrpSpPr>
+      <p:grpSpPr>
+        <a:xfrm>
+          <a:off x="0" y="0"/>
+          <a:ext cx="0" cy="0"/>
+          <a:chOff x="0" y="0"/>
+          <a:chExt cx="0" cy="0"/>
+        </a:xfrm>
+      </p:grpSpPr>
+      <p:sp>
+        <p:nvSpPr>
           <p:cNvPr id="2" name="Title 1">
             <a:extLst>
               <a:ext uri="{FF2B5EF4-FFF2-40B4-BE49-F238E27FC236}">
@@ -11285,7 +10930,7 @@
 </p:sld>
 </file>
 
-<file path=ppt/slides/slide54.xml><?xml version="1.0" encoding="utf-8"?>
+<file path=ppt/slides/slide51.xml><?xml version="1.0" encoding="utf-8"?>
 <p:sld xmlns:a="http://schemas.openxmlformats.org/drawingml/2006/main" xmlns:r="http://schemas.openxmlformats.org/officeDocument/2006/relationships" xmlns:p="http://schemas.openxmlformats.org/presentationml/2006/main">
   <p:cSld>
     <p:spTree>
@@ -11420,7 +11065,7 @@
 </p:sld>
 </file>
 
-<file path=ppt/slides/slide55.xml><?xml version="1.0" encoding="utf-8"?>
+<file path=ppt/slides/slide52.xml><?xml version="1.0" encoding="utf-8"?>
 <p:sld xmlns:a="http://schemas.openxmlformats.org/drawingml/2006/main" xmlns:r="http://schemas.openxmlformats.org/officeDocument/2006/relationships" xmlns:p="http://schemas.openxmlformats.org/presentationml/2006/main">
   <p:cSld>
     <p:spTree>
@@ -11573,7 +11218,7 @@
 </p:sld>
 </file>
 
-<file path=ppt/slides/slide56.xml><?xml version="1.0" encoding="utf-8"?>
+<file path=ppt/slides/slide53.xml><?xml version="1.0" encoding="utf-8"?>
 <p:sld xmlns:a="http://schemas.openxmlformats.org/drawingml/2006/main" xmlns:r="http://schemas.openxmlformats.org/officeDocument/2006/relationships" xmlns:p="http://schemas.openxmlformats.org/presentationml/2006/main">
   <p:cSld>
     <p:spTree>
@@ -11670,7 +11315,7 @@
 </p:sld>
 </file>
 
-<file path=ppt/slides/slide57.xml><?xml version="1.0" encoding="utf-8"?>
+<file path=ppt/slides/slide54.xml><?xml version="1.0" encoding="utf-8"?>
 <p:sld xmlns:a="http://schemas.openxmlformats.org/drawingml/2006/main" xmlns:r="http://schemas.openxmlformats.org/officeDocument/2006/relationships" xmlns:p="http://schemas.openxmlformats.org/presentationml/2006/main">
   <p:cSld>
     <p:spTree>
@@ -11904,7 +11549,7 @@
 </p:sld>
 </file>
 
-<file path=ppt/slides/slide58.xml><?xml version="1.0" encoding="utf-8"?>
+<file path=ppt/slides/slide55.xml><?xml version="1.0" encoding="utf-8"?>
 <p:sld xmlns:a="http://schemas.openxmlformats.org/drawingml/2006/main" xmlns:r="http://schemas.openxmlformats.org/officeDocument/2006/relationships" xmlns:p="http://schemas.openxmlformats.org/presentationml/2006/main">
   <p:cSld>
     <p:spTree>
@@ -12053,7 +11698,7 @@
 </p:sld>
 </file>
 
-<file path=ppt/slides/slide59.xml><?xml version="1.0" encoding="utf-8"?>
+<file path=ppt/slides/slide56.xml><?xml version="1.0" encoding="utf-8"?>
 <p:sld xmlns:a="http://schemas.openxmlformats.org/drawingml/2006/main" xmlns:r="http://schemas.openxmlformats.org/officeDocument/2006/relationships" xmlns:p="http://schemas.openxmlformats.org/presentationml/2006/main">
   <p:cSld>
     <p:spTree>
@@ -12202,220 +11847,7 @@
 </p:sld>
 </file>
 
-<file path=ppt/slides/slide6.xml><?xml version="1.0" encoding="utf-8"?>
-<p:sld xmlns:a="http://schemas.openxmlformats.org/drawingml/2006/main" xmlns:r="http://schemas.openxmlformats.org/officeDocument/2006/relationships" xmlns:p="http://schemas.openxmlformats.org/presentationml/2006/main">
-  <p:cSld>
-    <p:spTree>
-      <p:nvGrpSpPr>
-        <p:cNvPr id="1" name=""/>
-        <p:cNvGrpSpPr/>
-        <p:nvPr/>
-      </p:nvGrpSpPr>
-      <p:grpSpPr>
-        <a:xfrm>
-          <a:off x="0" y="0"/>
-          <a:ext cx="0" cy="0"/>
-          <a:chOff x="0" y="0"/>
-          <a:chExt cx="0" cy="0"/>
-        </a:xfrm>
-      </p:grpSpPr>
-      <p:sp>
-        <p:nvSpPr>
-          <p:cNvPr id="2" name="Title 1"/>
-          <p:cNvSpPr>
-            <a:spLocks noGrp="1"/>
-          </p:cNvSpPr>
-          <p:nvPr>
-            <p:ph type="title"/>
-          </p:nvPr>
-        </p:nvSpPr>
-        <p:spPr/>
-        <p:txBody>
-          <a:bodyPr/>
-          <a:lstStyle/>
-          <a:p>
-            <a:r>
-              <a:rPr lang="en-US" sz="4000" dirty="0"/>
-              <a:t>Equality</a:t>
-            </a:r>
-            <a:endParaRPr lang="he-IL" dirty="0"/>
-          </a:p>
-        </p:txBody>
-      </p:sp>
-      <p:sp>
-        <p:nvSpPr>
-          <p:cNvPr id="3" name="Content Placeholder 2"/>
-          <p:cNvSpPr>
-            <a:spLocks noGrp="1"/>
-          </p:cNvSpPr>
-          <p:nvPr>
-            <p:ph idx="1"/>
-          </p:nvPr>
-        </p:nvSpPr>
-        <p:spPr/>
-        <p:txBody>
-          <a:bodyPr>
-            <a:normAutofit/>
-          </a:bodyPr>
-          <a:lstStyle/>
-          <a:p>
-            <a:pPr algn="l" rtl="0">
-              <a:buNone/>
-            </a:pPr>
-            <a:r>
-              <a:rPr lang="en-US" sz="1600" dirty="0"/>
-              <a:t>Conditional statements such as the ‘if’</a:t>
-            </a:r>
-          </a:p>
-          <a:p>
-            <a:pPr algn="l" rtl="0">
-              <a:buNone/>
-            </a:pPr>
-            <a:r>
-              <a:rPr lang="en-US" sz="1600" dirty="0"/>
-              <a:t>statement evaluate their expression using</a:t>
-            </a:r>
-          </a:p>
-          <a:p>
-            <a:pPr algn="l" rtl="0">
-              <a:buNone/>
-            </a:pPr>
-            <a:r>
-              <a:rPr lang="en-US" sz="1600" dirty="0"/>
-              <a:t>coercion with the ’</a:t>
-            </a:r>
-            <a:r>
-              <a:rPr lang="en-US" sz="1600" dirty="0" err="1"/>
-              <a:t>ToBoolean</a:t>
-            </a:r>
-            <a:r>
-              <a:rPr lang="en-US" sz="1600" dirty="0"/>
-              <a:t>’ abstract method</a:t>
-            </a:r>
-          </a:p>
-          <a:p>
-            <a:pPr algn="l" rtl="0">
-              <a:buNone/>
-            </a:pPr>
-            <a:r>
-              <a:rPr lang="en-US" sz="1600" dirty="0"/>
-              <a:t>and always follows the same rolls.</a:t>
-            </a:r>
-          </a:p>
-          <a:p>
-            <a:pPr algn="l" rtl="0">
-              <a:buNone/>
-            </a:pPr>
-            <a:endParaRPr lang="en-US" sz="1600" dirty="0"/>
-          </a:p>
-          <a:p>
-            <a:pPr algn="l" rtl="0">
-              <a:buNone/>
-            </a:pPr>
-            <a:r>
-              <a:rPr lang="en-US" sz="1600" dirty="0"/>
-              <a:t>From ES6 specification : “The abstract</a:t>
-            </a:r>
-          </a:p>
-          <a:p>
-            <a:pPr algn="l" rtl="0">
-              <a:buNone/>
-            </a:pPr>
-            <a:r>
-              <a:rPr lang="en-US" sz="1600" dirty="0"/>
-              <a:t>operation ‘</a:t>
-            </a:r>
-            <a:r>
-              <a:rPr lang="en-US" sz="1600" dirty="0" err="1"/>
-              <a:t>ToBoolean</a:t>
-            </a:r>
-            <a:r>
-              <a:rPr lang="en-US" sz="1600" dirty="0"/>
-              <a:t>’ converts argument to a</a:t>
-            </a:r>
-          </a:p>
-          <a:p>
-            <a:pPr algn="l" rtl="0">
-              <a:buNone/>
-            </a:pPr>
-            <a:r>
-              <a:rPr lang="en-US" sz="1600" dirty="0"/>
-              <a:t>value of type Boolean according to </a:t>
-            </a:r>
-            <a:r>
-              <a:rPr lang="en-US" sz="1600" dirty="0">
-                <a:hlinkClick r:id="rId2"/>
-              </a:rPr>
-              <a:t>table 10</a:t>
-            </a:r>
-            <a:r>
-              <a:rPr lang="en-US" sz="1600" dirty="0"/>
-              <a:t>”.</a:t>
-            </a:r>
-          </a:p>
-        </p:txBody>
-      </p:sp>
-      <p:pic>
-        <p:nvPicPr>
-          <p:cNvPr id="2050" name="Picture 2" descr="C:\Users\israel\Desktop\Capture.PNG"/>
-          <p:cNvPicPr>
-            <a:picLocks noChangeAspect="1" noChangeArrowheads="1"/>
-          </p:cNvPicPr>
-          <p:nvPr/>
-        </p:nvPicPr>
-        <p:blipFill>
-          <a:blip r:embed="rId3" cstate="print"/>
-          <a:srcRect/>
-          <a:stretch>
-            <a:fillRect/>
-          </a:stretch>
-        </p:blipFill>
-        <p:spPr bwMode="auto">
-          <a:xfrm>
-            <a:off x="430924" y="4357941"/>
-            <a:ext cx="5878513" cy="432369"/>
-          </a:xfrm>
-          <a:prstGeom prst="rect">
-            <a:avLst/>
-          </a:prstGeom>
-          <a:noFill/>
-        </p:spPr>
-      </p:pic>
-      <p:pic>
-        <p:nvPicPr>
-          <p:cNvPr id="2051" name="Picture 3" descr="C:\Users\israel\Desktop\Capture.PNG"/>
-          <p:cNvPicPr>
-            <a:picLocks noChangeAspect="1" noChangeArrowheads="1"/>
-          </p:cNvPicPr>
-          <p:nvPr/>
-        </p:nvPicPr>
-        <p:blipFill>
-          <a:blip r:embed="rId4" cstate="print"/>
-          <a:srcRect/>
-          <a:stretch>
-            <a:fillRect/>
-          </a:stretch>
-        </p:blipFill>
-        <p:spPr bwMode="auto">
-          <a:xfrm>
-            <a:off x="430925" y="4790310"/>
-            <a:ext cx="5878513" cy="1819685"/>
-          </a:xfrm>
-          <a:prstGeom prst="rect">
-            <a:avLst/>
-          </a:prstGeom>
-          <a:noFill/>
-        </p:spPr>
-      </p:pic>
-    </p:spTree>
-  </p:cSld>
-  <p:clrMapOvr>
-    <a:masterClrMapping/>
-  </p:clrMapOvr>
-</p:sld>
-</file>
-
-<file path=ppt/slides/slide60.xml><?xml version="1.0" encoding="utf-8"?>
+<file path=ppt/slides/slide57.xml><?xml version="1.0" encoding="utf-8"?>
 <p:sld xmlns:a="http://schemas.openxmlformats.org/drawingml/2006/main" xmlns:r="http://schemas.openxmlformats.org/officeDocument/2006/relationships" xmlns:p="http://schemas.openxmlformats.org/presentationml/2006/main">
   <p:cSld>
     <p:spTree>
@@ -12619,7 +12051,7 @@
 </p:sld>
 </file>
 
-<file path=ppt/slides/slide61.xml><?xml version="1.0" encoding="utf-8"?>
+<file path=ppt/slides/slide58.xml><?xml version="1.0" encoding="utf-8"?>
 <p:sld xmlns:a="http://schemas.openxmlformats.org/drawingml/2006/main" xmlns:r="http://schemas.openxmlformats.org/officeDocument/2006/relationships" xmlns:p="http://schemas.openxmlformats.org/presentationml/2006/main">
   <p:cSld>
     <p:spTree>
@@ -12796,7 +12228,7 @@
 </p:sld>
 </file>
 
-<file path=ppt/slides/slide62.xml><?xml version="1.0" encoding="utf-8"?>
+<file path=ppt/slides/slide59.xml><?xml version="1.0" encoding="utf-8"?>
 <p:sld xmlns:a="http://schemas.openxmlformats.org/drawingml/2006/main" xmlns:r="http://schemas.openxmlformats.org/officeDocument/2006/relationships" xmlns:p="http://schemas.openxmlformats.org/presentationml/2006/main">
   <p:cSld>
     <p:spTree>
@@ -12905,7 +12337,7 @@
 </p:sld>
 </file>
 
-<file path=ppt/slides/slide63.xml><?xml version="1.0" encoding="utf-8"?>
+<file path=ppt/slides/slide6.xml><?xml version="1.0" encoding="utf-8"?>
 <p:sld xmlns:a="http://schemas.openxmlformats.org/drawingml/2006/main" xmlns:r="http://schemas.openxmlformats.org/officeDocument/2006/relationships" xmlns:p="http://schemas.openxmlformats.org/presentationml/2006/main">
   <p:cSld>
     <p:spTree>
@@ -12924,6 +12356,219 @@
       </p:grpSpPr>
       <p:sp>
         <p:nvSpPr>
+          <p:cNvPr id="2" name="Title 1"/>
+          <p:cNvSpPr>
+            <a:spLocks noGrp="1"/>
+          </p:cNvSpPr>
+          <p:nvPr>
+            <p:ph type="title"/>
+          </p:nvPr>
+        </p:nvSpPr>
+        <p:spPr/>
+        <p:txBody>
+          <a:bodyPr/>
+          <a:lstStyle/>
+          <a:p>
+            <a:r>
+              <a:rPr lang="en-US" sz="4000" dirty="0"/>
+              <a:t>Equality</a:t>
+            </a:r>
+            <a:endParaRPr lang="he-IL" dirty="0"/>
+          </a:p>
+        </p:txBody>
+      </p:sp>
+      <p:sp>
+        <p:nvSpPr>
+          <p:cNvPr id="3" name="Content Placeholder 2"/>
+          <p:cNvSpPr>
+            <a:spLocks noGrp="1"/>
+          </p:cNvSpPr>
+          <p:nvPr>
+            <p:ph idx="1"/>
+          </p:nvPr>
+        </p:nvSpPr>
+        <p:spPr/>
+        <p:txBody>
+          <a:bodyPr>
+            <a:normAutofit/>
+          </a:bodyPr>
+          <a:lstStyle/>
+          <a:p>
+            <a:pPr algn="l" rtl="0">
+              <a:buNone/>
+            </a:pPr>
+            <a:r>
+              <a:rPr lang="en-US" sz="1600" dirty="0"/>
+              <a:t>Conditional statements such as the ‘if’</a:t>
+            </a:r>
+          </a:p>
+          <a:p>
+            <a:pPr algn="l" rtl="0">
+              <a:buNone/>
+            </a:pPr>
+            <a:r>
+              <a:rPr lang="en-US" sz="1600" dirty="0"/>
+              <a:t>statement evaluate their expression using</a:t>
+            </a:r>
+          </a:p>
+          <a:p>
+            <a:pPr algn="l" rtl="0">
+              <a:buNone/>
+            </a:pPr>
+            <a:r>
+              <a:rPr lang="en-US" sz="1600" dirty="0"/>
+              <a:t>coercion with the ’</a:t>
+            </a:r>
+            <a:r>
+              <a:rPr lang="en-US" sz="1600" dirty="0" err="1"/>
+              <a:t>ToBoolean</a:t>
+            </a:r>
+            <a:r>
+              <a:rPr lang="en-US" sz="1600" dirty="0"/>
+              <a:t>’ abstract method</a:t>
+            </a:r>
+          </a:p>
+          <a:p>
+            <a:pPr algn="l" rtl="0">
+              <a:buNone/>
+            </a:pPr>
+            <a:r>
+              <a:rPr lang="en-US" sz="1600" dirty="0"/>
+              <a:t>and always follows the same rolls.</a:t>
+            </a:r>
+          </a:p>
+          <a:p>
+            <a:pPr algn="l" rtl="0">
+              <a:buNone/>
+            </a:pPr>
+            <a:endParaRPr lang="en-US" sz="1600" dirty="0"/>
+          </a:p>
+          <a:p>
+            <a:pPr algn="l" rtl="0">
+              <a:buNone/>
+            </a:pPr>
+            <a:r>
+              <a:rPr lang="en-US" sz="1600" dirty="0"/>
+              <a:t>From ES6 specification : “The abstract</a:t>
+            </a:r>
+          </a:p>
+          <a:p>
+            <a:pPr algn="l" rtl="0">
+              <a:buNone/>
+            </a:pPr>
+            <a:r>
+              <a:rPr lang="en-US" sz="1600" dirty="0"/>
+              <a:t>operation ‘</a:t>
+            </a:r>
+            <a:r>
+              <a:rPr lang="en-US" sz="1600" dirty="0" err="1"/>
+              <a:t>ToBoolean</a:t>
+            </a:r>
+            <a:r>
+              <a:rPr lang="en-US" sz="1600" dirty="0"/>
+              <a:t>’ converts argument to a</a:t>
+            </a:r>
+          </a:p>
+          <a:p>
+            <a:pPr algn="l" rtl="0">
+              <a:buNone/>
+            </a:pPr>
+            <a:r>
+              <a:rPr lang="en-US" sz="1600" dirty="0"/>
+              <a:t>value of type Boolean according to </a:t>
+            </a:r>
+            <a:r>
+              <a:rPr lang="en-US" sz="1600" dirty="0">
+                <a:hlinkClick r:id="rId2"/>
+              </a:rPr>
+              <a:t>table 10</a:t>
+            </a:r>
+            <a:r>
+              <a:rPr lang="en-US" sz="1600" dirty="0"/>
+              <a:t>”.</a:t>
+            </a:r>
+          </a:p>
+        </p:txBody>
+      </p:sp>
+      <p:pic>
+        <p:nvPicPr>
+          <p:cNvPr id="2050" name="Picture 2" descr="C:\Users\israel\Desktop\Capture.PNG"/>
+          <p:cNvPicPr>
+            <a:picLocks noChangeAspect="1" noChangeArrowheads="1"/>
+          </p:cNvPicPr>
+          <p:nvPr/>
+        </p:nvPicPr>
+        <p:blipFill>
+          <a:blip r:embed="rId3" cstate="print"/>
+          <a:srcRect/>
+          <a:stretch>
+            <a:fillRect/>
+          </a:stretch>
+        </p:blipFill>
+        <p:spPr bwMode="auto">
+          <a:xfrm>
+            <a:off x="430924" y="4357941"/>
+            <a:ext cx="5878513" cy="432369"/>
+          </a:xfrm>
+          <a:prstGeom prst="rect">
+            <a:avLst/>
+          </a:prstGeom>
+          <a:noFill/>
+        </p:spPr>
+      </p:pic>
+      <p:pic>
+        <p:nvPicPr>
+          <p:cNvPr id="2051" name="Picture 3" descr="C:\Users\israel\Desktop\Capture.PNG"/>
+          <p:cNvPicPr>
+            <a:picLocks noChangeAspect="1" noChangeArrowheads="1"/>
+          </p:cNvPicPr>
+          <p:nvPr/>
+        </p:nvPicPr>
+        <p:blipFill>
+          <a:blip r:embed="rId4" cstate="print"/>
+          <a:srcRect/>
+          <a:stretch>
+            <a:fillRect/>
+          </a:stretch>
+        </p:blipFill>
+        <p:spPr bwMode="auto">
+          <a:xfrm>
+            <a:off x="430925" y="4790310"/>
+            <a:ext cx="5878513" cy="1819685"/>
+          </a:xfrm>
+          <a:prstGeom prst="rect">
+            <a:avLst/>
+          </a:prstGeom>
+          <a:noFill/>
+        </p:spPr>
+      </p:pic>
+    </p:spTree>
+  </p:cSld>
+  <p:clrMapOvr>
+    <a:masterClrMapping/>
+  </p:clrMapOvr>
+</p:sld>
+</file>
+
+<file path=ppt/slides/slide60.xml><?xml version="1.0" encoding="utf-8"?>
+<p:sld xmlns:a="http://schemas.openxmlformats.org/drawingml/2006/main" xmlns:r="http://schemas.openxmlformats.org/officeDocument/2006/relationships" xmlns:p="http://schemas.openxmlformats.org/presentationml/2006/main">
+  <p:cSld>
+    <p:spTree>
+      <p:nvGrpSpPr>
+        <p:cNvPr id="1" name=""/>
+        <p:cNvGrpSpPr/>
+        <p:nvPr/>
+      </p:nvGrpSpPr>
+      <p:grpSpPr>
+        <a:xfrm>
+          <a:off x="0" y="0"/>
+          <a:ext cx="0" cy="0"/>
+          <a:chOff x="0" y="0"/>
+          <a:chExt cx="0" cy="0"/>
+        </a:xfrm>
+      </p:grpSpPr>
+      <p:sp>
+        <p:nvSpPr>
           <p:cNvPr id="2" name="Title 1">
             <a:extLst>
               <a:ext uri="{FF2B5EF4-FFF2-40B4-BE49-F238E27FC236}">
@@ -13055,7 +12700,7 @@
 </p:sld>
 </file>
 
-<file path=ppt/slides/slide64.xml><?xml version="1.0" encoding="utf-8"?>
+<file path=ppt/slides/slide61.xml><?xml version="1.0" encoding="utf-8"?>
 <p:sld xmlns:a="http://schemas.openxmlformats.org/drawingml/2006/main" xmlns:r="http://schemas.openxmlformats.org/officeDocument/2006/relationships" xmlns:p="http://schemas.openxmlformats.org/presentationml/2006/main">
   <p:cSld>
     <p:spTree>
@@ -13192,7 +12837,7 @@
 </p:sld>
 </file>
 
-<file path=ppt/slides/slide65.xml><?xml version="1.0" encoding="utf-8"?>
+<file path=ppt/slides/slide62.xml><?xml version="1.0" encoding="utf-8"?>
 <p:sld xmlns:a="http://schemas.openxmlformats.org/drawingml/2006/main" xmlns:r="http://schemas.openxmlformats.org/officeDocument/2006/relationships" xmlns:p="http://schemas.openxmlformats.org/presentationml/2006/main">
   <p:cSld>
     <p:spTree>
@@ -13282,7 +12927,7 @@
 </p:sld>
 </file>
 
-<file path=ppt/slides/slide66.xml><?xml version="1.0" encoding="utf-8"?>
+<file path=ppt/slides/slide63.xml><?xml version="1.0" encoding="utf-8"?>
 <p:sld xmlns:a="http://schemas.openxmlformats.org/drawingml/2006/main" xmlns:r="http://schemas.openxmlformats.org/officeDocument/2006/relationships" xmlns:p="http://schemas.openxmlformats.org/presentationml/2006/main">
   <p:cSld>
     <p:spTree>
@@ -13410,7 +13055,7 @@
 </p:sld>
 </file>
 
-<file path=ppt/slides/slide67.xml><?xml version="1.0" encoding="utf-8"?>
+<file path=ppt/slides/slide64.xml><?xml version="1.0" encoding="utf-8"?>
 <p:sld xmlns:a="http://schemas.openxmlformats.org/drawingml/2006/main" xmlns:r="http://schemas.openxmlformats.org/officeDocument/2006/relationships" xmlns:p="http://schemas.openxmlformats.org/presentationml/2006/main">
   <p:cSld>
     <p:spTree>
@@ -13583,7 +13228,7 @@
 </p:sld>
 </file>
 
-<file path=ppt/slides/slide68.xml><?xml version="1.0" encoding="utf-8"?>
+<file path=ppt/slides/slide65.xml><?xml version="1.0" encoding="utf-8"?>
 <p:sld xmlns:a="http://schemas.openxmlformats.org/drawingml/2006/main" xmlns:r="http://schemas.openxmlformats.org/officeDocument/2006/relationships" xmlns:p="http://schemas.openxmlformats.org/presentationml/2006/main">
   <p:cSld>
     <p:spTree>
@@ -13726,7 +13371,7 @@
 </p:sld>
 </file>
 
-<file path=ppt/slides/slide69.xml><?xml version="1.0" encoding="utf-8"?>
+<file path=ppt/slides/slide66.xml><?xml version="1.0" encoding="utf-8"?>
 <p:sld xmlns:a="http://schemas.openxmlformats.org/drawingml/2006/main" xmlns:r="http://schemas.openxmlformats.org/officeDocument/2006/relationships" xmlns:p="http://schemas.openxmlformats.org/presentationml/2006/main">
   <p:cSld>
     <p:spTree>
@@ -13854,7 +13499,7 @@
 </p:sld>
 </file>
 
-<file path=ppt/slides/slide7.xml><?xml version="1.0" encoding="utf-8"?>
+<file path=ppt/slides/slide67.xml><?xml version="1.0" encoding="utf-8"?>
 <p:sld xmlns:a="http://schemas.openxmlformats.org/drawingml/2006/main" xmlns:r="http://schemas.openxmlformats.org/officeDocument/2006/relationships" xmlns:p="http://schemas.openxmlformats.org/presentationml/2006/main">
   <p:cSld>
     <p:spTree>
@@ -13873,172 +13518,6 @@
       </p:grpSpPr>
       <p:sp>
         <p:nvSpPr>
-          <p:cNvPr id="2" name="Title 1"/>
-          <p:cNvSpPr>
-            <a:spLocks noGrp="1"/>
-          </p:cNvSpPr>
-          <p:nvPr>
-            <p:ph type="title"/>
-          </p:nvPr>
-        </p:nvSpPr>
-        <p:spPr/>
-        <p:txBody>
-          <a:bodyPr/>
-          <a:lstStyle/>
-          <a:p>
-            <a:r>
-              <a:rPr lang="en-US" sz="4000" dirty="0"/>
-              <a:t>Equality</a:t>
-            </a:r>
-            <a:endParaRPr lang="he-IL" dirty="0"/>
-          </a:p>
-        </p:txBody>
-      </p:sp>
-      <p:sp>
-        <p:nvSpPr>
-          <p:cNvPr id="3" name="Content Placeholder 2"/>
-          <p:cNvSpPr>
-            <a:spLocks noGrp="1"/>
-          </p:cNvSpPr>
-          <p:nvPr>
-            <p:ph idx="1"/>
-          </p:nvPr>
-        </p:nvSpPr>
-        <p:spPr/>
-        <p:txBody>
-          <a:bodyPr/>
-          <a:lstStyle/>
-          <a:p>
-            <a:pPr algn="l" rtl="0">
-              <a:buNone/>
-            </a:pPr>
-            <a:r>
-              <a:rPr lang="en-US" dirty="0"/>
-              <a:t>As mentioned at the table above, objects</a:t>
-            </a:r>
-          </a:p>
-          <a:p>
-            <a:pPr algn="l" rtl="0">
-              <a:buNone/>
-            </a:pPr>
-            <a:r>
-              <a:rPr lang="en-US" dirty="0"/>
-              <a:t>evaluated to true.</a:t>
-            </a:r>
-          </a:p>
-          <a:p>
-            <a:pPr algn="l" rtl="0">
-              <a:buNone/>
-            </a:pPr>
-            <a:r>
-              <a:rPr lang="en-US" dirty="0"/>
-              <a:t>That is why even an empty array evaluates to</a:t>
-            </a:r>
-          </a:p>
-          <a:p>
-            <a:pPr algn="l" rtl="0">
-              <a:buNone/>
-            </a:pPr>
-            <a:r>
-              <a:rPr lang="en-US" dirty="0"/>
-              <a:t>true.</a:t>
-            </a:r>
-          </a:p>
-          <a:p>
-            <a:pPr algn="l" rtl="0">
-              <a:buNone/>
-            </a:pPr>
-            <a:endParaRPr lang="en-US" dirty="0"/>
-          </a:p>
-          <a:p>
-            <a:pPr algn="l" rtl="0">
-              <a:buNone/>
-            </a:pPr>
-            <a:r>
-              <a:rPr lang="en-US" dirty="0">
-                <a:solidFill>
-                  <a:srgbClr val="FF0000"/>
-                </a:solidFill>
-              </a:rPr>
-              <a:t>If</a:t>
-            </a:r>
-            <a:r>
-              <a:rPr lang="en-US" dirty="0"/>
-              <a:t>([]) {</a:t>
-            </a:r>
-          </a:p>
-          <a:p>
-            <a:pPr algn="l" rtl="0">
-              <a:buNone/>
-            </a:pPr>
-            <a:r>
-              <a:rPr lang="en-US" dirty="0"/>
-              <a:t>	</a:t>
-            </a:r>
-            <a:r>
-              <a:rPr lang="en-US" dirty="0">
-                <a:solidFill>
-                  <a:srgbClr val="92D050"/>
-                </a:solidFill>
-              </a:rPr>
-              <a:t>// true</a:t>
-            </a:r>
-          </a:p>
-          <a:p>
-            <a:pPr algn="l" rtl="0">
-              <a:buNone/>
-            </a:pPr>
-            <a:r>
-              <a:rPr lang="en-US" dirty="0"/>
-              <a:t>	</a:t>
-            </a:r>
-            <a:r>
-              <a:rPr lang="en-US" dirty="0">
-                <a:solidFill>
-                  <a:srgbClr val="92D050"/>
-                </a:solidFill>
-              </a:rPr>
-              <a:t>// an array (even an empty one) is an    object, objects will evaluate to true</a:t>
-            </a:r>
-          </a:p>
-          <a:p>
-            <a:pPr algn="l" rtl="0">
-              <a:buNone/>
-            </a:pPr>
-            <a:r>
-              <a:rPr lang="en-US" dirty="0"/>
-              <a:t>}</a:t>
-            </a:r>
-          </a:p>
-        </p:txBody>
-      </p:sp>
-    </p:spTree>
-  </p:cSld>
-  <p:clrMapOvr>
-    <a:masterClrMapping/>
-  </p:clrMapOvr>
-</p:sld>
-</file>
-
-<file path=ppt/slides/slide70.xml><?xml version="1.0" encoding="utf-8"?>
-<p:sld xmlns:a="http://schemas.openxmlformats.org/drawingml/2006/main" xmlns:r="http://schemas.openxmlformats.org/officeDocument/2006/relationships" xmlns:p="http://schemas.openxmlformats.org/presentationml/2006/main">
-  <p:cSld>
-    <p:spTree>
-      <p:nvGrpSpPr>
-        <p:cNvPr id="1" name=""/>
-        <p:cNvGrpSpPr/>
-        <p:nvPr/>
-      </p:nvGrpSpPr>
-      <p:grpSpPr>
-        <a:xfrm>
-          <a:off x="0" y="0"/>
-          <a:ext cx="0" cy="0"/>
-          <a:chOff x="0" y="0"/>
-          <a:chExt cx="0" cy="0"/>
-        </a:xfrm>
-      </p:grpSpPr>
-      <p:sp>
-        <p:nvSpPr>
           <p:cNvPr id="2" name="Title 1">
             <a:extLst>
               <a:ext uri="{FF2B5EF4-FFF2-40B4-BE49-F238E27FC236}">
@@ -14195,7 +13674,7 @@
 </p:sld>
 </file>
 
-<file path=ppt/slides/slide71.xml><?xml version="1.0" encoding="utf-8"?>
+<file path=ppt/slides/slide68.xml><?xml version="1.0" encoding="utf-8"?>
 <p:sld xmlns:a="http://schemas.openxmlformats.org/drawingml/2006/main" xmlns:r="http://schemas.openxmlformats.org/officeDocument/2006/relationships" xmlns:p="http://schemas.openxmlformats.org/presentationml/2006/main">
   <p:cSld>
     <p:spTree>
@@ -14384,7 +13863,7 @@
 </p:sld>
 </file>
 
-<file path=ppt/slides/slide72.xml><?xml version="1.0" encoding="utf-8"?>
+<file path=ppt/slides/slide69.xml><?xml version="1.0" encoding="utf-8"?>
 <p:sld xmlns:a="http://schemas.openxmlformats.org/drawingml/2006/main" xmlns:r="http://schemas.openxmlformats.org/officeDocument/2006/relationships" xmlns:p="http://schemas.openxmlformats.org/presentationml/2006/main">
   <p:cSld>
     <p:spTree>
@@ -14556,7 +14035,173 @@
 </p:sld>
 </file>
 
-<file path=ppt/slides/slide73.xml><?xml version="1.0" encoding="utf-8"?>
+<file path=ppt/slides/slide7.xml><?xml version="1.0" encoding="utf-8"?>
+<p:sld xmlns:a="http://schemas.openxmlformats.org/drawingml/2006/main" xmlns:r="http://schemas.openxmlformats.org/officeDocument/2006/relationships" xmlns:p="http://schemas.openxmlformats.org/presentationml/2006/main">
+  <p:cSld>
+    <p:spTree>
+      <p:nvGrpSpPr>
+        <p:cNvPr id="1" name=""/>
+        <p:cNvGrpSpPr/>
+        <p:nvPr/>
+      </p:nvGrpSpPr>
+      <p:grpSpPr>
+        <a:xfrm>
+          <a:off x="0" y="0"/>
+          <a:ext cx="0" cy="0"/>
+          <a:chOff x="0" y="0"/>
+          <a:chExt cx="0" cy="0"/>
+        </a:xfrm>
+      </p:grpSpPr>
+      <p:sp>
+        <p:nvSpPr>
+          <p:cNvPr id="2" name="Title 1"/>
+          <p:cNvSpPr>
+            <a:spLocks noGrp="1"/>
+          </p:cNvSpPr>
+          <p:nvPr>
+            <p:ph type="title"/>
+          </p:nvPr>
+        </p:nvSpPr>
+        <p:spPr/>
+        <p:txBody>
+          <a:bodyPr/>
+          <a:lstStyle/>
+          <a:p>
+            <a:r>
+              <a:rPr lang="en-US" sz="4000" dirty="0"/>
+              <a:t>Equality</a:t>
+            </a:r>
+            <a:endParaRPr lang="he-IL" dirty="0"/>
+          </a:p>
+        </p:txBody>
+      </p:sp>
+      <p:sp>
+        <p:nvSpPr>
+          <p:cNvPr id="3" name="Content Placeholder 2"/>
+          <p:cNvSpPr>
+            <a:spLocks noGrp="1"/>
+          </p:cNvSpPr>
+          <p:nvPr>
+            <p:ph idx="1"/>
+          </p:nvPr>
+        </p:nvSpPr>
+        <p:spPr/>
+        <p:txBody>
+          <a:bodyPr/>
+          <a:lstStyle/>
+          <a:p>
+            <a:pPr algn="l" rtl="0">
+              <a:buNone/>
+            </a:pPr>
+            <a:r>
+              <a:rPr lang="en-US" dirty="0"/>
+              <a:t>As mentioned at the table above, objects</a:t>
+            </a:r>
+          </a:p>
+          <a:p>
+            <a:pPr algn="l" rtl="0">
+              <a:buNone/>
+            </a:pPr>
+            <a:r>
+              <a:rPr lang="en-US" dirty="0"/>
+              <a:t>evaluated to true.</a:t>
+            </a:r>
+          </a:p>
+          <a:p>
+            <a:pPr algn="l" rtl="0">
+              <a:buNone/>
+            </a:pPr>
+            <a:r>
+              <a:rPr lang="en-US" dirty="0"/>
+              <a:t>That is why even an empty array evaluates to</a:t>
+            </a:r>
+          </a:p>
+          <a:p>
+            <a:pPr algn="l" rtl="0">
+              <a:buNone/>
+            </a:pPr>
+            <a:r>
+              <a:rPr lang="en-US" dirty="0"/>
+              <a:t>true.</a:t>
+            </a:r>
+          </a:p>
+          <a:p>
+            <a:pPr algn="l" rtl="0">
+              <a:buNone/>
+            </a:pPr>
+            <a:endParaRPr lang="en-US" dirty="0"/>
+          </a:p>
+          <a:p>
+            <a:pPr algn="l" rtl="0">
+              <a:buNone/>
+            </a:pPr>
+            <a:r>
+              <a:rPr lang="en-US" dirty="0">
+                <a:solidFill>
+                  <a:srgbClr val="FF0000"/>
+                </a:solidFill>
+              </a:rPr>
+              <a:t>If</a:t>
+            </a:r>
+            <a:r>
+              <a:rPr lang="en-US" dirty="0"/>
+              <a:t>([]) {</a:t>
+            </a:r>
+          </a:p>
+          <a:p>
+            <a:pPr algn="l" rtl="0">
+              <a:buNone/>
+            </a:pPr>
+            <a:r>
+              <a:rPr lang="en-US" dirty="0"/>
+              <a:t>	</a:t>
+            </a:r>
+            <a:r>
+              <a:rPr lang="en-US" dirty="0">
+                <a:solidFill>
+                  <a:srgbClr val="92D050"/>
+                </a:solidFill>
+              </a:rPr>
+              <a:t>// true</a:t>
+            </a:r>
+          </a:p>
+          <a:p>
+            <a:pPr algn="l" rtl="0">
+              <a:buNone/>
+            </a:pPr>
+            <a:r>
+              <a:rPr lang="en-US" dirty="0"/>
+              <a:t>	</a:t>
+            </a:r>
+            <a:r>
+              <a:rPr lang="en-US" dirty="0">
+                <a:solidFill>
+                  <a:srgbClr val="92D050"/>
+                </a:solidFill>
+              </a:rPr>
+              <a:t>// an array (even an empty one) is an    object, objects will evaluate to true</a:t>
+            </a:r>
+          </a:p>
+          <a:p>
+            <a:pPr algn="l" rtl="0">
+              <a:buNone/>
+            </a:pPr>
+            <a:r>
+              <a:rPr lang="en-US" dirty="0"/>
+              <a:t>}</a:t>
+            </a:r>
+          </a:p>
+        </p:txBody>
+      </p:sp>
+    </p:spTree>
+  </p:cSld>
+  <p:clrMapOvr>
+    <a:masterClrMapping/>
+  </p:clrMapOvr>
+</p:sld>
+</file>
+
+<file path=ppt/slides/slide70.xml><?xml version="1.0" encoding="utf-8"?>
 <p:sld xmlns:a="http://schemas.openxmlformats.org/drawingml/2006/main" xmlns:r="http://schemas.openxmlformats.org/officeDocument/2006/relationships" xmlns:p="http://schemas.openxmlformats.org/presentationml/2006/main">
   <p:cSld>
     <p:spTree>
@@ -14682,7 +14327,7 @@
 </p:sld>
 </file>
 
-<file path=ppt/slides/slide74.xml><?xml version="1.0" encoding="utf-8"?>
+<file path=ppt/slides/slide71.xml><?xml version="1.0" encoding="utf-8"?>
 <p:sld xmlns:a="http://schemas.openxmlformats.org/drawingml/2006/main" xmlns:r="http://schemas.openxmlformats.org/officeDocument/2006/relationships" xmlns:p="http://schemas.openxmlformats.org/presentationml/2006/main">
   <p:cSld>
     <p:spTree>
@@ -14844,7 +14489,7 @@
 </p:sld>
 </file>
 
-<file path=ppt/slides/slide75.xml><?xml version="1.0" encoding="utf-8"?>
+<file path=ppt/slides/slide72.xml><?xml version="1.0" encoding="utf-8"?>
 <p:sld xmlns:a="http://schemas.openxmlformats.org/drawingml/2006/main" xmlns:r="http://schemas.openxmlformats.org/officeDocument/2006/relationships" xmlns:p="http://schemas.openxmlformats.org/presentationml/2006/main">
   <p:cSld>
     <p:spTree>
@@ -14996,7 +14641,7 @@
 </p:sld>
 </file>
 
-<file path=ppt/slides/slide76.xml><?xml version="1.0" encoding="utf-8"?>
+<file path=ppt/slides/slide73.xml><?xml version="1.0" encoding="utf-8"?>
 <p:sld xmlns:a="http://schemas.openxmlformats.org/drawingml/2006/main" xmlns:r="http://schemas.openxmlformats.org/officeDocument/2006/relationships" xmlns:p="http://schemas.openxmlformats.org/presentationml/2006/main">
   <p:cSld>
     <p:spTree>
@@ -15132,7 +14777,7 @@
 </p:sld>
 </file>
 
-<file path=ppt/slides/slide77.xml><?xml version="1.0" encoding="utf-8"?>
+<file path=ppt/slides/slide74.xml><?xml version="1.0" encoding="utf-8"?>
 <p:sld xmlns:a="http://schemas.openxmlformats.org/drawingml/2006/main" xmlns:r="http://schemas.openxmlformats.org/officeDocument/2006/relationships" xmlns:p="http://schemas.openxmlformats.org/presentationml/2006/main">
   <p:cSld>
     <p:spTree>
@@ -15300,7 +14945,7 @@
 </p:sld>
 </file>
 
-<file path=ppt/slides/slide78.xml><?xml version="1.0" encoding="utf-8"?>
+<file path=ppt/slides/slide75.xml><?xml version="1.0" encoding="utf-8"?>
 <p:sld xmlns:a="http://schemas.openxmlformats.org/drawingml/2006/main" xmlns:r="http://schemas.openxmlformats.org/officeDocument/2006/relationships" xmlns:p="http://schemas.openxmlformats.org/presentationml/2006/main">
   <p:cSld>
     <p:spTree>
@@ -15440,7 +15085,7 @@
 </p:sld>
 </file>
 
-<file path=ppt/slides/slide79.xml><?xml version="1.0" encoding="utf-8"?>
+<file path=ppt/slides/slide76.xml><?xml version="1.0" encoding="utf-8"?>
 <p:sld xmlns:a="http://schemas.openxmlformats.org/drawingml/2006/main" xmlns:r="http://schemas.openxmlformats.org/officeDocument/2006/relationships" xmlns:p="http://schemas.openxmlformats.org/presentationml/2006/main">
   <p:cSld>
     <p:spTree>
@@ -15640,140 +15285,7 @@
 </p:sld>
 </file>
 
-<file path=ppt/slides/slide8.xml><?xml version="1.0" encoding="utf-8"?>
-<p:sld xmlns:a="http://schemas.openxmlformats.org/drawingml/2006/main" xmlns:r="http://schemas.openxmlformats.org/officeDocument/2006/relationships" xmlns:p="http://schemas.openxmlformats.org/presentationml/2006/main">
-  <p:cSld>
-    <p:spTree>
-      <p:nvGrpSpPr>
-        <p:cNvPr id="1" name=""/>
-        <p:cNvGrpSpPr/>
-        <p:nvPr/>
-      </p:nvGrpSpPr>
-      <p:grpSpPr>
-        <a:xfrm>
-          <a:off x="0" y="0"/>
-          <a:ext cx="0" cy="0"/>
-          <a:chOff x="0" y="0"/>
-          <a:chExt cx="0" cy="0"/>
-        </a:xfrm>
-      </p:grpSpPr>
-      <p:sp>
-        <p:nvSpPr>
-          <p:cNvPr id="2" name="Title 1"/>
-          <p:cNvSpPr>
-            <a:spLocks noGrp="1"/>
-          </p:cNvSpPr>
-          <p:nvPr>
-            <p:ph type="title"/>
-          </p:nvPr>
-        </p:nvSpPr>
-        <p:spPr/>
-        <p:txBody>
-          <a:bodyPr/>
-          <a:lstStyle/>
-          <a:p>
-            <a:r>
-              <a:rPr lang="en-US" dirty="0"/>
-              <a:t>Equality of References</a:t>
-            </a:r>
-            <a:endParaRPr lang="he-IL" dirty="0"/>
-          </a:p>
-        </p:txBody>
-      </p:sp>
-      <p:sp>
-        <p:nvSpPr>
-          <p:cNvPr id="3" name="Content Placeholder 2"/>
-          <p:cNvSpPr>
-            <a:spLocks noGrp="1"/>
-          </p:cNvSpPr>
-          <p:nvPr>
-            <p:ph idx="1"/>
-          </p:nvPr>
-        </p:nvSpPr>
-        <p:spPr/>
-        <p:txBody>
-          <a:bodyPr/>
-          <a:lstStyle/>
-          <a:p>
-            <a:pPr algn="l" rtl="0">
-              <a:buNone/>
-            </a:pPr>
-            <a:r>
-              <a:rPr lang="en-US" dirty="0"/>
-              <a:t>Any object in JavaScript (including functions, </a:t>
-            </a:r>
-          </a:p>
-          <a:p>
-            <a:pPr algn="l" rtl="0">
-              <a:buNone/>
-            </a:pPr>
-            <a:r>
-              <a:rPr lang="en-US" dirty="0"/>
-              <a:t>arrays, </a:t>
-            </a:r>
-            <a:r>
-              <a:rPr lang="en-US" dirty="0" err="1"/>
-              <a:t>regexp</a:t>
-            </a:r>
-            <a:r>
-              <a:rPr lang="en-US" dirty="0"/>
-              <a:t> etc) are references.</a:t>
-            </a:r>
-            <a:endParaRPr lang="he-IL" dirty="0"/>
-          </a:p>
-          <a:p>
-            <a:pPr algn="l" rtl="0">
-              <a:buNone/>
-            </a:pPr>
-            <a:endParaRPr lang="en-US" dirty="0"/>
-          </a:p>
-          <a:p>
-            <a:pPr algn="l" rtl="0">
-              <a:buNone/>
-            </a:pPr>
-            <a:r>
-              <a:rPr lang="en-US" dirty="0"/>
-              <a:t>Object equality is for references:</a:t>
-            </a:r>
-            <a:endParaRPr lang="he-IL" dirty="0"/>
-          </a:p>
-        </p:txBody>
-      </p:sp>
-      <p:pic>
-        <p:nvPicPr>
-          <p:cNvPr id="1026" name="Picture 2" descr="C:\Users\israel\Desktop\Capture.PNG"/>
-          <p:cNvPicPr>
-            <a:picLocks noChangeAspect="1" noChangeArrowheads="1"/>
-          </p:cNvPicPr>
-          <p:nvPr/>
-        </p:nvPicPr>
-        <p:blipFill>
-          <a:blip r:embed="rId2" cstate="print"/>
-          <a:srcRect/>
-          <a:stretch>
-            <a:fillRect/>
-          </a:stretch>
-        </p:blipFill>
-        <p:spPr bwMode="auto">
-          <a:xfrm>
-            <a:off x="533400" y="3733800"/>
-            <a:ext cx="4876800" cy="1752600"/>
-          </a:xfrm>
-          <a:prstGeom prst="rect">
-            <a:avLst/>
-          </a:prstGeom>
-          <a:noFill/>
-        </p:spPr>
-      </p:pic>
-    </p:spTree>
-  </p:cSld>
-  <p:clrMapOvr>
-    <a:masterClrMapping/>
-  </p:clrMapOvr>
-</p:sld>
-</file>
-
-<file path=ppt/slides/slide80.xml><?xml version="1.0" encoding="utf-8"?>
+<file path=ppt/slides/slide77.xml><?xml version="1.0" encoding="utf-8"?>
 <p:sld xmlns:a="http://schemas.openxmlformats.org/drawingml/2006/main" xmlns:r="http://schemas.openxmlformats.org/officeDocument/2006/relationships" xmlns:p="http://schemas.openxmlformats.org/presentationml/2006/main">
   <p:cSld>
     <p:spTree>
@@ -15956,7 +15468,7 @@
 </p:sld>
 </file>
 
-<file path=ppt/slides/slide81.xml><?xml version="1.0" encoding="utf-8"?>
+<file path=ppt/slides/slide78.xml><?xml version="1.0" encoding="utf-8"?>
 <p:sld xmlns:a="http://schemas.openxmlformats.org/drawingml/2006/main" xmlns:r="http://schemas.openxmlformats.org/officeDocument/2006/relationships" xmlns:p="http://schemas.openxmlformats.org/presentationml/2006/main">
   <p:cSld>
     <p:spTree>
@@ -16335,6 +15847,139 @@
           </a:p>
         </p:txBody>
       </p:sp>
+    </p:spTree>
+  </p:cSld>
+  <p:clrMapOvr>
+    <a:masterClrMapping/>
+  </p:clrMapOvr>
+</p:sld>
+</file>
+
+<file path=ppt/slides/slide8.xml><?xml version="1.0" encoding="utf-8"?>
+<p:sld xmlns:a="http://schemas.openxmlformats.org/drawingml/2006/main" xmlns:r="http://schemas.openxmlformats.org/officeDocument/2006/relationships" xmlns:p="http://schemas.openxmlformats.org/presentationml/2006/main">
+  <p:cSld>
+    <p:spTree>
+      <p:nvGrpSpPr>
+        <p:cNvPr id="1" name=""/>
+        <p:cNvGrpSpPr/>
+        <p:nvPr/>
+      </p:nvGrpSpPr>
+      <p:grpSpPr>
+        <a:xfrm>
+          <a:off x="0" y="0"/>
+          <a:ext cx="0" cy="0"/>
+          <a:chOff x="0" y="0"/>
+          <a:chExt cx="0" cy="0"/>
+        </a:xfrm>
+      </p:grpSpPr>
+      <p:sp>
+        <p:nvSpPr>
+          <p:cNvPr id="2" name="Title 1"/>
+          <p:cNvSpPr>
+            <a:spLocks noGrp="1"/>
+          </p:cNvSpPr>
+          <p:nvPr>
+            <p:ph type="title"/>
+          </p:nvPr>
+        </p:nvSpPr>
+        <p:spPr/>
+        <p:txBody>
+          <a:bodyPr/>
+          <a:lstStyle/>
+          <a:p>
+            <a:r>
+              <a:rPr lang="en-US" dirty="0"/>
+              <a:t>Equality of References</a:t>
+            </a:r>
+            <a:endParaRPr lang="he-IL" dirty="0"/>
+          </a:p>
+        </p:txBody>
+      </p:sp>
+      <p:sp>
+        <p:nvSpPr>
+          <p:cNvPr id="3" name="Content Placeholder 2"/>
+          <p:cNvSpPr>
+            <a:spLocks noGrp="1"/>
+          </p:cNvSpPr>
+          <p:nvPr>
+            <p:ph idx="1"/>
+          </p:nvPr>
+        </p:nvSpPr>
+        <p:spPr/>
+        <p:txBody>
+          <a:bodyPr/>
+          <a:lstStyle/>
+          <a:p>
+            <a:pPr algn="l" rtl="0">
+              <a:buNone/>
+            </a:pPr>
+            <a:r>
+              <a:rPr lang="en-US" dirty="0"/>
+              <a:t>Any object in JavaScript (including functions, </a:t>
+            </a:r>
+          </a:p>
+          <a:p>
+            <a:pPr algn="l" rtl="0">
+              <a:buNone/>
+            </a:pPr>
+            <a:r>
+              <a:rPr lang="en-US" dirty="0"/>
+              <a:t>arrays, </a:t>
+            </a:r>
+            <a:r>
+              <a:rPr lang="en-US" dirty="0" err="1"/>
+              <a:t>regexp</a:t>
+            </a:r>
+            <a:r>
+              <a:rPr lang="en-US" dirty="0"/>
+              <a:t> etc) are references.</a:t>
+            </a:r>
+            <a:endParaRPr lang="he-IL" dirty="0"/>
+          </a:p>
+          <a:p>
+            <a:pPr algn="l" rtl="0">
+              <a:buNone/>
+            </a:pPr>
+            <a:endParaRPr lang="en-US" dirty="0"/>
+          </a:p>
+          <a:p>
+            <a:pPr algn="l" rtl="0">
+              <a:buNone/>
+            </a:pPr>
+            <a:r>
+              <a:rPr lang="en-US" dirty="0"/>
+              <a:t>Object equality is for references:</a:t>
+            </a:r>
+            <a:endParaRPr lang="he-IL" dirty="0"/>
+          </a:p>
+        </p:txBody>
+      </p:sp>
+      <p:pic>
+        <p:nvPicPr>
+          <p:cNvPr id="1026" name="Picture 2" descr="C:\Users\israel\Desktop\Capture.PNG"/>
+          <p:cNvPicPr>
+            <a:picLocks noChangeAspect="1" noChangeArrowheads="1"/>
+          </p:cNvPicPr>
+          <p:nvPr/>
+        </p:nvPicPr>
+        <p:blipFill>
+          <a:blip r:embed="rId2" cstate="print"/>
+          <a:srcRect/>
+          <a:stretch>
+            <a:fillRect/>
+          </a:stretch>
+        </p:blipFill>
+        <p:spPr bwMode="auto">
+          <a:xfrm>
+            <a:off x="533400" y="3733800"/>
+            <a:ext cx="4876800" cy="1752600"/>
+          </a:xfrm>
+          <a:prstGeom prst="rect">
+            <a:avLst/>
+          </a:prstGeom>
+          <a:noFill/>
+        </p:spPr>
+      </p:pic>
     </p:spTree>
   </p:cSld>
   <p:clrMapOvr>

</xml_diff>